<commit_message>
Updated model pipeline figure
</commit_message>
<xml_diff>
--- a/fig_modelpipeline.pptx
+++ b/fig_modelpipeline.pptx
@@ -104,13 +104,29 @@
       </a:defRPr>
     </a:lvl9pPr>
   </p:defaultTextStyle>
+  <p:extLst>
+    <p:ext uri="{EFAFB233-063F-42B5-8137-9DF3F51BA10A}">
+      <p15:sldGuideLst xmlns:p15="http://schemas.microsoft.com/office/powerpoint/2012/main">
+        <p15:guide id="1" orient="horz" pos="2160" userDrawn="1">
+          <p15:clr>
+            <a:srgbClr val="A4A3A4"/>
+          </p15:clr>
+        </p15:guide>
+        <p15:guide id="2" pos="3840" userDrawn="1">
+          <p15:clr>
+            <a:srgbClr val="A4A3A4"/>
+          </p15:clr>
+        </p15:guide>
+      </p15:sldGuideLst>
+    </p:ext>
+  </p:extLst>
 </p:presentation>
 </file>
 
 <file path=ppt/revisionInfo.xml><?xml version="1.0" encoding="utf-8"?>
 <p1510:revInfo xmlns:a="http://schemas.openxmlformats.org/drawingml/2006/main" xmlns:r="http://schemas.openxmlformats.org/officeDocument/2006/relationships" xmlns:p1510="http://schemas.microsoft.com/office/powerpoint/2015/10/main">
   <p1510:revLst>
-    <p1510:client id="{0DEAF538-9A43-0041-92DF-11DEC3319B03}" v="5" dt="2025-04-27T22:18:53.212"/>
+    <p1510:client id="{0DEAF538-9A43-0041-92DF-11DEC3319B03}" v="144" dt="2025-04-28T03:13:54.759"/>
   </p1510:revLst>
 </p1510:revInfo>
 </file>
@@ -3331,10 +3347,10 @@
       </p:grpSpPr>
       <p:cxnSp>
         <p:nvCxnSpPr>
-          <p:cNvPr id="217" name="Straight Arrow Connector 216">
-            <a:extLst>
-              <a:ext uri="{FF2B5EF4-FFF2-40B4-BE49-F238E27FC236}">
-                <a16:creationId xmlns:a16="http://schemas.microsoft.com/office/drawing/2014/main" id="{F6390D24-9D05-98ED-626B-0C37A7364B27}"/>
+          <p:cNvPr id="341" name="Straight Arrow Connector 340">
+            <a:extLst>
+              <a:ext uri="{FF2B5EF4-FFF2-40B4-BE49-F238E27FC236}">
+                <a16:creationId xmlns:a16="http://schemas.microsoft.com/office/drawing/2014/main" id="{54937D49-5305-6AA3-991D-CCF792455FBE}"/>
               </a:ext>
             </a:extLst>
           </p:cNvPr>
@@ -3344,9 +3360,194 @@
           <p:nvPr/>
         </p:nvCxnSpPr>
         <p:spPr>
+          <a:xfrm flipH="1" flipV="1">
+            <a:off x="1203767" y="5023413"/>
+            <a:ext cx="3658134" cy="25744"/>
+          </a:xfrm>
+          <a:prstGeom prst="straightConnector1">
+            <a:avLst/>
+          </a:prstGeom>
+          <a:ln w="82550">
+            <a:solidFill>
+              <a:schemeClr val="accent6">
+                <a:lumMod val="50000"/>
+              </a:schemeClr>
+            </a:solidFill>
+            <a:tailEnd type="none"/>
+          </a:ln>
+        </p:spPr>
+        <p:style>
+          <a:lnRef idx="2">
+            <a:schemeClr val="accent1"/>
+          </a:lnRef>
+          <a:fillRef idx="0">
+            <a:schemeClr val="accent1"/>
+          </a:fillRef>
+          <a:effectRef idx="1">
+            <a:schemeClr val="accent1"/>
+          </a:effectRef>
+          <a:fontRef idx="minor">
+            <a:schemeClr val="tx1"/>
+          </a:fontRef>
+        </p:style>
+      </p:cxnSp>
+      <p:cxnSp>
+        <p:nvCxnSpPr>
+          <p:cNvPr id="339" name="Straight Arrow Connector 338">
+            <a:extLst>
+              <a:ext uri="{FF2B5EF4-FFF2-40B4-BE49-F238E27FC236}">
+                <a16:creationId xmlns:a16="http://schemas.microsoft.com/office/drawing/2014/main" id="{98B35DB6-65FD-507D-6A1F-11494D5EB715}"/>
+              </a:ext>
+            </a:extLst>
+          </p:cNvPr>
+          <p:cNvCxnSpPr>
+            <a:cxnSpLocks/>
+          </p:cNvCxnSpPr>
+          <p:nvPr/>
+        </p:nvCxnSpPr>
+        <p:spPr>
+          <a:xfrm>
+            <a:off x="4872521" y="4681728"/>
+            <a:ext cx="0" cy="1261872"/>
+          </a:xfrm>
+          <a:prstGeom prst="straightConnector1">
+            <a:avLst/>
+          </a:prstGeom>
+          <a:ln w="82550">
+            <a:solidFill>
+              <a:schemeClr val="accent6">
+                <a:lumMod val="50000"/>
+              </a:schemeClr>
+            </a:solidFill>
+            <a:tailEnd type="triangle"/>
+          </a:ln>
+        </p:spPr>
+        <p:style>
+          <a:lnRef idx="2">
+            <a:schemeClr val="accent1"/>
+          </a:lnRef>
+          <a:fillRef idx="0">
+            <a:schemeClr val="accent1"/>
+          </a:fillRef>
+          <a:effectRef idx="1">
+            <a:schemeClr val="accent1"/>
+          </a:effectRef>
+          <a:fontRef idx="minor">
+            <a:schemeClr val="tx1"/>
+          </a:fontRef>
+        </p:style>
+      </p:cxnSp>
+      <p:cxnSp>
+        <p:nvCxnSpPr>
+          <p:cNvPr id="122" name="Straight Arrow Connector 121">
+            <a:extLst>
+              <a:ext uri="{FF2B5EF4-FFF2-40B4-BE49-F238E27FC236}">
+                <a16:creationId xmlns:a16="http://schemas.microsoft.com/office/drawing/2014/main" id="{580F430A-39CE-3DB1-0F6A-EAC4B20BFC05}"/>
+              </a:ext>
+            </a:extLst>
+          </p:cNvPr>
+          <p:cNvCxnSpPr>
+            <a:cxnSpLocks/>
+          </p:cNvCxnSpPr>
+          <p:nvPr/>
+        </p:nvCxnSpPr>
+        <p:spPr>
+          <a:xfrm>
+            <a:off x="4574622" y="3588698"/>
+            <a:ext cx="0" cy="2354902"/>
+          </a:xfrm>
+          <a:prstGeom prst="straightConnector1">
+            <a:avLst/>
+          </a:prstGeom>
+          <a:ln w="82550">
+            <a:solidFill>
+              <a:schemeClr val="accent6">
+                <a:lumMod val="75000"/>
+              </a:schemeClr>
+            </a:solidFill>
+            <a:tailEnd type="triangle"/>
+          </a:ln>
+        </p:spPr>
+        <p:style>
+          <a:lnRef idx="2">
+            <a:schemeClr val="accent1"/>
+          </a:lnRef>
+          <a:fillRef idx="0">
+            <a:schemeClr val="accent1"/>
+          </a:fillRef>
+          <a:effectRef idx="1">
+            <a:schemeClr val="accent1"/>
+          </a:effectRef>
+          <a:fontRef idx="minor">
+            <a:schemeClr val="tx1"/>
+          </a:fontRef>
+        </p:style>
+      </p:cxnSp>
+      <p:cxnSp>
+        <p:nvCxnSpPr>
+          <p:cNvPr id="137" name="Straight Arrow Connector 136">
+            <a:extLst>
+              <a:ext uri="{FF2B5EF4-FFF2-40B4-BE49-F238E27FC236}">
+                <a16:creationId xmlns:a16="http://schemas.microsoft.com/office/drawing/2014/main" id="{937CD67D-1F51-D69A-A754-A92BC3AB24BF}"/>
+              </a:ext>
+            </a:extLst>
+          </p:cNvPr>
+          <p:cNvCxnSpPr>
+            <a:cxnSpLocks/>
+          </p:cNvCxnSpPr>
+          <p:nvPr/>
+        </p:nvCxnSpPr>
+        <p:spPr>
           <a:xfrm flipV="1">
-            <a:off x="4502485" y="3571702"/>
-            <a:ext cx="0" cy="1882260"/>
+            <a:off x="5440172" y="3442829"/>
+            <a:ext cx="0" cy="2135011"/>
+          </a:xfrm>
+          <a:prstGeom prst="straightConnector1">
+            <a:avLst/>
+          </a:prstGeom>
+          <a:ln w="82550">
+            <a:solidFill>
+              <a:schemeClr val="tx2">
+                <a:lumMod val="50000"/>
+                <a:lumOff val="50000"/>
+              </a:schemeClr>
+            </a:solidFill>
+            <a:tailEnd type="triangle"/>
+          </a:ln>
+        </p:spPr>
+        <p:style>
+          <a:lnRef idx="2">
+            <a:schemeClr val="accent1"/>
+          </a:lnRef>
+          <a:fillRef idx="0">
+            <a:schemeClr val="accent1"/>
+          </a:fillRef>
+          <a:effectRef idx="1">
+            <a:schemeClr val="accent1"/>
+          </a:effectRef>
+          <a:fontRef idx="minor">
+            <a:schemeClr val="tx1"/>
+          </a:fontRef>
+        </p:style>
+      </p:cxnSp>
+      <p:cxnSp>
+        <p:nvCxnSpPr>
+          <p:cNvPr id="217" name="Straight Arrow Connector 216">
+            <a:extLst>
+              <a:ext uri="{FF2B5EF4-FFF2-40B4-BE49-F238E27FC236}">
+                <a16:creationId xmlns:a16="http://schemas.microsoft.com/office/drawing/2014/main" id="{F6390D24-9D05-98ED-626B-0C37A7364B27}"/>
+              </a:ext>
+            </a:extLst>
+          </p:cNvPr>
+          <p:cNvCxnSpPr>
+            <a:cxnSpLocks/>
+          </p:cNvCxnSpPr>
+          <p:nvPr/>
+        </p:nvCxnSpPr>
+        <p:spPr>
+          <a:xfrm flipV="1">
+            <a:off x="5010967" y="3431408"/>
+            <a:ext cx="0" cy="1431407"/>
           </a:xfrm>
           <a:prstGeom prst="straightConnector1">
             <a:avLst/>
@@ -3389,8 +3590,8 @@
         </p:nvSpPr>
         <p:spPr>
           <a:xfrm>
-            <a:off x="377460" y="937725"/>
-            <a:ext cx="2006825" cy="646331"/>
+            <a:off x="586246" y="844684"/>
+            <a:ext cx="1920240" cy="640080"/>
           </a:xfrm>
           <a:prstGeom prst="rect">
             <a:avLst/>
@@ -3453,8 +3654,8 @@
         </p:nvSpPr>
         <p:spPr>
           <a:xfrm>
-            <a:off x="353818" y="2985032"/>
-            <a:ext cx="2006825" cy="646332"/>
+            <a:off x="575415" y="2948618"/>
+            <a:ext cx="1920240" cy="640080"/>
           </a:xfrm>
           <a:prstGeom prst="rect">
             <a:avLst/>
@@ -3518,8 +3719,8 @@
         </p:nvSpPr>
         <p:spPr>
           <a:xfrm>
-            <a:off x="3161952" y="951496"/>
-            <a:ext cx="2006825" cy="646332"/>
+            <a:off x="3682087" y="846083"/>
+            <a:ext cx="1920240" cy="640080"/>
           </a:xfrm>
           <a:prstGeom prst="rect">
             <a:avLst/>
@@ -3583,8 +3784,8 @@
         </p:nvSpPr>
         <p:spPr>
           <a:xfrm>
-            <a:off x="277379" y="217419"/>
-            <a:ext cx="2203288" cy="400110"/>
+            <a:off x="228892" y="136719"/>
+            <a:ext cx="2743200" cy="400110"/>
           </a:xfrm>
           <a:prstGeom prst="rect">
             <a:avLst/>
@@ -3619,8 +3820,8 @@
         </p:nvSpPr>
         <p:spPr>
           <a:xfrm>
-            <a:off x="3063721" y="75334"/>
-            <a:ext cx="2203288" cy="707886"/>
+            <a:off x="3192102" y="133388"/>
+            <a:ext cx="2744055" cy="400110"/>
           </a:xfrm>
           <a:prstGeom prst="rect">
             <a:avLst/>
@@ -3655,8 +3856,8 @@
         </p:nvSpPr>
         <p:spPr>
           <a:xfrm>
-            <a:off x="3161952" y="1827659"/>
-            <a:ext cx="2006825" cy="646332"/>
+            <a:off x="3682087" y="1896642"/>
+            <a:ext cx="1920240" cy="640080"/>
           </a:xfrm>
           <a:prstGeom prst="rect">
             <a:avLst/>
@@ -3708,42 +3909,6 @@
       </p:sp>
       <p:sp>
         <p:nvSpPr>
-          <p:cNvPr id="11" name="TextBox 10">
-            <a:extLst>
-              <a:ext uri="{FF2B5EF4-FFF2-40B4-BE49-F238E27FC236}">
-                <a16:creationId xmlns:a16="http://schemas.microsoft.com/office/drawing/2014/main" id="{38704C78-E2F1-3123-FEAC-5275267CAEDC}"/>
-              </a:ext>
-            </a:extLst>
-          </p:cNvPr>
-          <p:cNvSpPr txBox="1"/>
-          <p:nvPr/>
-        </p:nvSpPr>
-        <p:spPr>
-          <a:xfrm>
-            <a:off x="5349883" y="3337714"/>
-            <a:ext cx="2203288" cy="400110"/>
-          </a:xfrm>
-          <a:prstGeom prst="rect">
-            <a:avLst/>
-          </a:prstGeom>
-          <a:noFill/>
-        </p:spPr>
-        <p:txBody>
-          <a:bodyPr wrap="square" rtlCol="0">
-            <a:spAutoFit/>
-          </a:bodyPr>
-          <a:lstStyle/>
-          <a:p>
-            <a:pPr algn="ctr"/>
-            <a:r>
-              <a:rPr lang="en-US" sz="2000" b="1" dirty="0"/>
-              <a:t>Kernel-Rate</a:t>
-            </a:r>
-          </a:p>
-        </p:txBody>
-      </p:sp>
-      <p:sp>
-        <p:nvSpPr>
           <p:cNvPr id="12" name="Rectangle 11">
             <a:extLst>
               <a:ext uri="{FF2B5EF4-FFF2-40B4-BE49-F238E27FC236}">
@@ -3756,8 +3921,8 @@
         </p:nvSpPr>
         <p:spPr>
           <a:xfrm>
-            <a:off x="5531231" y="949753"/>
-            <a:ext cx="2006825" cy="646332"/>
+            <a:off x="6698968" y="844684"/>
+            <a:ext cx="1920240" cy="640080"/>
           </a:xfrm>
           <a:prstGeom prst="rect">
             <a:avLst/>
@@ -3819,8 +3984,8 @@
         </p:nvSpPr>
         <p:spPr>
           <a:xfrm>
-            <a:off x="3139761" y="3071379"/>
-            <a:ext cx="2006825" cy="646331"/>
+            <a:off x="3682087" y="2951052"/>
+            <a:ext cx="1920240" cy="640080"/>
           </a:xfrm>
           <a:prstGeom prst="rect">
             <a:avLst/>
@@ -3884,8 +4049,8 @@
         </p:nvSpPr>
         <p:spPr>
           <a:xfrm>
-            <a:off x="5561872" y="3696176"/>
-            <a:ext cx="2006825" cy="1577947"/>
+            <a:off x="6696137" y="3095444"/>
+            <a:ext cx="1920240" cy="1577947"/>
           </a:xfrm>
           <a:prstGeom prst="rect">
             <a:avLst/>
@@ -3935,10 +4100,10 @@
       </p:sp>
       <p:sp>
         <p:nvSpPr>
-          <p:cNvPr id="15" name="TextBox 14">
-            <a:extLst>
-              <a:ext uri="{FF2B5EF4-FFF2-40B4-BE49-F238E27FC236}">
-                <a16:creationId xmlns:a16="http://schemas.microsoft.com/office/drawing/2014/main" id="{CCEBBE74-4CC7-8C7E-312F-D45E04C81017}"/>
+          <p:cNvPr id="17" name="TextBox 16">
+            <a:extLst>
+              <a:ext uri="{FF2B5EF4-FFF2-40B4-BE49-F238E27FC236}">
+                <a16:creationId xmlns:a16="http://schemas.microsoft.com/office/drawing/2014/main" id="{0ED99072-BE6C-C6ED-2867-FBA486153AC8}"/>
               </a:ext>
             </a:extLst>
           </p:cNvPr>
@@ -3947,8 +4112,8 @@
         </p:nvSpPr>
         <p:spPr>
           <a:xfrm>
-            <a:off x="5271347" y="297335"/>
-            <a:ext cx="2203288" cy="707886"/>
+            <a:off x="9312987" y="138975"/>
+            <a:ext cx="2743200" cy="402336"/>
           </a:xfrm>
           <a:prstGeom prst="rect">
             <a:avLst/>
@@ -3964,42 +4129,6 @@
             <a:pPr algn="ctr"/>
             <a:r>
               <a:rPr lang="en-US" sz="2000" b="1" dirty="0"/>
-              <a:t>Spatial Distribution</a:t>
-            </a:r>
-          </a:p>
-        </p:txBody>
-      </p:sp>
-      <p:sp>
-        <p:nvSpPr>
-          <p:cNvPr id="17" name="TextBox 16">
-            <a:extLst>
-              <a:ext uri="{FF2B5EF4-FFF2-40B4-BE49-F238E27FC236}">
-                <a16:creationId xmlns:a16="http://schemas.microsoft.com/office/drawing/2014/main" id="{0ED99072-BE6C-C6ED-2867-FBA486153AC8}"/>
-              </a:ext>
-            </a:extLst>
-          </p:cNvPr>
-          <p:cNvSpPr txBox="1"/>
-          <p:nvPr/>
-        </p:nvSpPr>
-        <p:spPr>
-          <a:xfrm>
-            <a:off x="7737495" y="202768"/>
-            <a:ext cx="2203288" cy="400110"/>
-          </a:xfrm>
-          <a:prstGeom prst="rect">
-            <a:avLst/>
-          </a:prstGeom>
-          <a:noFill/>
-        </p:spPr>
-        <p:txBody>
-          <a:bodyPr wrap="square" rtlCol="0">
-            <a:spAutoFit/>
-          </a:bodyPr>
-          <a:lstStyle/>
-          <a:p>
-            <a:pPr algn="ctr"/>
-            <a:r>
-              <a:rPr lang="en-US" sz="2000" b="1" dirty="0"/>
               <a:t>Model Fitting</a:t>
             </a:r>
           </a:p>
@@ -4019,8 +4148,8 @@
         </p:nvSpPr>
         <p:spPr>
           <a:xfrm>
-            <a:off x="7995632" y="1789068"/>
-            <a:ext cx="2006825" cy="646331"/>
+            <a:off x="9760275" y="1896642"/>
+            <a:ext cx="1920240" cy="640080"/>
           </a:xfrm>
           <a:prstGeom prst="rect">
             <a:avLst/>
@@ -4084,8 +4213,8 @@
         </p:nvSpPr>
         <p:spPr>
           <a:xfrm>
-            <a:off x="8012041" y="705975"/>
-            <a:ext cx="2006825" cy="647710"/>
+            <a:off x="9739516" y="844684"/>
+            <a:ext cx="1920240" cy="640080"/>
           </a:xfrm>
           <a:prstGeom prst="rect">
             <a:avLst/>
@@ -4149,8 +4278,8 @@
         </p:nvSpPr>
         <p:spPr>
           <a:xfrm>
-            <a:off x="6248013" y="5609581"/>
-            <a:ext cx="2203288" cy="707886"/>
+            <a:off x="6088284" y="5303520"/>
+            <a:ext cx="6103716" cy="400110"/>
           </a:xfrm>
           <a:prstGeom prst="rect">
             <a:avLst/>
@@ -4185,8 +4314,8 @@
         </p:nvSpPr>
         <p:spPr>
           <a:xfrm>
-            <a:off x="4182519" y="5577541"/>
-            <a:ext cx="2006825" cy="646332"/>
+            <a:off x="6966341" y="5819715"/>
+            <a:ext cx="1920240" cy="640080"/>
           </a:xfrm>
           <a:prstGeom prst="rect">
             <a:avLst/>
@@ -4250,8 +4379,8 @@
         </p:nvSpPr>
         <p:spPr>
           <a:xfrm>
-            <a:off x="8217867" y="5994302"/>
-            <a:ext cx="2006825" cy="646331"/>
+            <a:off x="9464274" y="5816721"/>
+            <a:ext cx="1920240" cy="640080"/>
           </a:xfrm>
           <a:prstGeom prst="rect">
             <a:avLst/>
@@ -4303,86 +4432,6 @@
       </p:sp>
       <p:sp>
         <p:nvSpPr>
-          <p:cNvPr id="27" name="TextBox 26">
-            <a:extLst>
-              <a:ext uri="{FF2B5EF4-FFF2-40B4-BE49-F238E27FC236}">
-                <a16:creationId xmlns:a16="http://schemas.microsoft.com/office/drawing/2014/main" id="{47C2BE80-C33D-09A9-DA76-8BEEE14C3DAE}"/>
-              </a:ext>
-            </a:extLst>
-          </p:cNvPr>
-          <p:cNvSpPr txBox="1"/>
-          <p:nvPr/>
-        </p:nvSpPr>
-        <p:spPr>
-          <a:xfrm>
-            <a:off x="168103" y="3756919"/>
-            <a:ext cx="1922146" cy="461665"/>
-          </a:xfrm>
-          <a:prstGeom prst="rect">
-            <a:avLst/>
-          </a:prstGeom>
-          <a:noFill/>
-        </p:spPr>
-        <p:txBody>
-          <a:bodyPr wrap="square">
-            <a:spAutoFit/>
-          </a:bodyPr>
-          <a:lstStyle/>
-          <a:p>
-            <a:r>
-              <a:rPr lang="en-US" sz="1200" dirty="0">
-                <a:solidFill>
-                  <a:schemeClr val="tx1"/>
-                </a:solidFill>
-              </a:rPr>
-              <a:t>Functionally Relevant Spatial Axis</a:t>
-            </a:r>
-            <a:endParaRPr lang="en-US" sz="1200" dirty="0"/>
-          </a:p>
-        </p:txBody>
-      </p:sp>
-      <p:sp>
-        <p:nvSpPr>
-          <p:cNvPr id="29" name="TextBox 28">
-            <a:extLst>
-              <a:ext uri="{FF2B5EF4-FFF2-40B4-BE49-F238E27FC236}">
-                <a16:creationId xmlns:a16="http://schemas.microsoft.com/office/drawing/2014/main" id="{A94B1E25-9B78-F8E6-E68F-2E0E5307BBF6}"/>
-              </a:ext>
-            </a:extLst>
-          </p:cNvPr>
-          <p:cNvSpPr txBox="1"/>
-          <p:nvPr/>
-        </p:nvSpPr>
-        <p:spPr>
-          <a:xfrm>
-            <a:off x="3591578" y="2552374"/>
-            <a:ext cx="1708879" cy="461665"/>
-          </a:xfrm>
-          <a:prstGeom prst="rect">
-            <a:avLst/>
-          </a:prstGeom>
-          <a:noFill/>
-        </p:spPr>
-        <p:txBody>
-          <a:bodyPr wrap="square">
-            <a:spAutoFit/>
-          </a:bodyPr>
-          <a:lstStyle/>
-          <a:p>
-            <a:r>
-              <a:rPr lang="en-US" sz="1200" dirty="0">
-                <a:solidFill>
-                  <a:schemeClr val="tx1"/>
-                </a:solidFill>
-              </a:rPr>
-              <a:t>Change-Point Likelihood Ratio Test</a:t>
-            </a:r>
-            <a:endParaRPr lang="en-US" sz="1200" dirty="0"/>
-          </a:p>
-        </p:txBody>
-      </p:sp>
-      <p:sp>
-        <p:nvSpPr>
           <p:cNvPr id="30" name="Rectangle 29">
             <a:extLst>
               <a:ext uri="{FF2B5EF4-FFF2-40B4-BE49-F238E27FC236}">
@@ -4395,8 +4444,8 @@
         </p:nvSpPr>
         <p:spPr>
           <a:xfrm>
-            <a:off x="3146744" y="4014560"/>
-            <a:ext cx="2006825" cy="646331"/>
+            <a:off x="3681100" y="4034188"/>
+            <a:ext cx="1920240" cy="640080"/>
           </a:xfrm>
           <a:prstGeom prst="rect">
             <a:avLst/>
@@ -4447,10 +4496,10 @@
       </p:sp>
       <p:sp>
         <p:nvSpPr>
-          <p:cNvPr id="32" name="TextBox 31">
-            <a:extLst>
-              <a:ext uri="{FF2B5EF4-FFF2-40B4-BE49-F238E27FC236}">
-                <a16:creationId xmlns:a16="http://schemas.microsoft.com/office/drawing/2014/main" id="{5CAD4632-0777-2D18-225E-2C6BA49260C7}"/>
+          <p:cNvPr id="35" name="TextBox 34">
+            <a:extLst>
+              <a:ext uri="{FF2B5EF4-FFF2-40B4-BE49-F238E27FC236}">
+                <a16:creationId xmlns:a16="http://schemas.microsoft.com/office/drawing/2014/main" id="{173E1837-9B21-091E-CB95-51C6BA675180}"/>
               </a:ext>
             </a:extLst>
           </p:cNvPr>
@@ -4459,88 +4508,8 @@
         </p:nvSpPr>
         <p:spPr>
           <a:xfrm>
-            <a:off x="5507234" y="1667160"/>
-            <a:ext cx="1745633" cy="461665"/>
-          </a:xfrm>
-          <a:prstGeom prst="rect">
-            <a:avLst/>
-          </a:prstGeom>
-          <a:noFill/>
-        </p:spPr>
-        <p:txBody>
-          <a:bodyPr wrap="square">
-            <a:spAutoFit/>
-          </a:bodyPr>
-          <a:lstStyle/>
-          <a:p>
-            <a:r>
-              <a:rPr lang="en-US" sz="1200" dirty="0">
-                <a:solidFill>
-                  <a:schemeClr val="tx1"/>
-                </a:solidFill>
-              </a:rPr>
-              <a:t>Weighted Linear Combination</a:t>
-            </a:r>
-            <a:endParaRPr lang="en-US" sz="1200" dirty="0"/>
-          </a:p>
-        </p:txBody>
-      </p:sp>
-      <p:sp>
-        <p:nvSpPr>
-          <p:cNvPr id="34" name="TextBox 33">
-            <a:extLst>
-              <a:ext uri="{FF2B5EF4-FFF2-40B4-BE49-F238E27FC236}">
-                <a16:creationId xmlns:a16="http://schemas.microsoft.com/office/drawing/2014/main" id="{EB16D47D-598A-DB06-24D5-F3AA7E343536}"/>
-              </a:ext>
-            </a:extLst>
-          </p:cNvPr>
-          <p:cNvSpPr txBox="1"/>
-          <p:nvPr/>
-        </p:nvSpPr>
-        <p:spPr>
-          <a:xfrm>
-            <a:off x="5507234" y="3023835"/>
-            <a:ext cx="1652917" cy="276999"/>
-          </a:xfrm>
-          <a:prstGeom prst="rect">
-            <a:avLst/>
-          </a:prstGeom>
-          <a:noFill/>
-        </p:spPr>
-        <p:txBody>
-          <a:bodyPr wrap="square">
-            <a:spAutoFit/>
-          </a:bodyPr>
-          <a:lstStyle/>
-          <a:p>
-            <a:r>
-              <a:rPr lang="en-US" sz="1200" dirty="0">
-                <a:solidFill>
-                  <a:schemeClr val="tx1"/>
-                </a:solidFill>
-              </a:rPr>
-              <a:t>Nonlinear Warping</a:t>
-            </a:r>
-            <a:endParaRPr lang="en-US" sz="1200" dirty="0"/>
-          </a:p>
-        </p:txBody>
-      </p:sp>
-      <p:sp>
-        <p:nvSpPr>
-          <p:cNvPr id="35" name="TextBox 34">
-            <a:extLst>
-              <a:ext uri="{FF2B5EF4-FFF2-40B4-BE49-F238E27FC236}">
-                <a16:creationId xmlns:a16="http://schemas.microsoft.com/office/drawing/2014/main" id="{173E1837-9B21-091E-CB95-51C6BA675180}"/>
-              </a:ext>
-            </a:extLst>
-          </p:cNvPr>
-          <p:cNvSpPr txBox="1"/>
-          <p:nvPr/>
-        </p:nvSpPr>
-        <p:spPr>
-          <a:xfrm>
-            <a:off x="1555824" y="5723550"/>
-            <a:ext cx="2203288" cy="707886"/>
+            <a:off x="0" y="5303520"/>
+            <a:ext cx="6088284" cy="400110"/>
           </a:xfrm>
           <a:prstGeom prst="rect">
             <a:avLst/>
@@ -4575,8 +4544,8 @@
         </p:nvSpPr>
         <p:spPr>
           <a:xfrm>
-            <a:off x="781290" y="5238458"/>
-            <a:ext cx="2006825" cy="646331"/>
+            <a:off x="795924" y="5822366"/>
+            <a:ext cx="1920240" cy="640080"/>
           </a:xfrm>
           <a:prstGeom prst="rect">
             <a:avLst/>
@@ -4638,8 +4607,8 @@
         </p:nvSpPr>
         <p:spPr>
           <a:xfrm>
-            <a:off x="339015" y="5800205"/>
-            <a:ext cx="2006825" cy="646331"/>
+            <a:off x="3293857" y="5813142"/>
+            <a:ext cx="1920240" cy="640080"/>
           </a:xfrm>
           <a:prstGeom prst="rect">
             <a:avLst/>
@@ -4716,7 +4685,7 @@
         </p:nvCxnSpPr>
         <p:spPr>
           <a:xfrm>
-            <a:off x="562708" y="1584056"/>
+            <a:off x="795924" y="1490634"/>
             <a:ext cx="0" cy="1576657"/>
           </a:xfrm>
           <a:prstGeom prst="straightConnector1">
@@ -4724,7 +4693,9 @@
           </a:prstGeom>
           <a:ln w="82550">
             <a:solidFill>
-              <a:schemeClr val="tx1"/>
+              <a:schemeClr val="accent2">
+                <a:lumMod val="75000"/>
+              </a:schemeClr>
             </a:solidFill>
             <a:tailEnd type="triangle"/>
           </a:ln>
@@ -4758,8 +4729,8 @@
         </p:nvSpPr>
         <p:spPr>
           <a:xfrm>
-            <a:off x="360946" y="1817933"/>
-            <a:ext cx="2006825" cy="646332"/>
+            <a:off x="580412" y="1883629"/>
+            <a:ext cx="1920240" cy="640080"/>
           </a:xfrm>
           <a:prstGeom prst="rect">
             <a:avLst/>
@@ -4823,7 +4794,7 @@
         </p:nvCxnSpPr>
         <p:spPr>
           <a:xfrm>
-            <a:off x="789412" y="2443451"/>
+            <a:off x="2224591" y="2536722"/>
             <a:ext cx="0" cy="568967"/>
           </a:xfrm>
           <a:prstGeom prst="straightConnector1">
@@ -4831,7 +4802,9 @@
           </a:prstGeom>
           <a:ln w="82550">
             <a:solidFill>
-              <a:schemeClr val="tx1"/>
+              <a:schemeClr val="accent2">
+                <a:lumMod val="75000"/>
+              </a:schemeClr>
             </a:solidFill>
             <a:tailEnd type="triangle"/>
           </a:ln>
@@ -4867,15 +4840,17 @@
         </p:nvCxnSpPr>
         <p:spPr>
           <a:xfrm>
-            <a:off x="2833775" y="1169111"/>
-            <a:ext cx="423307" cy="0"/>
+            <a:off x="3319911" y="1203835"/>
+            <a:ext cx="457200" cy="0"/>
           </a:xfrm>
           <a:prstGeom prst="straightConnector1">
             <a:avLst/>
           </a:prstGeom>
           <a:ln w="82550">
             <a:solidFill>
-              <a:schemeClr val="tx1"/>
+              <a:schemeClr val="bg2">
+                <a:lumMod val="50000"/>
+              </a:schemeClr>
             </a:solidFill>
             <a:tailEnd type="triangle"/>
           </a:ln>
@@ -4911,15 +4886,17 @@
         </p:nvCxnSpPr>
         <p:spPr>
           <a:xfrm>
-            <a:off x="2835178" y="2024896"/>
-            <a:ext cx="423307" cy="0"/>
+            <a:off x="3309739" y="2256390"/>
+            <a:ext cx="457200" cy="0"/>
           </a:xfrm>
           <a:prstGeom prst="straightConnector1">
             <a:avLst/>
           </a:prstGeom>
           <a:ln w="82550">
             <a:solidFill>
-              <a:schemeClr val="tx1"/>
+              <a:schemeClr val="bg2">
+                <a:lumMod val="50000"/>
+              </a:schemeClr>
             </a:solidFill>
             <a:tailEnd type="triangle"/>
           </a:ln>
@@ -4954,16 +4931,18 @@
           <p:nvPr/>
         </p:nvCxnSpPr>
         <p:spPr>
-          <a:xfrm flipH="1">
-            <a:off x="2825809" y="1134214"/>
-            <a:ext cx="39786" cy="3643647"/>
+          <a:xfrm>
+            <a:off x="3293858" y="1157363"/>
+            <a:ext cx="0" cy="3264166"/>
           </a:xfrm>
           <a:prstGeom prst="straightConnector1">
             <a:avLst/>
           </a:prstGeom>
           <a:ln w="82550">
             <a:solidFill>
-              <a:schemeClr val="tx1"/>
+              <a:schemeClr val="bg2">
+                <a:lumMod val="50000"/>
+              </a:schemeClr>
             </a:solidFill>
             <a:tailEnd type="none"/>
           </a:ln>
@@ -4999,15 +4978,17 @@
         </p:nvCxnSpPr>
         <p:spPr>
           <a:xfrm>
-            <a:off x="3373865" y="2469644"/>
-            <a:ext cx="0" cy="684092"/>
+            <a:off x="3859197" y="2526119"/>
+            <a:ext cx="0" cy="541172"/>
           </a:xfrm>
           <a:prstGeom prst="straightConnector1">
             <a:avLst/>
           </a:prstGeom>
           <a:ln w="82550">
             <a:solidFill>
-              <a:schemeClr val="tx1"/>
+              <a:schemeClr val="accent6">
+                <a:lumMod val="75000"/>
+              </a:schemeClr>
             </a:solidFill>
             <a:tailEnd type="triangle"/>
           </a:ln>
@@ -5042,16 +5023,18 @@
           <p:nvPr/>
         </p:nvCxnSpPr>
         <p:spPr>
-          <a:xfrm flipH="1">
-            <a:off x="5406458" y="2446346"/>
-            <a:ext cx="3189" cy="1887581"/>
+          <a:xfrm>
+            <a:off x="6369542" y="2213453"/>
+            <a:ext cx="0" cy="2184926"/>
           </a:xfrm>
           <a:prstGeom prst="straightConnector1">
             <a:avLst/>
           </a:prstGeom>
           <a:ln w="82550">
             <a:solidFill>
-              <a:schemeClr val="tx1"/>
+              <a:schemeClr val="accent6">
+                <a:lumMod val="75000"/>
+              </a:schemeClr>
             </a:solidFill>
             <a:tailEnd type="none"/>
           </a:ln>
@@ -5088,15 +5071,17 @@
         </p:nvCxnSpPr>
         <p:spPr>
           <a:xfrm flipH="1">
-            <a:off x="5153569" y="4334459"/>
-            <a:ext cx="240871" cy="3267"/>
+            <a:off x="5601340" y="4354228"/>
+            <a:ext cx="776311" cy="0"/>
           </a:xfrm>
           <a:prstGeom prst="straightConnector1">
             <a:avLst/>
           </a:prstGeom>
           <a:ln w="82550">
             <a:solidFill>
-              <a:schemeClr val="tx1"/>
+              <a:schemeClr val="accent6">
+                <a:lumMod val="75000"/>
+              </a:schemeClr>
             </a:solidFill>
             <a:tailEnd type="none"/>
           </a:ln>
@@ -5130,8 +5115,8 @@
         </p:nvSpPr>
         <p:spPr>
           <a:xfrm>
-            <a:off x="7913054" y="4807631"/>
-            <a:ext cx="2006825" cy="646331"/>
+            <a:off x="9739516" y="4029244"/>
+            <a:ext cx="1920240" cy="640080"/>
           </a:xfrm>
           <a:prstGeom prst="rect">
             <a:avLst/>
@@ -5196,16 +5181,18 @@
           <p:nvPr/>
         </p:nvCxnSpPr>
         <p:spPr>
-          <a:xfrm flipH="1">
-            <a:off x="9748206" y="2435399"/>
-            <a:ext cx="8925" cy="2541081"/>
+          <a:xfrm>
+            <a:off x="11469964" y="2539556"/>
+            <a:ext cx="0" cy="1625364"/>
           </a:xfrm>
           <a:prstGeom prst="straightConnector1">
             <a:avLst/>
           </a:prstGeom>
           <a:ln w="82550">
             <a:solidFill>
-              <a:schemeClr val="tx1"/>
+              <a:schemeClr val="accent5">
+                <a:lumMod val="75000"/>
+              </a:schemeClr>
             </a:solidFill>
             <a:tailEnd type="triangle"/>
           </a:ln>
@@ -5239,8 +5226,8 @@
         </p:nvSpPr>
         <p:spPr>
           <a:xfrm>
-            <a:off x="8027356" y="3020283"/>
-            <a:ext cx="2006825" cy="646331"/>
+            <a:off x="9739516" y="2972085"/>
+            <a:ext cx="1920240" cy="640080"/>
           </a:xfrm>
           <a:prstGeom prst="rect">
             <a:avLst/>
@@ -5304,16 +5291,18 @@
           <p:nvPr/>
         </p:nvCxnSpPr>
         <p:spPr>
-          <a:xfrm flipH="1">
-            <a:off x="8211065" y="1353685"/>
-            <a:ext cx="6802" cy="1692873"/>
+          <a:xfrm>
+            <a:off x="9968081" y="1480785"/>
+            <a:ext cx="387" cy="1614659"/>
           </a:xfrm>
           <a:prstGeom prst="straightConnector1">
             <a:avLst/>
           </a:prstGeom>
           <a:ln w="82550">
             <a:solidFill>
-              <a:schemeClr val="tx1"/>
+              <a:schemeClr val="accent5">
+                <a:lumMod val="75000"/>
+              </a:schemeClr>
             </a:solidFill>
             <a:tailEnd type="triangle"/>
           </a:ln>
@@ -5349,15 +5338,17 @@
         </p:nvCxnSpPr>
         <p:spPr>
           <a:xfrm>
-            <a:off x="9412773" y="3666614"/>
-            <a:ext cx="0" cy="1271847"/>
+            <a:off x="11195046" y="3612165"/>
+            <a:ext cx="0" cy="552755"/>
           </a:xfrm>
           <a:prstGeom prst="straightConnector1">
             <a:avLst/>
           </a:prstGeom>
           <a:ln w="82550">
             <a:solidFill>
-              <a:schemeClr val="tx1"/>
+              <a:schemeClr val="accent5">
+                <a:lumMod val="75000"/>
+              </a:schemeClr>
             </a:solidFill>
             <a:tailEnd type="triangle"/>
           </a:ln>
@@ -5393,15 +5384,17 @@
         </p:nvCxnSpPr>
         <p:spPr>
           <a:xfrm>
-            <a:off x="5267009" y="1134214"/>
-            <a:ext cx="0" cy="2260330"/>
+            <a:off x="6134305" y="1167539"/>
+            <a:ext cx="0" cy="2200694"/>
           </a:xfrm>
           <a:prstGeom prst="straightConnector1">
             <a:avLst/>
           </a:prstGeom>
           <a:ln w="82550">
             <a:solidFill>
-              <a:schemeClr val="tx1"/>
+              <a:schemeClr val="accent6">
+                <a:lumMod val="75000"/>
+              </a:schemeClr>
             </a:solidFill>
             <a:tailEnd type="none"/>
           </a:ln>
@@ -5437,15 +5430,17 @@
         </p:nvCxnSpPr>
         <p:spPr>
           <a:xfrm flipH="1">
-            <a:off x="5104499" y="3324002"/>
-            <a:ext cx="131023" cy="0"/>
+            <a:off x="5589831" y="3368903"/>
+            <a:ext cx="576072" cy="0"/>
           </a:xfrm>
           <a:prstGeom prst="straightConnector1">
             <a:avLst/>
           </a:prstGeom>
           <a:ln w="82550">
             <a:solidFill>
-              <a:schemeClr val="tx1"/>
+              <a:schemeClr val="accent6">
+                <a:lumMod val="75000"/>
+              </a:schemeClr>
             </a:solidFill>
             <a:tailEnd type="none"/>
           </a:ln>
@@ -5481,15 +5476,17 @@
         </p:nvCxnSpPr>
         <p:spPr>
           <a:xfrm>
-            <a:off x="5296746" y="1228495"/>
-            <a:ext cx="420976" cy="0"/>
+            <a:off x="6169305" y="1203949"/>
+            <a:ext cx="658368" cy="0"/>
           </a:xfrm>
           <a:prstGeom prst="straightConnector1">
             <a:avLst/>
           </a:prstGeom>
           <a:ln w="82550">
             <a:solidFill>
-              <a:schemeClr val="tx1"/>
+              <a:schemeClr val="accent6">
+                <a:lumMod val="75000"/>
+              </a:schemeClr>
             </a:solidFill>
             <a:tailEnd type="triangle"/>
           </a:ln>
@@ -5525,15 +5522,15 @@
         </p:nvCxnSpPr>
         <p:spPr>
           <a:xfrm>
-            <a:off x="7333537" y="2808102"/>
-            <a:ext cx="16120" cy="929722"/>
+            <a:off x="8398091" y="2541909"/>
+            <a:ext cx="0" cy="699002"/>
           </a:xfrm>
           <a:prstGeom prst="straightConnector1">
             <a:avLst/>
           </a:prstGeom>
           <a:ln w="82550">
             <a:solidFill>
-              <a:schemeClr val="tx1"/>
+              <a:srgbClr val="C00000"/>
             </a:solidFill>
             <a:tailEnd type="triangle"/>
           </a:ln>
@@ -5567,8 +5564,8 @@
         </p:nvSpPr>
         <p:spPr>
           <a:xfrm>
-            <a:off x="5507878" y="2198483"/>
-            <a:ext cx="2006825" cy="646331"/>
+            <a:off x="6693574" y="1896642"/>
+            <a:ext cx="1920240" cy="640080"/>
           </a:xfrm>
           <a:prstGeom prst="rect">
             <a:avLst/>
@@ -5632,15 +5629,17 @@
         </p:nvCxnSpPr>
         <p:spPr>
           <a:xfrm>
-            <a:off x="5386810" y="2446346"/>
-            <a:ext cx="420976" cy="0"/>
+            <a:off x="6377651" y="2248179"/>
+            <a:ext cx="447903" cy="0"/>
           </a:xfrm>
           <a:prstGeom prst="straightConnector1">
             <a:avLst/>
           </a:prstGeom>
           <a:ln w="82550">
             <a:solidFill>
-              <a:schemeClr val="tx1"/>
+              <a:schemeClr val="accent6">
+                <a:lumMod val="75000"/>
+              </a:schemeClr>
             </a:solidFill>
             <a:tailEnd type="triangle"/>
           </a:ln>
@@ -5674,8 +5673,8 @@
         </p:nvSpPr>
         <p:spPr>
           <a:xfrm>
-            <a:off x="5234287" y="0"/>
-            <a:ext cx="2203288" cy="400110"/>
+            <a:off x="6255844" y="139398"/>
+            <a:ext cx="2743200" cy="400110"/>
           </a:xfrm>
           <a:prstGeom prst="rect">
             <a:avLst/>
@@ -5690,9 +5689,10 @@
           <a:p>
             <a:pPr algn="ctr"/>
             <a:r>
-              <a:rPr lang="en-US" sz="2000" b="1" dirty="0"/>
+              <a:rPr lang="en-US" sz="2000" b="1"/>
               <a:t>Prediction</a:t>
             </a:r>
+            <a:endParaRPr lang="en-US" sz="2000" b="1" dirty="0"/>
           </a:p>
         </p:txBody>
       </p:sp>
@@ -5712,15 +5712,15 @@
         </p:nvCxnSpPr>
         <p:spPr>
           <a:xfrm>
-            <a:off x="7252867" y="1364393"/>
-            <a:ext cx="0" cy="944529"/>
+            <a:off x="8398444" y="1480165"/>
+            <a:ext cx="0" cy="510681"/>
           </a:xfrm>
           <a:prstGeom prst="straightConnector1">
             <a:avLst/>
           </a:prstGeom>
           <a:ln w="82550">
             <a:solidFill>
-              <a:schemeClr val="tx1"/>
+              <a:srgbClr val="C00000"/>
             </a:solidFill>
             <a:tailEnd type="triangle"/>
           </a:ln>
@@ -5756,15 +5756,15 @@
         </p:nvCxnSpPr>
         <p:spPr>
           <a:xfrm flipH="1">
-            <a:off x="7745539" y="1228495"/>
-            <a:ext cx="21321" cy="3291889"/>
+            <a:off x="9435185" y="1290600"/>
+            <a:ext cx="21321" cy="2560320"/>
           </a:xfrm>
           <a:prstGeom prst="straightConnector1">
             <a:avLst/>
           </a:prstGeom>
           <a:ln w="82550">
             <a:solidFill>
-              <a:schemeClr val="tx1"/>
+              <a:srgbClr val="C00000"/>
             </a:solidFill>
             <a:tailEnd type="none"/>
           </a:ln>
@@ -5800,15 +5800,15 @@
         </p:nvCxnSpPr>
         <p:spPr>
           <a:xfrm>
-            <a:off x="7568697" y="907941"/>
-            <a:ext cx="537367" cy="0"/>
+            <a:off x="9225023" y="1025449"/>
+            <a:ext cx="657089" cy="0"/>
           </a:xfrm>
           <a:prstGeom prst="straightConnector1">
             <a:avLst/>
           </a:prstGeom>
           <a:ln w="82550">
             <a:solidFill>
-              <a:schemeClr val="tx1"/>
+              <a:srgbClr val="C00000"/>
             </a:solidFill>
             <a:tailEnd type="triangle"/>
           </a:ln>
@@ -5844,7 +5844,7 @@
         </p:nvCxnSpPr>
         <p:spPr>
           <a:xfrm>
-            <a:off x="7723182" y="2214785"/>
+            <a:off x="9464274" y="2254649"/>
             <a:ext cx="379744" cy="0"/>
           </a:xfrm>
           <a:prstGeom prst="straightConnector1">
@@ -5852,7 +5852,7 @@
           </a:prstGeom>
           <a:ln w="82550">
             <a:solidFill>
-              <a:schemeClr val="tx1"/>
+              <a:srgbClr val="C00000"/>
             </a:solidFill>
             <a:tailEnd type="triangle"/>
           </a:ln>
@@ -5887,16 +5887,16 @@
           <p:nvPr/>
         </p:nvCxnSpPr>
         <p:spPr>
-          <a:xfrm flipH="1">
-            <a:off x="7606530" y="902263"/>
-            <a:ext cx="5805" cy="1681030"/>
+          <a:xfrm>
+            <a:off x="9209324" y="983310"/>
+            <a:ext cx="0" cy="1320052"/>
           </a:xfrm>
           <a:prstGeom prst="straightConnector1">
             <a:avLst/>
           </a:prstGeom>
           <a:ln w="82550">
             <a:solidFill>
-              <a:schemeClr val="tx1"/>
+              <a:srgbClr val="C00000"/>
             </a:solidFill>
             <a:tailEnd type="none"/>
           </a:ln>
@@ -5932,15 +5932,15 @@
         </p:nvCxnSpPr>
         <p:spPr>
           <a:xfrm flipH="1">
-            <a:off x="7553171" y="4485149"/>
-            <a:ext cx="161499" cy="0"/>
+            <a:off x="8611565" y="3829766"/>
+            <a:ext cx="844951" cy="0"/>
           </a:xfrm>
           <a:prstGeom prst="straightConnector1">
             <a:avLst/>
           </a:prstGeom>
           <a:ln w="82550">
             <a:solidFill>
-              <a:schemeClr val="tx1"/>
+              <a:srgbClr val="C00000"/>
             </a:solidFill>
             <a:tailEnd type="none"/>
           </a:ln>
@@ -5976,7 +5976,7 @@
         </p:nvCxnSpPr>
         <p:spPr>
           <a:xfrm>
-            <a:off x="7685088" y="1228495"/>
+            <a:off x="9426181" y="1316378"/>
             <a:ext cx="455931" cy="0"/>
           </a:xfrm>
           <a:prstGeom prst="straightConnector1">
@@ -5984,51 +5984,7 @@
           </a:prstGeom>
           <a:ln w="82550">
             <a:solidFill>
-              <a:schemeClr val="tx1"/>
-            </a:solidFill>
-            <a:tailEnd type="triangle"/>
-          </a:ln>
-        </p:spPr>
-        <p:style>
-          <a:lnRef idx="2">
-            <a:schemeClr val="accent1"/>
-          </a:lnRef>
-          <a:fillRef idx="0">
-            <a:schemeClr val="accent1"/>
-          </a:fillRef>
-          <a:effectRef idx="1">
-            <a:schemeClr val="accent1"/>
-          </a:effectRef>
-          <a:fontRef idx="minor">
-            <a:schemeClr val="tx1"/>
-          </a:fontRef>
-        </p:style>
-      </p:cxnSp>
-      <p:cxnSp>
-        <p:nvCxnSpPr>
-          <p:cNvPr id="122" name="Straight Arrow Connector 121">
-            <a:extLst>
-              <a:ext uri="{FF2B5EF4-FFF2-40B4-BE49-F238E27FC236}">
-                <a16:creationId xmlns:a16="http://schemas.microsoft.com/office/drawing/2014/main" id="{580F430A-39CE-3DB1-0F6A-EAC4B20BFC05}"/>
-              </a:ext>
-            </a:extLst>
-          </p:cNvPr>
-          <p:cNvCxnSpPr>
-            <a:cxnSpLocks/>
-          </p:cNvCxnSpPr>
-          <p:nvPr/>
-        </p:nvCxnSpPr>
-        <p:spPr>
-          <a:xfrm flipH="1">
-            <a:off x="1820161" y="6123370"/>
-            <a:ext cx="712786" cy="0"/>
-          </a:xfrm>
-          <a:prstGeom prst="straightConnector1">
-            <a:avLst/>
-          </a:prstGeom>
-          <a:ln w="82550">
-            <a:solidFill>
-              <a:schemeClr val="tx1"/>
+              <a:srgbClr val="C00000"/>
             </a:solidFill>
             <a:tailEnd type="triangle"/>
           </a:ln>
@@ -6064,8 +6020,8 @@
         </p:nvCxnSpPr>
         <p:spPr>
           <a:xfrm flipH="1">
-            <a:off x="4143173" y="5393919"/>
-            <a:ext cx="3782681" cy="0"/>
+            <a:off x="4727447" y="4887412"/>
+            <a:ext cx="6108192" cy="0"/>
           </a:xfrm>
           <a:prstGeom prst="straightConnector1">
             <a:avLst/>
@@ -6109,16 +6065,18 @@
           <p:nvPr/>
         </p:nvCxnSpPr>
         <p:spPr>
-          <a:xfrm flipH="1" flipV="1">
-            <a:off x="2596882" y="6429678"/>
-            <a:ext cx="375210" cy="16858"/>
+          <a:xfrm>
+            <a:off x="939959" y="4835591"/>
+            <a:ext cx="0" cy="1071433"/>
           </a:xfrm>
           <a:prstGeom prst="straightConnector1">
             <a:avLst/>
           </a:prstGeom>
           <a:ln w="82550">
             <a:solidFill>
-              <a:schemeClr val="tx1"/>
+              <a:schemeClr val="accent6">
+                <a:lumMod val="75000"/>
+              </a:schemeClr>
             </a:solidFill>
             <a:tailEnd type="triangle"/>
           </a:ln>
@@ -6154,59 +6112,17 @@
         </p:nvCxnSpPr>
         <p:spPr>
           <a:xfrm>
-            <a:off x="2865595" y="3295681"/>
-            <a:ext cx="456529" cy="0"/>
+            <a:off x="3293857" y="3284107"/>
+            <a:ext cx="457200" cy="0"/>
           </a:xfrm>
           <a:prstGeom prst="straightConnector1">
             <a:avLst/>
           </a:prstGeom>
           <a:ln w="82550">
             <a:solidFill>
-              <a:schemeClr val="tx1"/>
-            </a:solidFill>
-            <a:tailEnd type="triangle"/>
-          </a:ln>
-        </p:spPr>
-        <p:style>
-          <a:lnRef idx="2">
-            <a:schemeClr val="accent1"/>
-          </a:lnRef>
-          <a:fillRef idx="0">
-            <a:schemeClr val="accent1"/>
-          </a:fillRef>
-          <a:effectRef idx="1">
-            <a:schemeClr val="accent1"/>
-          </a:effectRef>
-          <a:fontRef idx="minor">
-            <a:schemeClr val="tx1"/>
-          </a:fontRef>
-        </p:style>
-      </p:cxnSp>
-      <p:cxnSp>
-        <p:nvCxnSpPr>
-          <p:cNvPr id="137" name="Straight Arrow Connector 136">
-            <a:extLst>
-              <a:ext uri="{FF2B5EF4-FFF2-40B4-BE49-F238E27FC236}">
-                <a16:creationId xmlns:a16="http://schemas.microsoft.com/office/drawing/2014/main" id="{937CD67D-1F51-D69A-A754-A92BC3AB24BF}"/>
-              </a:ext>
-            </a:extLst>
-          </p:cNvPr>
-          <p:cNvCxnSpPr>
-            <a:cxnSpLocks/>
-          </p:cNvCxnSpPr>
-          <p:nvPr/>
-        </p:nvCxnSpPr>
-        <p:spPr>
-          <a:xfrm flipV="1">
-            <a:off x="5024288" y="3490526"/>
-            <a:ext cx="0" cy="2233024"/>
-          </a:xfrm>
-          <a:prstGeom prst="straightConnector1">
-            <a:avLst/>
-          </a:prstGeom>
-          <a:ln w="82550">
-            <a:solidFill>
-              <a:schemeClr val="tx1"/>
+              <a:schemeClr val="bg2">
+                <a:lumMod val="50000"/>
+              </a:schemeClr>
             </a:solidFill>
             <a:tailEnd type="triangle"/>
           </a:ln>
@@ -6242,15 +6158,18 @@
         </p:nvCxnSpPr>
         <p:spPr>
           <a:xfrm flipV="1">
-            <a:off x="4786860" y="4456464"/>
-            <a:ext cx="0" cy="1343741"/>
+            <a:off x="5225893" y="4536089"/>
+            <a:ext cx="0" cy="1041751"/>
           </a:xfrm>
           <a:prstGeom prst="straightConnector1">
             <a:avLst/>
           </a:prstGeom>
           <a:ln w="82550">
             <a:solidFill>
-              <a:schemeClr val="tx1"/>
+              <a:schemeClr val="tx2">
+                <a:lumMod val="50000"/>
+                <a:lumOff val="50000"/>
+              </a:schemeClr>
             </a:solidFill>
             <a:tailEnd type="triangle"/>
           </a:ln>
@@ -6286,15 +6205,18 @@
         </p:nvCxnSpPr>
         <p:spPr>
           <a:xfrm>
-            <a:off x="10343575" y="2112233"/>
-            <a:ext cx="57233" cy="4175875"/>
+            <a:off x="11887200" y="2216681"/>
+            <a:ext cx="0" cy="3950208"/>
           </a:xfrm>
           <a:prstGeom prst="straightConnector1">
             <a:avLst/>
           </a:prstGeom>
           <a:ln w="82550">
             <a:solidFill>
-              <a:schemeClr val="tx1"/>
+              <a:schemeClr val="tx2">
+                <a:lumMod val="50000"/>
+                <a:lumOff val="50000"/>
+              </a:schemeClr>
             </a:solidFill>
             <a:tailEnd type="none"/>
           </a:ln>
@@ -6330,15 +6252,18 @@
         </p:nvCxnSpPr>
         <p:spPr>
           <a:xfrm flipH="1">
-            <a:off x="9891573" y="2112233"/>
-            <a:ext cx="509235" cy="0"/>
+            <a:off x="11546952" y="2254649"/>
+            <a:ext cx="298259" cy="0"/>
           </a:xfrm>
           <a:prstGeom prst="straightConnector1">
             <a:avLst/>
           </a:prstGeom>
           <a:ln w="82550">
             <a:solidFill>
-              <a:schemeClr val="tx1"/>
+              <a:schemeClr val="tx2">
+                <a:lumMod val="50000"/>
+                <a:lumOff val="50000"/>
+              </a:schemeClr>
             </a:solidFill>
             <a:tailEnd type="triangle"/>
           </a:ln>
@@ -6374,15 +6299,17 @@
         </p:nvCxnSpPr>
         <p:spPr>
           <a:xfrm flipH="1">
-            <a:off x="2402011" y="4441156"/>
-            <a:ext cx="467683" cy="0"/>
+            <a:off x="2517758" y="4383282"/>
+            <a:ext cx="769452" cy="0"/>
           </a:xfrm>
           <a:prstGeom prst="straightConnector1">
             <a:avLst/>
           </a:prstGeom>
           <a:ln w="82550">
             <a:solidFill>
-              <a:schemeClr val="tx1"/>
+              <a:schemeClr val="bg2">
+                <a:lumMod val="50000"/>
+              </a:schemeClr>
             </a:solidFill>
             <a:tailEnd type="none"/>
           </a:ln>
@@ -6418,15 +6345,18 @@
         </p:nvCxnSpPr>
         <p:spPr>
           <a:xfrm flipH="1">
-            <a:off x="10112463" y="6288108"/>
-            <a:ext cx="317639" cy="0"/>
+            <a:off x="11384514" y="6120244"/>
+            <a:ext cx="502686" cy="0"/>
           </a:xfrm>
           <a:prstGeom prst="straightConnector1">
             <a:avLst/>
           </a:prstGeom>
           <a:ln w="82550">
             <a:solidFill>
-              <a:schemeClr val="tx1"/>
+              <a:schemeClr val="tx2">
+                <a:lumMod val="50000"/>
+                <a:lumOff val="50000"/>
+              </a:schemeClr>
             </a:solidFill>
             <a:tailEnd type="none"/>
           </a:ln>
@@ -6462,59 +6392,15 @@
         </p:nvCxnSpPr>
         <p:spPr>
           <a:xfrm flipH="1">
-            <a:off x="7349657" y="2552374"/>
-            <a:ext cx="256873" cy="0"/>
+            <a:off x="8610980" y="2263032"/>
+            <a:ext cx="602468" cy="0"/>
           </a:xfrm>
           <a:prstGeom prst="straightConnector1">
             <a:avLst/>
           </a:prstGeom>
           <a:ln w="82550">
             <a:solidFill>
-              <a:schemeClr val="tx1"/>
-            </a:solidFill>
-            <a:tailEnd type="none"/>
-          </a:ln>
-        </p:spPr>
-        <p:style>
-          <a:lnRef idx="2">
-            <a:schemeClr val="accent1"/>
-          </a:lnRef>
-          <a:fillRef idx="0">
-            <a:schemeClr val="accent1"/>
-          </a:fillRef>
-          <a:effectRef idx="1">
-            <a:schemeClr val="accent1"/>
-          </a:effectRef>
-          <a:fontRef idx="minor">
-            <a:schemeClr val="tx1"/>
-          </a:fontRef>
-        </p:style>
-      </p:cxnSp>
-      <p:cxnSp>
-        <p:nvCxnSpPr>
-          <p:cNvPr id="211" name="Straight Arrow Connector 210">
-            <a:extLst>
-              <a:ext uri="{FF2B5EF4-FFF2-40B4-BE49-F238E27FC236}">
-                <a16:creationId xmlns:a16="http://schemas.microsoft.com/office/drawing/2014/main" id="{142A556C-5916-BF90-C799-DCF344F5BFF2}"/>
-              </a:ext>
-            </a:extLst>
-          </p:cNvPr>
-          <p:cNvCxnSpPr>
-            <a:cxnSpLocks/>
-          </p:cNvCxnSpPr>
-          <p:nvPr/>
-        </p:nvCxnSpPr>
-        <p:spPr>
-          <a:xfrm flipH="1">
-            <a:off x="7437575" y="1209619"/>
-            <a:ext cx="195879" cy="0"/>
-          </a:xfrm>
-          <a:prstGeom prst="straightConnector1">
-            <a:avLst/>
-          </a:prstGeom>
-          <a:ln w="82550">
-            <a:solidFill>
-              <a:schemeClr val="tx1"/>
+              <a:srgbClr val="C00000"/>
             </a:solidFill>
             <a:tailEnd type="none"/>
           </a:ln>
@@ -6550,8 +6436,8 @@
         </p:nvCxnSpPr>
         <p:spPr>
           <a:xfrm flipV="1">
-            <a:off x="4182519" y="4590570"/>
-            <a:ext cx="0" cy="863392"/>
+            <a:off x="4760449" y="4531298"/>
+            <a:ext cx="0" cy="331517"/>
           </a:xfrm>
           <a:prstGeom prst="straightConnector1">
             <a:avLst/>
@@ -6594,8 +6480,8 @@
         </p:nvSpPr>
         <p:spPr>
           <a:xfrm>
-            <a:off x="325217" y="4229652"/>
-            <a:ext cx="2064026" cy="437431"/>
+            <a:off x="582933" y="4035791"/>
+            <a:ext cx="1920240" cy="640080"/>
           </a:xfrm>
           <a:prstGeom prst="rect">
             <a:avLst/>
@@ -6660,7 +6546,7 @@
         </p:nvCxnSpPr>
         <p:spPr>
           <a:xfrm flipH="1">
-            <a:off x="2135909" y="3640820"/>
+            <a:off x="2209800" y="3581400"/>
             <a:ext cx="14791" cy="568967"/>
           </a:xfrm>
           <a:prstGeom prst="straightConnector1">
@@ -6668,7 +6554,9 @@
           </a:prstGeom>
           <a:ln w="82550">
             <a:solidFill>
-              <a:schemeClr val="tx1"/>
+              <a:schemeClr val="accent2">
+                <a:lumMod val="75000"/>
+              </a:schemeClr>
             </a:solidFill>
             <a:tailEnd type="triangle"/>
           </a:ln>
@@ -6704,15 +6592,17 @@
         </p:nvCxnSpPr>
         <p:spPr>
           <a:xfrm flipH="1">
-            <a:off x="2789399" y="4777861"/>
-            <a:ext cx="1108833" cy="0"/>
+            <a:off x="1600200" y="5212080"/>
+            <a:ext cx="9098280" cy="0"/>
           </a:xfrm>
           <a:prstGeom prst="straightConnector1">
             <a:avLst/>
           </a:prstGeom>
           <a:ln w="82550">
             <a:solidFill>
-              <a:schemeClr val="tx1"/>
+              <a:schemeClr val="bg2">
+                <a:lumMod val="50000"/>
+              </a:schemeClr>
             </a:solidFill>
             <a:tailEnd type="none"/>
           </a:ln>
@@ -6747,16 +6637,18 @@
           <p:nvPr/>
         </p:nvCxnSpPr>
         <p:spPr>
-          <a:xfrm>
-            <a:off x="3898232" y="4744096"/>
-            <a:ext cx="0" cy="1656520"/>
+          <a:xfrm flipH="1">
+            <a:off x="902825" y="4862815"/>
+            <a:ext cx="3661304" cy="0"/>
           </a:xfrm>
           <a:prstGeom prst="straightConnector1">
             <a:avLst/>
           </a:prstGeom>
           <a:ln w="82550">
             <a:solidFill>
-              <a:schemeClr val="tx1"/>
+              <a:schemeClr val="accent6">
+                <a:lumMod val="75000"/>
+              </a:schemeClr>
             </a:solidFill>
             <a:tailEnd type="none"/>
           </a:ln>
@@ -6792,15 +6684,17 @@
         </p:nvCxnSpPr>
         <p:spPr>
           <a:xfrm>
-            <a:off x="3898232" y="6362731"/>
-            <a:ext cx="4407689" cy="37885"/>
+            <a:off x="10668000" y="5212080"/>
+            <a:ext cx="0" cy="731520"/>
           </a:xfrm>
           <a:prstGeom prst="straightConnector1">
             <a:avLst/>
           </a:prstGeom>
           <a:ln w="82550">
             <a:solidFill>
-              <a:schemeClr val="tx1"/>
+              <a:schemeClr val="bg2">
+                <a:lumMod val="50000"/>
+              </a:schemeClr>
             </a:solidFill>
             <a:tailEnd type="triangle"/>
           </a:ln>
@@ -6820,6 +6714,1772 @@
           </a:fontRef>
         </p:style>
       </p:cxnSp>
+      <p:cxnSp>
+        <p:nvCxnSpPr>
+          <p:cNvPr id="298" name="Straight Arrow Connector 297">
+            <a:extLst>
+              <a:ext uri="{FF2B5EF4-FFF2-40B4-BE49-F238E27FC236}">
+                <a16:creationId xmlns:a16="http://schemas.microsoft.com/office/drawing/2014/main" id="{0CEDBE68-97D9-C58D-6A92-B77421D9314A}"/>
+              </a:ext>
+            </a:extLst>
+          </p:cNvPr>
+          <p:cNvCxnSpPr>
+            <a:cxnSpLocks/>
+          </p:cNvCxnSpPr>
+          <p:nvPr/>
+        </p:nvCxnSpPr>
+        <p:spPr>
+          <a:xfrm flipV="1">
+            <a:off x="10812684" y="4664596"/>
+            <a:ext cx="0" cy="237744"/>
+          </a:xfrm>
+          <a:prstGeom prst="straightConnector1">
+            <a:avLst/>
+          </a:prstGeom>
+          <a:ln w="82550">
+            <a:solidFill>
+              <a:schemeClr val="accent5">
+                <a:lumMod val="75000"/>
+              </a:schemeClr>
+            </a:solidFill>
+            <a:tailEnd type="none"/>
+          </a:ln>
+        </p:spPr>
+        <p:style>
+          <a:lnRef idx="2">
+            <a:schemeClr val="accent1"/>
+          </a:lnRef>
+          <a:fillRef idx="0">
+            <a:schemeClr val="accent1"/>
+          </a:fillRef>
+          <a:effectRef idx="1">
+            <a:schemeClr val="accent1"/>
+          </a:effectRef>
+          <a:fontRef idx="minor">
+            <a:schemeClr val="tx1"/>
+          </a:fontRef>
+        </p:style>
+      </p:cxnSp>
+      <p:cxnSp>
+        <p:nvCxnSpPr>
+          <p:cNvPr id="302" name="Straight Arrow Connector 301">
+            <a:extLst>
+              <a:ext uri="{FF2B5EF4-FFF2-40B4-BE49-F238E27FC236}">
+                <a16:creationId xmlns:a16="http://schemas.microsoft.com/office/drawing/2014/main" id="{ECBDE5CF-2900-A2BC-23D6-98653B3A9E7A}"/>
+              </a:ext>
+            </a:extLst>
+          </p:cNvPr>
+          <p:cNvCxnSpPr>
+            <a:cxnSpLocks/>
+          </p:cNvCxnSpPr>
+          <p:nvPr/>
+        </p:nvCxnSpPr>
+        <p:spPr>
+          <a:xfrm flipH="1" flipV="1">
+            <a:off x="5183737" y="5575650"/>
+            <a:ext cx="2093267" cy="2190"/>
+          </a:xfrm>
+          <a:prstGeom prst="straightConnector1">
+            <a:avLst/>
+          </a:prstGeom>
+          <a:ln w="82550">
+            <a:solidFill>
+              <a:schemeClr val="tx2">
+                <a:lumMod val="50000"/>
+                <a:lumOff val="50000"/>
+              </a:schemeClr>
+            </a:solidFill>
+            <a:tailEnd type="none"/>
+          </a:ln>
+        </p:spPr>
+        <p:style>
+          <a:lnRef idx="2">
+            <a:schemeClr val="accent1"/>
+          </a:lnRef>
+          <a:fillRef idx="0">
+            <a:schemeClr val="accent1"/>
+          </a:fillRef>
+          <a:effectRef idx="1">
+            <a:schemeClr val="accent1"/>
+          </a:effectRef>
+          <a:fontRef idx="minor">
+            <a:schemeClr val="tx1"/>
+          </a:fontRef>
+        </p:style>
+      </p:cxnSp>
+      <p:cxnSp>
+        <p:nvCxnSpPr>
+          <p:cNvPr id="317" name="Straight Arrow Connector 316">
+            <a:extLst>
+              <a:ext uri="{FF2B5EF4-FFF2-40B4-BE49-F238E27FC236}">
+                <a16:creationId xmlns:a16="http://schemas.microsoft.com/office/drawing/2014/main" id="{210C3CEE-7BC2-5E08-C2AF-3962D1B58A15}"/>
+              </a:ext>
+            </a:extLst>
+          </p:cNvPr>
+          <p:cNvCxnSpPr>
+            <a:cxnSpLocks/>
+          </p:cNvCxnSpPr>
+          <p:nvPr/>
+        </p:nvCxnSpPr>
+        <p:spPr>
+          <a:xfrm>
+            <a:off x="1600200" y="4681728"/>
+            <a:ext cx="0" cy="557784"/>
+          </a:xfrm>
+          <a:prstGeom prst="straightConnector1">
+            <a:avLst/>
+          </a:prstGeom>
+          <a:ln w="82550">
+            <a:solidFill>
+              <a:schemeClr val="bg2">
+                <a:lumMod val="50000"/>
+              </a:schemeClr>
+            </a:solidFill>
+            <a:tailEnd type="none"/>
+          </a:ln>
+        </p:spPr>
+        <p:style>
+          <a:lnRef idx="2">
+            <a:schemeClr val="accent1"/>
+          </a:lnRef>
+          <a:fillRef idx="0">
+            <a:schemeClr val="accent1"/>
+          </a:fillRef>
+          <a:effectRef idx="1">
+            <a:schemeClr val="accent1"/>
+          </a:effectRef>
+          <a:fontRef idx="minor">
+            <a:schemeClr val="tx1"/>
+          </a:fontRef>
+        </p:style>
+      </p:cxnSp>
+      <p:cxnSp>
+        <p:nvCxnSpPr>
+          <p:cNvPr id="326" name="Straight Arrow Connector 325">
+            <a:extLst>
+              <a:ext uri="{FF2B5EF4-FFF2-40B4-BE49-F238E27FC236}">
+                <a16:creationId xmlns:a16="http://schemas.microsoft.com/office/drawing/2014/main" id="{30FFD7FB-3BFD-638D-A5BB-387FAFC8264B}"/>
+              </a:ext>
+            </a:extLst>
+          </p:cNvPr>
+          <p:cNvCxnSpPr>
+            <a:cxnSpLocks/>
+          </p:cNvCxnSpPr>
+          <p:nvPr/>
+        </p:nvCxnSpPr>
+        <p:spPr>
+          <a:xfrm>
+            <a:off x="7299252" y="5535139"/>
+            <a:ext cx="0" cy="284576"/>
+          </a:xfrm>
+          <a:prstGeom prst="straightConnector1">
+            <a:avLst/>
+          </a:prstGeom>
+          <a:ln w="82550">
+            <a:solidFill>
+              <a:schemeClr val="tx2">
+                <a:lumMod val="50000"/>
+                <a:lumOff val="50000"/>
+              </a:schemeClr>
+            </a:solidFill>
+            <a:tailEnd type="none"/>
+          </a:ln>
+        </p:spPr>
+        <p:style>
+          <a:lnRef idx="2">
+            <a:schemeClr val="accent1"/>
+          </a:lnRef>
+          <a:fillRef idx="0">
+            <a:schemeClr val="accent1"/>
+          </a:fillRef>
+          <a:effectRef idx="1">
+            <a:schemeClr val="accent1"/>
+          </a:effectRef>
+          <a:fontRef idx="minor">
+            <a:schemeClr val="tx1"/>
+          </a:fontRef>
+        </p:style>
+      </p:cxnSp>
+      <p:cxnSp>
+        <p:nvCxnSpPr>
+          <p:cNvPr id="345" name="Straight Arrow Connector 344">
+            <a:extLst>
+              <a:ext uri="{FF2B5EF4-FFF2-40B4-BE49-F238E27FC236}">
+                <a16:creationId xmlns:a16="http://schemas.microsoft.com/office/drawing/2014/main" id="{07E20348-5F19-C197-35C5-E8641BA6E242}"/>
+              </a:ext>
+            </a:extLst>
+          </p:cNvPr>
+          <p:cNvCxnSpPr>
+            <a:cxnSpLocks/>
+          </p:cNvCxnSpPr>
+          <p:nvPr/>
+        </p:nvCxnSpPr>
+        <p:spPr>
+          <a:xfrm>
+            <a:off x="1203767" y="4992624"/>
+            <a:ext cx="0" cy="914400"/>
+          </a:xfrm>
+          <a:prstGeom prst="straightConnector1">
+            <a:avLst/>
+          </a:prstGeom>
+          <a:ln w="82550">
+            <a:solidFill>
+              <a:schemeClr val="accent6">
+                <a:lumMod val="50000"/>
+              </a:schemeClr>
+            </a:solidFill>
+            <a:tailEnd type="triangle"/>
+          </a:ln>
+        </p:spPr>
+        <p:style>
+          <a:lnRef idx="2">
+            <a:schemeClr val="accent1"/>
+          </a:lnRef>
+          <a:fillRef idx="0">
+            <a:schemeClr val="accent1"/>
+          </a:fillRef>
+          <a:effectRef idx="1">
+            <a:schemeClr val="accent1"/>
+          </a:effectRef>
+          <a:fontRef idx="minor">
+            <a:schemeClr val="tx1"/>
+          </a:fontRef>
+        </p:style>
+      </p:cxnSp>
+      <p:cxnSp>
+        <p:nvCxnSpPr>
+          <p:cNvPr id="348" name="Straight Connector 347">
+            <a:extLst>
+              <a:ext uri="{FF2B5EF4-FFF2-40B4-BE49-F238E27FC236}">
+                <a16:creationId xmlns:a16="http://schemas.microsoft.com/office/drawing/2014/main" id="{FADBDC68-C049-7D07-6DD8-EDBF261D1321}"/>
+              </a:ext>
+            </a:extLst>
+          </p:cNvPr>
+          <p:cNvCxnSpPr>
+            <a:cxnSpLocks/>
+          </p:cNvCxnSpPr>
+          <p:nvPr/>
+        </p:nvCxnSpPr>
+        <p:spPr>
+          <a:xfrm>
+            <a:off x="3321934" y="548640"/>
+            <a:ext cx="2468880" cy="0"/>
+          </a:xfrm>
+          <a:prstGeom prst="line">
+            <a:avLst/>
+          </a:prstGeom>
+          <a:ln w="28575" cmpd="sng">
+            <a:solidFill>
+              <a:schemeClr val="bg2">
+                <a:lumMod val="25000"/>
+              </a:schemeClr>
+            </a:solidFill>
+            <a:prstDash val="sysDash"/>
+          </a:ln>
+        </p:spPr>
+        <p:style>
+          <a:lnRef idx="2">
+            <a:schemeClr val="accent1"/>
+          </a:lnRef>
+          <a:fillRef idx="0">
+            <a:schemeClr val="accent1"/>
+          </a:fillRef>
+          <a:effectRef idx="1">
+            <a:schemeClr val="accent1"/>
+          </a:effectRef>
+          <a:fontRef idx="minor">
+            <a:schemeClr val="tx1"/>
+          </a:fontRef>
+        </p:style>
+      </p:cxnSp>
+      <p:cxnSp>
+        <p:nvCxnSpPr>
+          <p:cNvPr id="350" name="Straight Connector 349">
+            <a:extLst>
+              <a:ext uri="{FF2B5EF4-FFF2-40B4-BE49-F238E27FC236}">
+                <a16:creationId xmlns:a16="http://schemas.microsoft.com/office/drawing/2014/main" id="{31E6CC44-64F7-0368-830F-E09A777889A1}"/>
+              </a:ext>
+            </a:extLst>
+          </p:cNvPr>
+          <p:cNvCxnSpPr>
+            <a:cxnSpLocks/>
+          </p:cNvCxnSpPr>
+          <p:nvPr/>
+        </p:nvCxnSpPr>
+        <p:spPr>
+          <a:xfrm>
+            <a:off x="365760" y="548640"/>
+            <a:ext cx="2468880" cy="0"/>
+          </a:xfrm>
+          <a:prstGeom prst="line">
+            <a:avLst/>
+          </a:prstGeom>
+          <a:ln w="28575" cmpd="sng">
+            <a:solidFill>
+              <a:schemeClr val="bg2">
+                <a:lumMod val="25000"/>
+              </a:schemeClr>
+            </a:solidFill>
+            <a:prstDash val="sysDash"/>
+          </a:ln>
+        </p:spPr>
+        <p:style>
+          <a:lnRef idx="2">
+            <a:schemeClr val="accent1"/>
+          </a:lnRef>
+          <a:fillRef idx="0">
+            <a:schemeClr val="accent1"/>
+          </a:fillRef>
+          <a:effectRef idx="1">
+            <a:schemeClr val="accent1"/>
+          </a:effectRef>
+          <a:fontRef idx="minor">
+            <a:schemeClr val="tx1"/>
+          </a:fontRef>
+        </p:style>
+      </p:cxnSp>
+      <p:cxnSp>
+        <p:nvCxnSpPr>
+          <p:cNvPr id="351" name="Straight Connector 350">
+            <a:extLst>
+              <a:ext uri="{FF2B5EF4-FFF2-40B4-BE49-F238E27FC236}">
+                <a16:creationId xmlns:a16="http://schemas.microsoft.com/office/drawing/2014/main" id="{A380D4E4-F7A1-6167-585A-B16A69951288}"/>
+              </a:ext>
+            </a:extLst>
+          </p:cNvPr>
+          <p:cNvCxnSpPr>
+            <a:cxnSpLocks/>
+          </p:cNvCxnSpPr>
+          <p:nvPr/>
+        </p:nvCxnSpPr>
+        <p:spPr>
+          <a:xfrm>
+            <a:off x="6400800" y="548640"/>
+            <a:ext cx="2468880" cy="0"/>
+          </a:xfrm>
+          <a:prstGeom prst="line">
+            <a:avLst/>
+          </a:prstGeom>
+          <a:ln w="28575" cmpd="sng">
+            <a:solidFill>
+              <a:schemeClr val="bg2">
+                <a:lumMod val="25000"/>
+              </a:schemeClr>
+            </a:solidFill>
+            <a:prstDash val="sysDash"/>
+          </a:ln>
+        </p:spPr>
+        <p:style>
+          <a:lnRef idx="2">
+            <a:schemeClr val="accent1"/>
+          </a:lnRef>
+          <a:fillRef idx="0">
+            <a:schemeClr val="accent1"/>
+          </a:fillRef>
+          <a:effectRef idx="1">
+            <a:schemeClr val="accent1"/>
+          </a:effectRef>
+          <a:fontRef idx="minor">
+            <a:schemeClr val="tx1"/>
+          </a:fontRef>
+        </p:style>
+      </p:cxnSp>
+      <p:cxnSp>
+        <p:nvCxnSpPr>
+          <p:cNvPr id="352" name="Straight Connector 351">
+            <a:extLst>
+              <a:ext uri="{FF2B5EF4-FFF2-40B4-BE49-F238E27FC236}">
+                <a16:creationId xmlns:a16="http://schemas.microsoft.com/office/drawing/2014/main" id="{94D1D885-0444-BB5A-D733-459F7F098C49}"/>
+              </a:ext>
+            </a:extLst>
+          </p:cNvPr>
+          <p:cNvCxnSpPr>
+            <a:cxnSpLocks/>
+          </p:cNvCxnSpPr>
+          <p:nvPr/>
+        </p:nvCxnSpPr>
+        <p:spPr>
+          <a:xfrm>
+            <a:off x="9418320" y="548640"/>
+            <a:ext cx="2468880" cy="0"/>
+          </a:xfrm>
+          <a:prstGeom prst="line">
+            <a:avLst/>
+          </a:prstGeom>
+          <a:ln w="28575" cmpd="sng">
+            <a:solidFill>
+              <a:schemeClr val="bg2">
+                <a:lumMod val="25000"/>
+              </a:schemeClr>
+            </a:solidFill>
+            <a:prstDash val="sysDash"/>
+          </a:ln>
+        </p:spPr>
+        <p:style>
+          <a:lnRef idx="2">
+            <a:schemeClr val="accent1"/>
+          </a:lnRef>
+          <a:fillRef idx="0">
+            <a:schemeClr val="accent1"/>
+          </a:fillRef>
+          <a:effectRef idx="1">
+            <a:schemeClr val="accent1"/>
+          </a:effectRef>
+          <a:fontRef idx="minor">
+            <a:schemeClr val="tx1"/>
+          </a:fontRef>
+        </p:style>
+      </p:cxnSp>
+      <p:cxnSp>
+        <p:nvCxnSpPr>
+          <p:cNvPr id="353" name="Straight Connector 352">
+            <a:extLst>
+              <a:ext uri="{FF2B5EF4-FFF2-40B4-BE49-F238E27FC236}">
+                <a16:creationId xmlns:a16="http://schemas.microsoft.com/office/drawing/2014/main" id="{4089B145-63B2-304B-3E33-48171AF1F618}"/>
+              </a:ext>
+            </a:extLst>
+          </p:cNvPr>
+          <p:cNvCxnSpPr>
+            <a:cxnSpLocks/>
+          </p:cNvCxnSpPr>
+          <p:nvPr/>
+        </p:nvCxnSpPr>
+        <p:spPr>
+          <a:xfrm>
+            <a:off x="7807065" y="5669280"/>
+            <a:ext cx="2617329" cy="0"/>
+          </a:xfrm>
+          <a:prstGeom prst="line">
+            <a:avLst/>
+          </a:prstGeom>
+          <a:ln w="28575" cmpd="sng">
+            <a:solidFill>
+              <a:schemeClr val="bg2">
+                <a:lumMod val="25000"/>
+              </a:schemeClr>
+            </a:solidFill>
+            <a:prstDash val="sysDash"/>
+          </a:ln>
+        </p:spPr>
+        <p:style>
+          <a:lnRef idx="2">
+            <a:schemeClr val="accent1"/>
+          </a:lnRef>
+          <a:fillRef idx="0">
+            <a:schemeClr val="accent1"/>
+          </a:fillRef>
+          <a:effectRef idx="1">
+            <a:schemeClr val="accent1"/>
+          </a:effectRef>
+          <a:fontRef idx="minor">
+            <a:schemeClr val="tx1"/>
+          </a:fontRef>
+        </p:style>
+      </p:cxnSp>
+      <p:cxnSp>
+        <p:nvCxnSpPr>
+          <p:cNvPr id="355" name="Straight Connector 354">
+            <a:extLst>
+              <a:ext uri="{FF2B5EF4-FFF2-40B4-BE49-F238E27FC236}">
+                <a16:creationId xmlns:a16="http://schemas.microsoft.com/office/drawing/2014/main" id="{910608A2-499D-C35F-725F-3C41B0A48863}"/>
+              </a:ext>
+            </a:extLst>
+          </p:cNvPr>
+          <p:cNvCxnSpPr>
+            <a:cxnSpLocks/>
+          </p:cNvCxnSpPr>
+          <p:nvPr/>
+        </p:nvCxnSpPr>
+        <p:spPr>
+          <a:xfrm>
+            <a:off x="1724169" y="5669280"/>
+            <a:ext cx="2617329" cy="0"/>
+          </a:xfrm>
+          <a:prstGeom prst="line">
+            <a:avLst/>
+          </a:prstGeom>
+          <a:ln w="28575" cmpd="sng">
+            <a:solidFill>
+              <a:schemeClr val="bg2">
+                <a:lumMod val="25000"/>
+              </a:schemeClr>
+            </a:solidFill>
+            <a:prstDash val="sysDash"/>
+          </a:ln>
+        </p:spPr>
+        <p:style>
+          <a:lnRef idx="2">
+            <a:schemeClr val="accent1"/>
+          </a:lnRef>
+          <a:fillRef idx="0">
+            <a:schemeClr val="accent1"/>
+          </a:fillRef>
+          <a:effectRef idx="1">
+            <a:schemeClr val="accent1"/>
+          </a:effectRef>
+          <a:fontRef idx="minor">
+            <a:schemeClr val="tx1"/>
+          </a:fontRef>
+        </p:style>
+      </p:cxnSp>
+      <p:sp>
+        <p:nvSpPr>
+          <p:cNvPr id="363" name="Oval 362">
+            <a:extLst>
+              <a:ext uri="{FF2B5EF4-FFF2-40B4-BE49-F238E27FC236}">
+                <a16:creationId xmlns:a16="http://schemas.microsoft.com/office/drawing/2014/main" id="{9F3C995B-3C9B-B261-7A0C-8A01C81ACB01}"/>
+              </a:ext>
+            </a:extLst>
+          </p:cNvPr>
+          <p:cNvSpPr/>
+          <p:nvPr/>
+        </p:nvSpPr>
+        <p:spPr>
+          <a:xfrm>
+            <a:off x="2321962" y="3284107"/>
+            <a:ext cx="488260" cy="435258"/>
+          </a:xfrm>
+          <a:prstGeom prst="ellipse">
+            <a:avLst/>
+          </a:prstGeom>
+          <a:solidFill>
+            <a:schemeClr val="bg1">
+              <a:lumMod val="95000"/>
+            </a:schemeClr>
+          </a:solidFill>
+          <a:ln w="38100">
+            <a:solidFill>
+              <a:schemeClr val="accent2"/>
+            </a:solidFill>
+          </a:ln>
+        </p:spPr>
+        <p:style>
+          <a:lnRef idx="2">
+            <a:schemeClr val="accent1">
+              <a:shade val="15000"/>
+            </a:schemeClr>
+          </a:lnRef>
+          <a:fillRef idx="1">
+            <a:schemeClr val="accent1"/>
+          </a:fillRef>
+          <a:effectRef idx="0">
+            <a:schemeClr val="accent1"/>
+          </a:effectRef>
+          <a:fontRef idx="minor">
+            <a:schemeClr val="lt1"/>
+          </a:fontRef>
+        </p:style>
+        <p:txBody>
+          <a:bodyPr rtlCol="0" anchor="ctr"/>
+          <a:lstStyle/>
+          <a:p>
+            <a:pPr algn="ctr"/>
+            <a:r>
+              <a:rPr lang="en-US" sz="2400" i="1" dirty="0">
+                <a:solidFill>
+                  <a:schemeClr val="tx1"/>
+                </a:solidFill>
+              </a:rPr>
+              <a:t>x</a:t>
+            </a:r>
+            <a:endParaRPr lang="en-US" sz="2400" i="1" dirty="0"/>
+          </a:p>
+        </p:txBody>
+      </p:sp>
+      <p:sp>
+        <p:nvSpPr>
+          <p:cNvPr id="364" name="Oval 363">
+            <a:extLst>
+              <a:ext uri="{FF2B5EF4-FFF2-40B4-BE49-F238E27FC236}">
+                <a16:creationId xmlns:a16="http://schemas.microsoft.com/office/drawing/2014/main" id="{486B9CFF-E460-B596-17BE-68E324EF69B3}"/>
+              </a:ext>
+            </a:extLst>
+          </p:cNvPr>
+          <p:cNvSpPr/>
+          <p:nvPr/>
+        </p:nvSpPr>
+        <p:spPr>
+          <a:xfrm>
+            <a:off x="338793" y="3856914"/>
+            <a:ext cx="488260" cy="435258"/>
+          </a:xfrm>
+          <a:prstGeom prst="ellipse">
+            <a:avLst/>
+          </a:prstGeom>
+          <a:solidFill>
+            <a:schemeClr val="bg1">
+              <a:lumMod val="95000"/>
+            </a:schemeClr>
+          </a:solidFill>
+          <a:ln w="38100">
+            <a:solidFill>
+              <a:schemeClr val="tx1">
+                <a:lumMod val="75000"/>
+                <a:lumOff val="25000"/>
+              </a:schemeClr>
+            </a:solidFill>
+          </a:ln>
+        </p:spPr>
+        <p:style>
+          <a:lnRef idx="2">
+            <a:schemeClr val="accent1">
+              <a:shade val="15000"/>
+            </a:schemeClr>
+          </a:lnRef>
+          <a:fillRef idx="1">
+            <a:schemeClr val="accent1"/>
+          </a:fillRef>
+          <a:effectRef idx="0">
+            <a:schemeClr val="accent1"/>
+          </a:effectRef>
+          <a:fontRef idx="minor">
+            <a:schemeClr val="lt1"/>
+          </a:fontRef>
+        </p:style>
+        <p:txBody>
+          <a:bodyPr rtlCol="0" anchor="ctr"/>
+          <a:lstStyle/>
+          <a:p>
+            <a:pPr algn="ctr"/>
+            <a:r>
+              <a:rPr lang="en-US" sz="2400" i="1" dirty="0">
+                <a:solidFill>
+                  <a:schemeClr val="tx1"/>
+                </a:solidFill>
+              </a:rPr>
+              <a:t>y</a:t>
+            </a:r>
+            <a:endParaRPr lang="en-US" sz="2400" i="1" dirty="0"/>
+          </a:p>
+        </p:txBody>
+      </p:sp>
+      <p:sp>
+        <p:nvSpPr>
+          <p:cNvPr id="365" name="Oval 364">
+            <a:extLst>
+              <a:ext uri="{FF2B5EF4-FFF2-40B4-BE49-F238E27FC236}">
+                <a16:creationId xmlns:a16="http://schemas.microsoft.com/office/drawing/2014/main" id="{ADD9ED73-0699-3D0A-925D-048D9402F34E}"/>
+              </a:ext>
+            </a:extLst>
+          </p:cNvPr>
+          <p:cNvSpPr/>
+          <p:nvPr/>
+        </p:nvSpPr>
+        <p:spPr>
+          <a:xfrm>
+            <a:off x="5356860" y="1202526"/>
+            <a:ext cx="488260" cy="435258"/>
+          </a:xfrm>
+          <a:prstGeom prst="ellipse">
+            <a:avLst/>
+          </a:prstGeom>
+          <a:solidFill>
+            <a:schemeClr val="bg1">
+              <a:lumMod val="95000"/>
+            </a:schemeClr>
+          </a:solidFill>
+          <a:ln w="38100">
+            <a:solidFill>
+              <a:schemeClr val="accent6">
+                <a:lumMod val="75000"/>
+              </a:schemeClr>
+            </a:solidFill>
+          </a:ln>
+        </p:spPr>
+        <p:style>
+          <a:lnRef idx="2">
+            <a:schemeClr val="accent1">
+              <a:shade val="15000"/>
+            </a:schemeClr>
+          </a:lnRef>
+          <a:fillRef idx="1">
+            <a:schemeClr val="accent1"/>
+          </a:fillRef>
+          <a:effectRef idx="0">
+            <a:schemeClr val="accent1"/>
+          </a:effectRef>
+          <a:fontRef idx="minor">
+            <a:schemeClr val="lt1"/>
+          </a:fontRef>
+        </p:style>
+        <p:txBody>
+          <a:bodyPr rtlCol="0" anchor="ctr"/>
+          <a:lstStyle/>
+          <a:p>
+            <a:pPr algn="ctr"/>
+            <a:endParaRPr lang="en-US" sz="2400" b="0" i="1" dirty="0"/>
+          </a:p>
+        </p:txBody>
+      </p:sp>
+      <p:sp>
+        <p:nvSpPr>
+          <p:cNvPr id="366" name="Oval 365">
+            <a:extLst>
+              <a:ext uri="{FF2B5EF4-FFF2-40B4-BE49-F238E27FC236}">
+                <a16:creationId xmlns:a16="http://schemas.microsoft.com/office/drawing/2014/main" id="{98C52A0C-0CE2-7FA9-BB9E-E98439BE875F}"/>
+              </a:ext>
+            </a:extLst>
+          </p:cNvPr>
+          <p:cNvSpPr/>
+          <p:nvPr/>
+        </p:nvSpPr>
+        <p:spPr>
+          <a:xfrm>
+            <a:off x="5355502" y="2292344"/>
+            <a:ext cx="488260" cy="435258"/>
+          </a:xfrm>
+          <a:prstGeom prst="ellipse">
+            <a:avLst/>
+          </a:prstGeom>
+          <a:solidFill>
+            <a:schemeClr val="bg1">
+              <a:lumMod val="95000"/>
+            </a:schemeClr>
+          </a:solidFill>
+          <a:ln w="38100">
+            <a:solidFill>
+              <a:schemeClr val="accent6">
+                <a:lumMod val="75000"/>
+              </a:schemeClr>
+            </a:solidFill>
+          </a:ln>
+        </p:spPr>
+        <p:style>
+          <a:lnRef idx="2">
+            <a:schemeClr val="accent1">
+              <a:shade val="15000"/>
+            </a:schemeClr>
+          </a:lnRef>
+          <a:fillRef idx="1">
+            <a:schemeClr val="accent1"/>
+          </a:fillRef>
+          <a:effectRef idx="0">
+            <a:schemeClr val="accent1"/>
+          </a:effectRef>
+          <a:fontRef idx="minor">
+            <a:schemeClr val="lt1"/>
+          </a:fontRef>
+        </p:style>
+        <p:txBody>
+          <a:bodyPr rtlCol="0" anchor="ctr"/>
+          <a:lstStyle/>
+          <a:p>
+            <a:pPr algn="ctr"/>
+            <a:r>
+              <a:rPr lang="en-US" sz="2400" i="1" dirty="0">
+                <a:solidFill>
+                  <a:schemeClr val="tx1"/>
+                </a:solidFill>
+              </a:rPr>
+              <a:t>d</a:t>
+            </a:r>
+            <a:endParaRPr lang="en-US" sz="2400" i="1" dirty="0"/>
+          </a:p>
+        </p:txBody>
+      </p:sp>
+      <p:sp>
+        <p:nvSpPr>
+          <p:cNvPr id="367" name="Rounded Rectangle 366">
+            <a:extLst>
+              <a:ext uri="{FF2B5EF4-FFF2-40B4-BE49-F238E27FC236}">
+                <a16:creationId xmlns:a16="http://schemas.microsoft.com/office/drawing/2014/main" id="{F4C22F3B-FB9B-9308-09F3-2FB2B62FA620}"/>
+              </a:ext>
+            </a:extLst>
+          </p:cNvPr>
+          <p:cNvSpPr/>
+          <p:nvPr/>
+        </p:nvSpPr>
+        <p:spPr>
+          <a:xfrm>
+            <a:off x="3465231" y="1636142"/>
+            <a:ext cx="1222110" cy="380355"/>
+          </a:xfrm>
+          <a:prstGeom prst="roundRect">
+            <a:avLst/>
+          </a:prstGeom>
+          <a:solidFill>
+            <a:schemeClr val="bg1">
+              <a:lumMod val="95000"/>
+            </a:schemeClr>
+          </a:solidFill>
+          <a:ln w="38100">
+            <a:solidFill>
+              <a:schemeClr val="accent6">
+                <a:lumMod val="75000"/>
+              </a:schemeClr>
+            </a:solidFill>
+          </a:ln>
+        </p:spPr>
+        <p:style>
+          <a:lnRef idx="2">
+            <a:schemeClr val="accent1">
+              <a:shade val="15000"/>
+            </a:schemeClr>
+          </a:lnRef>
+          <a:fillRef idx="1">
+            <a:schemeClr val="accent1"/>
+          </a:fillRef>
+          <a:effectRef idx="0">
+            <a:schemeClr val="accent1"/>
+          </a:effectRef>
+          <a:fontRef idx="minor">
+            <a:schemeClr val="lt1"/>
+          </a:fontRef>
+        </p:style>
+        <p:txBody>
+          <a:bodyPr rtlCol="0" anchor="ctr"/>
+          <a:lstStyle/>
+          <a:p>
+            <a:pPr algn="ctr"/>
+            <a:r>
+              <a:rPr lang="en-US" dirty="0">
+                <a:solidFill>
+                  <a:schemeClr val="tx1"/>
+                </a:solidFill>
+              </a:rPr>
+              <a:t>LRO test</a:t>
+            </a:r>
+          </a:p>
+        </p:txBody>
+      </p:sp>
+      <p:sp>
+        <p:nvSpPr>
+          <p:cNvPr id="368" name="Oval 367">
+            <a:extLst>
+              <a:ext uri="{FF2B5EF4-FFF2-40B4-BE49-F238E27FC236}">
+                <a16:creationId xmlns:a16="http://schemas.microsoft.com/office/drawing/2014/main" id="{107F7E7B-56D5-717A-ECB2-2632B66D938D}"/>
+              </a:ext>
+            </a:extLst>
+          </p:cNvPr>
+          <p:cNvSpPr/>
+          <p:nvPr/>
+        </p:nvSpPr>
+        <p:spPr>
+          <a:xfrm>
+            <a:off x="3476763" y="3395163"/>
+            <a:ext cx="488260" cy="435258"/>
+          </a:xfrm>
+          <a:prstGeom prst="ellipse">
+            <a:avLst/>
+          </a:prstGeom>
+          <a:solidFill>
+            <a:schemeClr val="bg1">
+              <a:lumMod val="95000"/>
+            </a:schemeClr>
+          </a:solidFill>
+          <a:ln w="38100">
+            <a:solidFill>
+              <a:schemeClr val="accent6">
+                <a:lumMod val="75000"/>
+              </a:schemeClr>
+            </a:solidFill>
+          </a:ln>
+        </p:spPr>
+        <p:style>
+          <a:lnRef idx="2">
+            <a:schemeClr val="accent1">
+              <a:shade val="15000"/>
+            </a:schemeClr>
+          </a:lnRef>
+          <a:fillRef idx="1">
+            <a:schemeClr val="accent1"/>
+          </a:fillRef>
+          <a:effectRef idx="0">
+            <a:schemeClr val="accent1"/>
+          </a:effectRef>
+          <a:fontRef idx="minor">
+            <a:schemeClr val="lt1"/>
+          </a:fontRef>
+        </p:style>
+        <p:txBody>
+          <a:bodyPr rtlCol="0" anchor="ctr"/>
+          <a:lstStyle/>
+          <a:p>
+            <a:pPr algn="ctr"/>
+            <a:endParaRPr lang="en-US" sz="2400" b="0" i="1" dirty="0">
+              <a:solidFill>
+                <a:schemeClr val="tx1"/>
+              </a:solidFill>
+            </a:endParaRPr>
+          </a:p>
+        </p:txBody>
+      </p:sp>
+      <p:sp>
+        <p:nvSpPr>
+          <p:cNvPr id="369" name="Oval 368">
+            <a:extLst>
+              <a:ext uri="{FF2B5EF4-FFF2-40B4-BE49-F238E27FC236}">
+                <a16:creationId xmlns:a16="http://schemas.microsoft.com/office/drawing/2014/main" id="{CFBB6ECE-67B9-FED7-1C23-8CBF368122F3}"/>
+              </a:ext>
+            </a:extLst>
+          </p:cNvPr>
+          <p:cNvSpPr/>
+          <p:nvPr/>
+        </p:nvSpPr>
+        <p:spPr>
+          <a:xfrm>
+            <a:off x="5285108" y="3857937"/>
+            <a:ext cx="488260" cy="435258"/>
+          </a:xfrm>
+          <a:prstGeom prst="ellipse">
+            <a:avLst/>
+          </a:prstGeom>
+          <a:solidFill>
+            <a:schemeClr val="bg1">
+              <a:lumMod val="95000"/>
+            </a:schemeClr>
+          </a:solidFill>
+          <a:ln w="38100">
+            <a:solidFill>
+              <a:schemeClr val="accent6">
+                <a:lumMod val="75000"/>
+              </a:schemeClr>
+            </a:solidFill>
+          </a:ln>
+        </p:spPr>
+        <p:style>
+          <a:lnRef idx="2">
+            <a:schemeClr val="accent1">
+              <a:shade val="15000"/>
+            </a:schemeClr>
+          </a:lnRef>
+          <a:fillRef idx="1">
+            <a:schemeClr val="accent1"/>
+          </a:fillRef>
+          <a:effectRef idx="0">
+            <a:schemeClr val="accent1"/>
+          </a:effectRef>
+          <a:fontRef idx="minor">
+            <a:schemeClr val="lt1"/>
+          </a:fontRef>
+        </p:style>
+        <p:txBody>
+          <a:bodyPr rtlCol="0" anchor="ctr"/>
+          <a:lstStyle/>
+          <a:p>
+            <a:pPr algn="ctr"/>
+            <a:endParaRPr lang="en-US" sz="2400" b="0" i="1" dirty="0">
+              <a:solidFill>
+                <a:schemeClr val="tx1"/>
+              </a:solidFill>
+            </a:endParaRPr>
+          </a:p>
+        </p:txBody>
+      </p:sp>
+      <p:sp>
+        <p:nvSpPr>
+          <p:cNvPr id="370" name="Oval 369">
+            <a:extLst>
+              <a:ext uri="{FF2B5EF4-FFF2-40B4-BE49-F238E27FC236}">
+                <a16:creationId xmlns:a16="http://schemas.microsoft.com/office/drawing/2014/main" id="{CC99C6EF-3D44-9499-D394-094FFEB04FDD}"/>
+              </a:ext>
+            </a:extLst>
+          </p:cNvPr>
+          <p:cNvSpPr/>
+          <p:nvPr/>
+        </p:nvSpPr>
+        <p:spPr>
+          <a:xfrm>
+            <a:off x="8417923" y="4099673"/>
+            <a:ext cx="488260" cy="435258"/>
+          </a:xfrm>
+          <a:prstGeom prst="ellipse">
+            <a:avLst/>
+          </a:prstGeom>
+          <a:solidFill>
+            <a:schemeClr val="bg1">
+              <a:lumMod val="95000"/>
+            </a:schemeClr>
+          </a:solidFill>
+          <a:ln w="38100">
+            <a:solidFill>
+              <a:srgbClr val="C00000"/>
+            </a:solidFill>
+          </a:ln>
+        </p:spPr>
+        <p:style>
+          <a:lnRef idx="2">
+            <a:schemeClr val="accent1">
+              <a:shade val="15000"/>
+            </a:schemeClr>
+          </a:lnRef>
+          <a:fillRef idx="1">
+            <a:schemeClr val="accent1"/>
+          </a:fillRef>
+          <a:effectRef idx="0">
+            <a:schemeClr val="accent1"/>
+          </a:effectRef>
+          <a:fontRef idx="minor">
+            <a:schemeClr val="lt1"/>
+          </a:fontRef>
+        </p:style>
+        <p:txBody>
+          <a:bodyPr rtlCol="0" anchor="ctr"/>
+          <a:lstStyle/>
+          <a:p>
+            <a:pPr algn="ctr"/>
+            <a:endParaRPr lang="en-US" sz="2400" b="0" dirty="0">
+              <a:solidFill>
+                <a:schemeClr val="tx1"/>
+              </a:solidFill>
+            </a:endParaRPr>
+          </a:p>
+        </p:txBody>
+      </p:sp>
+      <p:sp>
+        <p:nvSpPr>
+          <p:cNvPr id="372" name="Rounded Rectangle 371">
+            <a:extLst>
+              <a:ext uri="{FF2B5EF4-FFF2-40B4-BE49-F238E27FC236}">
+                <a16:creationId xmlns:a16="http://schemas.microsoft.com/office/drawing/2014/main" id="{D0BF1455-2E79-FFD7-87A9-61ADBC848FC6}"/>
+              </a:ext>
+            </a:extLst>
+          </p:cNvPr>
+          <p:cNvSpPr/>
+          <p:nvPr/>
+        </p:nvSpPr>
+        <p:spPr>
+          <a:xfrm>
+            <a:off x="8299982" y="722430"/>
+            <a:ext cx="767838" cy="551400"/>
+          </a:xfrm>
+          <a:prstGeom prst="roundRect">
+            <a:avLst/>
+          </a:prstGeom>
+          <a:solidFill>
+            <a:schemeClr val="bg1">
+              <a:lumMod val="95000"/>
+            </a:schemeClr>
+          </a:solidFill>
+          <a:ln w="38100">
+            <a:solidFill>
+              <a:srgbClr val="C00000"/>
+            </a:solidFill>
+          </a:ln>
+        </p:spPr>
+        <p:style>
+          <a:lnRef idx="2">
+            <a:schemeClr val="accent1">
+              <a:shade val="15000"/>
+            </a:schemeClr>
+          </a:lnRef>
+          <a:fillRef idx="1">
+            <a:schemeClr val="accent1"/>
+          </a:fillRef>
+          <a:effectRef idx="0">
+            <a:schemeClr val="accent1"/>
+          </a:effectRef>
+          <a:fontRef idx="minor">
+            <a:schemeClr val="lt1"/>
+          </a:fontRef>
+        </p:style>
+        <p:txBody>
+          <a:bodyPr rtlCol="0" anchor="ctr"/>
+          <a:lstStyle/>
+          <a:p>
+            <a:pPr algn="ctr"/>
+            <a:endParaRPr lang="en-US" sz="2000" b="0" i="1" dirty="0">
+              <a:solidFill>
+                <a:schemeClr val="tx1"/>
+              </a:solidFill>
+            </a:endParaRPr>
+          </a:p>
+        </p:txBody>
+      </p:sp>
+      <p:sp>
+        <p:nvSpPr>
+          <p:cNvPr id="373" name="Rounded Rectangle 372">
+            <a:extLst>
+              <a:ext uri="{FF2B5EF4-FFF2-40B4-BE49-F238E27FC236}">
+                <a16:creationId xmlns:a16="http://schemas.microsoft.com/office/drawing/2014/main" id="{5E123884-2B9E-3027-5C90-F85CA08DF19D}"/>
+              </a:ext>
+            </a:extLst>
+          </p:cNvPr>
+          <p:cNvSpPr/>
+          <p:nvPr/>
+        </p:nvSpPr>
+        <p:spPr>
+          <a:xfrm>
+            <a:off x="6730307" y="2426351"/>
+            <a:ext cx="525378" cy="382502"/>
+          </a:xfrm>
+          <a:prstGeom prst="roundRect">
+            <a:avLst/>
+          </a:prstGeom>
+          <a:solidFill>
+            <a:schemeClr val="bg1">
+              <a:lumMod val="95000"/>
+            </a:schemeClr>
+          </a:solidFill>
+          <a:ln w="38100">
+            <a:solidFill>
+              <a:srgbClr val="C00000"/>
+            </a:solidFill>
+          </a:ln>
+        </p:spPr>
+        <p:style>
+          <a:lnRef idx="2">
+            <a:schemeClr val="accent1">
+              <a:shade val="15000"/>
+            </a:schemeClr>
+          </a:lnRef>
+          <a:fillRef idx="1">
+            <a:schemeClr val="accent1"/>
+          </a:fillRef>
+          <a:effectRef idx="0">
+            <a:schemeClr val="accent1"/>
+          </a:effectRef>
+          <a:fontRef idx="minor">
+            <a:schemeClr val="lt1"/>
+          </a:fontRef>
+        </p:style>
+        <p:txBody>
+          <a:bodyPr rtlCol="0" anchor="ctr"/>
+          <a:lstStyle/>
+          <a:p>
+            <a:pPr algn="ctr"/>
+            <a:endParaRPr lang="en-US" sz="2400" b="0" dirty="0">
+              <a:solidFill>
+                <a:schemeClr val="tx1"/>
+              </a:solidFill>
+            </a:endParaRPr>
+          </a:p>
+        </p:txBody>
+      </p:sp>
+      <mc:AlternateContent xmlns:mc="http://schemas.openxmlformats.org/markup-compatibility/2006">
+        <mc:Choice xmlns:a14="http://schemas.microsoft.com/office/drawing/2010/main" Requires="a14">
+          <p:sp>
+            <p:nvSpPr>
+              <p:cNvPr id="376" name="TextBox 375">
+                <a:extLst>
+                  <a:ext uri="{FF2B5EF4-FFF2-40B4-BE49-F238E27FC236}">
+                    <a16:creationId xmlns:a16="http://schemas.microsoft.com/office/drawing/2014/main" id="{1E4A9A9B-8914-843E-0A7A-30F98DC31C91}"/>
+                  </a:ext>
+                </a:extLst>
+              </p:cNvPr>
+              <p:cNvSpPr txBox="1"/>
+              <p:nvPr/>
+            </p:nvSpPr>
+            <p:spPr>
+              <a:xfrm>
+                <a:off x="6629162" y="2383645"/>
+                <a:ext cx="713550" cy="461665"/>
+              </a:xfrm>
+              <a:prstGeom prst="rect">
+                <a:avLst/>
+              </a:prstGeom>
+              <a:noFill/>
+            </p:spPr>
+            <p:txBody>
+              <a:bodyPr wrap="square">
+                <a:spAutoFit/>
+              </a:bodyPr>
+              <a:lstStyle/>
+              <a:p>
+                <a:pPr/>
+                <a14:m>
+                  <m:oMathPara xmlns:m="http://schemas.openxmlformats.org/officeDocument/2006/math">
+                    <m:oMathParaPr>
+                      <m:jc m:val="centerGroup"/>
+                    </m:oMathParaPr>
+                    <m:oMath xmlns:m="http://schemas.openxmlformats.org/officeDocument/2006/math">
+                      <m:r>
+                        <m:rPr>
+                          <m:sty m:val="p"/>
+                        </m:rPr>
+                        <a:rPr lang="en-US" sz="2400" b="0" i="0" smtClean="0">
+                          <a:solidFill>
+                            <a:schemeClr val="tx1"/>
+                          </a:solidFill>
+                          <a:latin typeface="Cambria Math" panose="02040503050406030204" pitchFamily="18" charset="0"/>
+                        </a:rPr>
+                        <m:t>ω</m:t>
+                      </m:r>
+                    </m:oMath>
+                  </m:oMathPara>
+                </a14:m>
+                <a:endParaRPr lang="en-US" sz="2400" dirty="0"/>
+              </a:p>
+            </p:txBody>
+          </p:sp>
+        </mc:Choice>
+        <mc:Fallback>
+          <p:sp>
+            <p:nvSpPr>
+              <p:cNvPr id="376" name="TextBox 375">
+                <a:extLst>
+                  <a:ext uri="{FF2B5EF4-FFF2-40B4-BE49-F238E27FC236}">
+                    <a16:creationId xmlns:a16="http://schemas.microsoft.com/office/drawing/2014/main" id="{1E4A9A9B-8914-843E-0A7A-30F98DC31C91}"/>
+                  </a:ext>
+                </a:extLst>
+              </p:cNvPr>
+              <p:cNvSpPr txBox="1">
+                <a:spLocks noRot="1" noChangeAspect="1" noMove="1" noResize="1" noEditPoints="1" noAdjustHandles="1" noChangeArrowheads="1" noChangeShapeType="1" noTextEdit="1"/>
+              </p:cNvSpPr>
+              <p:nvPr/>
+            </p:nvSpPr>
+            <p:spPr>
+              <a:xfrm>
+                <a:off x="6629162" y="2383645"/>
+                <a:ext cx="713550" cy="461665"/>
+              </a:xfrm>
+              <a:prstGeom prst="rect">
+                <a:avLst/>
+              </a:prstGeom>
+              <a:blipFill>
+                <a:blip r:embed="rId2"/>
+                <a:stretch>
+                  <a:fillRect/>
+                </a:stretch>
+              </a:blipFill>
+            </p:spPr>
+            <p:txBody>
+              <a:bodyPr/>
+              <a:lstStyle/>
+              <a:p>
+                <a:r>
+                  <a:rPr lang="en-US">
+                    <a:noFill/>
+                  </a:rPr>
+                  <a:t> </a:t>
+                </a:r>
+              </a:p>
+            </p:txBody>
+          </p:sp>
+        </mc:Fallback>
+      </mc:AlternateContent>
+      <mc:AlternateContent xmlns:mc="http://schemas.openxmlformats.org/markup-compatibility/2006">
+        <mc:Choice xmlns:a14="http://schemas.microsoft.com/office/drawing/2010/main" Requires="a14">
+          <p:sp>
+            <p:nvSpPr>
+              <p:cNvPr id="378" name="TextBox 377">
+                <a:extLst>
+                  <a:ext uri="{FF2B5EF4-FFF2-40B4-BE49-F238E27FC236}">
+                    <a16:creationId xmlns:a16="http://schemas.microsoft.com/office/drawing/2014/main" id="{E606D581-B0CD-E6C1-1D8D-7A30286B2AF3}"/>
+                  </a:ext>
+                </a:extLst>
+              </p:cNvPr>
+              <p:cNvSpPr txBox="1"/>
+              <p:nvPr/>
+            </p:nvSpPr>
+            <p:spPr>
+              <a:xfrm>
+                <a:off x="8226619" y="4123996"/>
+                <a:ext cx="889998" cy="461665"/>
+              </a:xfrm>
+              <a:prstGeom prst="rect">
+                <a:avLst/>
+              </a:prstGeom>
+              <a:noFill/>
+            </p:spPr>
+            <p:txBody>
+              <a:bodyPr wrap="square">
+                <a:spAutoFit/>
+              </a:bodyPr>
+              <a:lstStyle/>
+              <a:p>
+                <a:pPr/>
+                <a14:m>
+                  <m:oMathPara xmlns:m="http://schemas.openxmlformats.org/officeDocument/2006/math">
+                    <m:oMathParaPr>
+                      <m:jc m:val="centerGroup"/>
+                    </m:oMathParaPr>
+                    <m:oMath xmlns:m="http://schemas.openxmlformats.org/officeDocument/2006/math">
+                      <m:r>
+                        <m:rPr>
+                          <m:sty m:val="p"/>
+                        </m:rPr>
+                        <a:rPr lang="en-US" sz="2400" b="0" i="0" smtClean="0">
+                          <a:solidFill>
+                            <a:schemeClr val="tx1"/>
+                          </a:solidFill>
+                          <a:latin typeface="Cambria Math" panose="02040503050406030204" pitchFamily="18" charset="0"/>
+                        </a:rPr>
+                        <m:t>Ψ</m:t>
+                      </m:r>
+                    </m:oMath>
+                  </m:oMathPara>
+                </a14:m>
+                <a:endParaRPr lang="en-US" sz="2400" dirty="0"/>
+              </a:p>
+            </p:txBody>
+          </p:sp>
+        </mc:Choice>
+        <mc:Fallback>
+          <p:sp>
+            <p:nvSpPr>
+              <p:cNvPr id="378" name="TextBox 377">
+                <a:extLst>
+                  <a:ext uri="{FF2B5EF4-FFF2-40B4-BE49-F238E27FC236}">
+                    <a16:creationId xmlns:a16="http://schemas.microsoft.com/office/drawing/2014/main" id="{E606D581-B0CD-E6C1-1D8D-7A30286B2AF3}"/>
+                  </a:ext>
+                </a:extLst>
+              </p:cNvPr>
+              <p:cNvSpPr txBox="1">
+                <a:spLocks noRot="1" noChangeAspect="1" noMove="1" noResize="1" noEditPoints="1" noAdjustHandles="1" noChangeArrowheads="1" noChangeShapeType="1" noTextEdit="1"/>
+              </p:cNvSpPr>
+              <p:nvPr/>
+            </p:nvSpPr>
+            <p:spPr>
+              <a:xfrm>
+                <a:off x="8226619" y="4123996"/>
+                <a:ext cx="889998" cy="461665"/>
+              </a:xfrm>
+              <a:prstGeom prst="rect">
+                <a:avLst/>
+              </a:prstGeom>
+              <a:blipFill>
+                <a:blip r:embed="rId3"/>
+                <a:stretch>
+                  <a:fillRect/>
+                </a:stretch>
+              </a:blipFill>
+            </p:spPr>
+            <p:txBody>
+              <a:bodyPr/>
+              <a:lstStyle/>
+              <a:p>
+                <a:r>
+                  <a:rPr lang="en-US">
+                    <a:noFill/>
+                  </a:rPr>
+                  <a:t> </a:t>
+                </a:r>
+              </a:p>
+            </p:txBody>
+          </p:sp>
+        </mc:Fallback>
+      </mc:AlternateContent>
+      <mc:AlternateContent xmlns:mc="http://schemas.openxmlformats.org/markup-compatibility/2006">
+        <mc:Choice xmlns:a14="http://schemas.microsoft.com/office/drawing/2010/main" Requires="a14">
+          <p:sp>
+            <p:nvSpPr>
+              <p:cNvPr id="380" name="TextBox 379">
+                <a:extLst>
+                  <a:ext uri="{FF2B5EF4-FFF2-40B4-BE49-F238E27FC236}">
+                    <a16:creationId xmlns:a16="http://schemas.microsoft.com/office/drawing/2014/main" id="{E9A6C564-6434-8607-7490-B2DD3FB435CD}"/>
+                  </a:ext>
+                </a:extLst>
+              </p:cNvPr>
+              <p:cNvSpPr txBox="1"/>
+              <p:nvPr/>
+            </p:nvSpPr>
+            <p:spPr>
+              <a:xfrm>
+                <a:off x="8099837" y="741948"/>
+                <a:ext cx="1213150" cy="461665"/>
+              </a:xfrm>
+              <a:prstGeom prst="rect">
+                <a:avLst/>
+              </a:prstGeom>
+              <a:noFill/>
+            </p:spPr>
+            <p:txBody>
+              <a:bodyPr wrap="square">
+                <a:spAutoFit/>
+              </a:bodyPr>
+              <a:lstStyle/>
+              <a:p>
+                <a:pPr algn="ctr"/>
+                <a14:m>
+                  <m:oMathPara xmlns:m="http://schemas.openxmlformats.org/officeDocument/2006/math">
+                    <m:oMathParaPr>
+                      <m:jc m:val="centerGroup"/>
+                    </m:oMathParaPr>
+                    <m:oMath xmlns:m="http://schemas.openxmlformats.org/officeDocument/2006/math">
+                      <m:r>
+                        <a:rPr lang="en-US" sz="2400" b="0" i="1" smtClean="0">
+                          <a:solidFill>
+                            <a:schemeClr val="tx1"/>
+                          </a:solidFill>
+                          <a:latin typeface="Cambria Math" panose="02040503050406030204" pitchFamily="18" charset="0"/>
+                        </a:rPr>
+                        <m:t>∑</m:t>
+                      </m:r>
+                      <m:r>
+                        <a:rPr lang="en-US" sz="2400" b="0" i="1" smtClean="0">
+                          <a:solidFill>
+                            <a:schemeClr val="tx1"/>
+                          </a:solidFill>
+                          <a:latin typeface="Cambria Math" panose="02040503050406030204" pitchFamily="18" charset="0"/>
+                        </a:rPr>
+                        <m:t>𝑤</m:t>
+                      </m:r>
+                      <m:r>
+                        <m:rPr>
+                          <m:sty m:val="p"/>
+                        </m:rPr>
+                        <a:rPr lang="en-US" sz="2400" b="0" i="1" smtClean="0">
+                          <a:solidFill>
+                            <a:schemeClr val="tx1"/>
+                          </a:solidFill>
+                          <a:latin typeface="Cambria Math" panose="02040503050406030204" pitchFamily="18" charset="0"/>
+                        </a:rPr>
+                        <m:t>β</m:t>
+                      </m:r>
+                    </m:oMath>
+                  </m:oMathPara>
+                </a14:m>
+                <a:endParaRPr lang="en-US" sz="2400" b="0" i="1" dirty="0">
+                  <a:solidFill>
+                    <a:schemeClr val="tx1"/>
+                  </a:solidFill>
+                </a:endParaRPr>
+              </a:p>
+            </p:txBody>
+          </p:sp>
+        </mc:Choice>
+        <mc:Fallback>
+          <p:sp>
+            <p:nvSpPr>
+              <p:cNvPr id="380" name="TextBox 379">
+                <a:extLst>
+                  <a:ext uri="{FF2B5EF4-FFF2-40B4-BE49-F238E27FC236}">
+                    <a16:creationId xmlns:a16="http://schemas.microsoft.com/office/drawing/2014/main" id="{E9A6C564-6434-8607-7490-B2DD3FB435CD}"/>
+                  </a:ext>
+                </a:extLst>
+              </p:cNvPr>
+              <p:cNvSpPr txBox="1">
+                <a:spLocks noRot="1" noChangeAspect="1" noMove="1" noResize="1" noEditPoints="1" noAdjustHandles="1" noChangeArrowheads="1" noChangeShapeType="1" noTextEdit="1"/>
+              </p:cNvSpPr>
+              <p:nvPr/>
+            </p:nvSpPr>
+            <p:spPr>
+              <a:xfrm>
+                <a:off x="8099837" y="741948"/>
+                <a:ext cx="1213150" cy="461665"/>
+              </a:xfrm>
+              <a:prstGeom prst="rect">
+                <a:avLst/>
+              </a:prstGeom>
+              <a:blipFill>
+                <a:blip r:embed="rId4"/>
+                <a:stretch>
+                  <a:fillRect b="-16216"/>
+                </a:stretch>
+              </a:blipFill>
+            </p:spPr>
+            <p:txBody>
+              <a:bodyPr/>
+              <a:lstStyle/>
+              <a:p>
+                <a:r>
+                  <a:rPr lang="en-US">
+                    <a:noFill/>
+                  </a:rPr>
+                  <a:t> </a:t>
+                </a:r>
+              </a:p>
+            </p:txBody>
+          </p:sp>
+        </mc:Fallback>
+      </mc:AlternateContent>
+      <mc:AlternateContent xmlns:mc="http://schemas.openxmlformats.org/markup-compatibility/2006">
+        <mc:Choice xmlns:a14="http://schemas.microsoft.com/office/drawing/2010/main" Requires="a14">
+          <p:sp>
+            <p:nvSpPr>
+              <p:cNvPr id="382" name="TextBox 381">
+                <a:extLst>
+                  <a:ext uri="{FF2B5EF4-FFF2-40B4-BE49-F238E27FC236}">
+                    <a16:creationId xmlns:a16="http://schemas.microsoft.com/office/drawing/2014/main" id="{CC033841-BB8D-857B-FA99-FFD6B744A559}"/>
+                  </a:ext>
+                </a:extLst>
+              </p:cNvPr>
+              <p:cNvSpPr txBox="1"/>
+              <p:nvPr/>
+            </p:nvSpPr>
+            <p:spPr>
+              <a:xfrm>
+                <a:off x="5003464" y="1149989"/>
+                <a:ext cx="1195752" cy="461665"/>
+              </a:xfrm>
+              <a:prstGeom prst="rect">
+                <a:avLst/>
+              </a:prstGeom>
+              <a:noFill/>
+            </p:spPr>
+            <p:txBody>
+              <a:bodyPr wrap="square">
+                <a:spAutoFit/>
+              </a:bodyPr>
+              <a:lstStyle/>
+              <a:p>
+                <a:pPr/>
+                <a14:m>
+                  <m:oMathPara xmlns:m="http://schemas.openxmlformats.org/officeDocument/2006/math">
+                    <m:oMathParaPr>
+                      <m:jc m:val="centerGroup"/>
+                    </m:oMathParaPr>
+                    <m:oMath xmlns:m="http://schemas.openxmlformats.org/officeDocument/2006/math">
+                      <m:r>
+                        <m:rPr>
+                          <m:sty m:val="p"/>
+                        </m:rPr>
+                        <a:rPr lang="en-US" sz="2400" b="0" i="1" smtClean="0">
+                          <a:solidFill>
+                            <a:schemeClr val="tx1"/>
+                          </a:solidFill>
+                          <a:latin typeface="Cambria Math" panose="02040503050406030204" pitchFamily="18" charset="0"/>
+                        </a:rPr>
+                        <m:t>γ</m:t>
+                      </m:r>
+                    </m:oMath>
+                  </m:oMathPara>
+                </a14:m>
+                <a:endParaRPr lang="en-US" sz="2400" dirty="0"/>
+              </a:p>
+            </p:txBody>
+          </p:sp>
+        </mc:Choice>
+        <mc:Fallback>
+          <p:sp>
+            <p:nvSpPr>
+              <p:cNvPr id="382" name="TextBox 381">
+                <a:extLst>
+                  <a:ext uri="{FF2B5EF4-FFF2-40B4-BE49-F238E27FC236}">
+                    <a16:creationId xmlns:a16="http://schemas.microsoft.com/office/drawing/2014/main" id="{CC033841-BB8D-857B-FA99-FFD6B744A559}"/>
+                  </a:ext>
+                </a:extLst>
+              </p:cNvPr>
+              <p:cNvSpPr txBox="1">
+                <a:spLocks noRot="1" noChangeAspect="1" noMove="1" noResize="1" noEditPoints="1" noAdjustHandles="1" noChangeArrowheads="1" noChangeShapeType="1" noTextEdit="1"/>
+              </p:cNvSpPr>
+              <p:nvPr/>
+            </p:nvSpPr>
+            <p:spPr>
+              <a:xfrm>
+                <a:off x="5003464" y="1149989"/>
+                <a:ext cx="1195752" cy="461665"/>
+              </a:xfrm>
+              <a:prstGeom prst="rect">
+                <a:avLst/>
+              </a:prstGeom>
+              <a:blipFill>
+                <a:blip r:embed="rId5"/>
+                <a:stretch>
+                  <a:fillRect b="-8108"/>
+                </a:stretch>
+              </a:blipFill>
+            </p:spPr>
+            <p:txBody>
+              <a:bodyPr/>
+              <a:lstStyle/>
+              <a:p>
+                <a:r>
+                  <a:rPr lang="en-US">
+                    <a:noFill/>
+                  </a:rPr>
+                  <a:t> </a:t>
+                </a:r>
+              </a:p>
+            </p:txBody>
+          </p:sp>
+        </mc:Fallback>
+      </mc:AlternateContent>
+      <mc:AlternateContent xmlns:mc="http://schemas.openxmlformats.org/markup-compatibility/2006">
+        <mc:Choice xmlns:a14="http://schemas.microsoft.com/office/drawing/2010/main" Requires="a14">
+          <p:sp>
+            <p:nvSpPr>
+              <p:cNvPr id="384" name="TextBox 383">
+                <a:extLst>
+                  <a:ext uri="{FF2B5EF4-FFF2-40B4-BE49-F238E27FC236}">
+                    <a16:creationId xmlns:a16="http://schemas.microsoft.com/office/drawing/2014/main" id="{0A82904A-A3FC-1120-3D53-1DB9CF896F30}"/>
+                  </a:ext>
+                </a:extLst>
+              </p:cNvPr>
+              <p:cNvSpPr txBox="1"/>
+              <p:nvPr/>
+            </p:nvSpPr>
+            <p:spPr>
+              <a:xfrm>
+                <a:off x="3363871" y="3373347"/>
+                <a:ext cx="703057" cy="461665"/>
+              </a:xfrm>
+              <a:prstGeom prst="rect">
+                <a:avLst/>
+              </a:prstGeom>
+              <a:noFill/>
+            </p:spPr>
+            <p:txBody>
+              <a:bodyPr wrap="square">
+                <a:spAutoFit/>
+              </a:bodyPr>
+              <a:lstStyle/>
+              <a:p>
+                <a:pPr/>
+                <a14:m>
+                  <m:oMathPara xmlns:m="http://schemas.openxmlformats.org/officeDocument/2006/math">
+                    <m:oMathParaPr>
+                      <m:jc m:val="centerGroup"/>
+                    </m:oMathParaPr>
+                    <m:oMath xmlns:m="http://schemas.openxmlformats.org/officeDocument/2006/math">
+                      <m:r>
+                        <m:rPr>
+                          <m:sty m:val="p"/>
+                        </m:rPr>
+                        <a:rPr lang="en-US" sz="2400" b="0" i="1" smtClean="0">
+                          <a:solidFill>
+                            <a:schemeClr val="tx1"/>
+                          </a:solidFill>
+                          <a:latin typeface="Cambria Math" panose="02040503050406030204" pitchFamily="18" charset="0"/>
+                        </a:rPr>
+                        <m:t>β</m:t>
+                      </m:r>
+                    </m:oMath>
+                  </m:oMathPara>
+                </a14:m>
+                <a:endParaRPr lang="en-US" sz="2400" dirty="0"/>
+              </a:p>
+            </p:txBody>
+          </p:sp>
+        </mc:Choice>
+        <mc:Fallback>
+          <p:sp>
+            <p:nvSpPr>
+              <p:cNvPr id="384" name="TextBox 383">
+                <a:extLst>
+                  <a:ext uri="{FF2B5EF4-FFF2-40B4-BE49-F238E27FC236}">
+                    <a16:creationId xmlns:a16="http://schemas.microsoft.com/office/drawing/2014/main" id="{0A82904A-A3FC-1120-3D53-1DB9CF896F30}"/>
+                  </a:ext>
+                </a:extLst>
+              </p:cNvPr>
+              <p:cNvSpPr txBox="1">
+                <a:spLocks noRot="1" noChangeAspect="1" noMove="1" noResize="1" noEditPoints="1" noAdjustHandles="1" noChangeArrowheads="1" noChangeShapeType="1" noTextEdit="1"/>
+              </p:cNvSpPr>
+              <p:nvPr/>
+            </p:nvSpPr>
+            <p:spPr>
+              <a:xfrm>
+                <a:off x="3363871" y="3373347"/>
+                <a:ext cx="703057" cy="461665"/>
+              </a:xfrm>
+              <a:prstGeom prst="rect">
+                <a:avLst/>
+              </a:prstGeom>
+              <a:blipFill>
+                <a:blip r:embed="rId6"/>
+                <a:stretch>
+                  <a:fillRect b="-16216"/>
+                </a:stretch>
+              </a:blipFill>
+            </p:spPr>
+            <p:txBody>
+              <a:bodyPr/>
+              <a:lstStyle/>
+              <a:p>
+                <a:r>
+                  <a:rPr lang="en-US">
+                    <a:noFill/>
+                  </a:rPr>
+                  <a:t> </a:t>
+                </a:r>
+              </a:p>
+            </p:txBody>
+          </p:sp>
+        </mc:Fallback>
+      </mc:AlternateContent>
+      <mc:AlternateContent xmlns:mc="http://schemas.openxmlformats.org/markup-compatibility/2006">
+        <mc:Choice xmlns:a14="http://schemas.microsoft.com/office/drawing/2010/main" Requires="a14">
+          <p:sp>
+            <p:nvSpPr>
+              <p:cNvPr id="386" name="TextBox 385">
+                <a:extLst>
+                  <a:ext uri="{FF2B5EF4-FFF2-40B4-BE49-F238E27FC236}">
+                    <a16:creationId xmlns:a16="http://schemas.microsoft.com/office/drawing/2014/main" id="{5248CAB0-51CC-3CE5-B22E-9BAB93A77674}"/>
+                  </a:ext>
+                </a:extLst>
+              </p:cNvPr>
+              <p:cNvSpPr txBox="1"/>
+              <p:nvPr/>
+            </p:nvSpPr>
+            <p:spPr>
+              <a:xfrm>
+                <a:off x="5105298" y="3803355"/>
+                <a:ext cx="839828" cy="461665"/>
+              </a:xfrm>
+              <a:prstGeom prst="rect">
+                <a:avLst/>
+              </a:prstGeom>
+              <a:noFill/>
+            </p:spPr>
+            <p:txBody>
+              <a:bodyPr wrap="square">
+                <a:spAutoFit/>
+              </a:bodyPr>
+              <a:lstStyle/>
+              <a:p>
+                <a:pPr/>
+                <a14:m>
+                  <m:oMathPara xmlns:m="http://schemas.openxmlformats.org/officeDocument/2006/math">
+                    <m:oMathParaPr>
+                      <m:jc m:val="centerGroup"/>
+                    </m:oMathParaPr>
+                    <m:oMath xmlns:m="http://schemas.openxmlformats.org/officeDocument/2006/math">
+                      <m:r>
+                        <m:rPr>
+                          <m:sty m:val="p"/>
+                        </m:rPr>
+                        <a:rPr lang="en-US" sz="2400" b="0" i="1" smtClean="0">
+                          <a:solidFill>
+                            <a:schemeClr val="tx1"/>
+                          </a:solidFill>
+                          <a:latin typeface="Cambria Math" panose="02040503050406030204" pitchFamily="18" charset="0"/>
+                        </a:rPr>
+                        <m:t>ρ</m:t>
+                      </m:r>
+                    </m:oMath>
+                  </m:oMathPara>
+                </a14:m>
+                <a:endParaRPr lang="en-US" sz="2400" dirty="0"/>
+              </a:p>
+            </p:txBody>
+          </p:sp>
+        </mc:Choice>
+        <mc:Fallback>
+          <p:sp>
+            <p:nvSpPr>
+              <p:cNvPr id="386" name="TextBox 385">
+                <a:extLst>
+                  <a:ext uri="{FF2B5EF4-FFF2-40B4-BE49-F238E27FC236}">
+                    <a16:creationId xmlns:a16="http://schemas.microsoft.com/office/drawing/2014/main" id="{5248CAB0-51CC-3CE5-B22E-9BAB93A77674}"/>
+                  </a:ext>
+                </a:extLst>
+              </p:cNvPr>
+              <p:cNvSpPr txBox="1">
+                <a:spLocks noRot="1" noChangeAspect="1" noMove="1" noResize="1" noEditPoints="1" noAdjustHandles="1" noChangeArrowheads="1" noChangeShapeType="1" noTextEdit="1"/>
+              </p:cNvSpPr>
+              <p:nvPr/>
+            </p:nvSpPr>
+            <p:spPr>
+              <a:xfrm>
+                <a:off x="5105298" y="3803355"/>
+                <a:ext cx="839828" cy="461665"/>
+              </a:xfrm>
+              <a:prstGeom prst="rect">
+                <a:avLst/>
+              </a:prstGeom>
+              <a:blipFill>
+                <a:blip r:embed="rId7"/>
+                <a:stretch>
+                  <a:fillRect b="-8108"/>
+                </a:stretch>
+              </a:blipFill>
+            </p:spPr>
+            <p:txBody>
+              <a:bodyPr/>
+              <a:lstStyle/>
+              <a:p>
+                <a:r>
+                  <a:rPr lang="en-US">
+                    <a:noFill/>
+                  </a:rPr>
+                  <a:t> </a:t>
+                </a:r>
+              </a:p>
+            </p:txBody>
+          </p:sp>
+        </mc:Fallback>
+      </mc:AlternateContent>
     </p:spTree>
     <p:extLst>
       <p:ext uri="{BB962C8B-B14F-4D97-AF65-F5344CB8AC3E}">

</xml_diff>

<commit_message>
Began switch to raw transcript counts
</commit_message>
<xml_diff>
--- a/fig_modelpipeline.pptx
+++ b/fig_modelpipeline.pptx
@@ -126,7 +126,7 @@
 <file path=ppt/revisionInfo.xml><?xml version="1.0" encoding="utf-8"?>
 <p1510:revInfo xmlns:a="http://schemas.openxmlformats.org/drawingml/2006/main" xmlns:r="http://schemas.openxmlformats.org/officeDocument/2006/relationships" xmlns:p1510="http://schemas.microsoft.com/office/powerpoint/2015/10/main">
   <p1510:revLst>
-    <p1510:client id="{0DEAF538-9A43-0041-92DF-11DEC3319B03}" v="144" dt="2025-04-28T03:13:54.759"/>
+    <p1510:client id="{0DEAF538-9A43-0041-92DF-11DEC3319B03}" v="273" dt="2025-04-28T14:11:52.456"/>
   </p1510:revLst>
 </p1510:revInfo>
 </file>
@@ -2814,7 +2814,7 @@
           <a:lstStyle/>
           <a:p>
             <a:r>
-              <a:rPr lang="en-US"/>
+              <a:rPr lang="en-US" dirty="0"/>
               <a:t>Click to edit Master title style</a:t>
             </a:r>
           </a:p>
@@ -2853,35 +2853,35 @@
           <a:p>
             <a:pPr lvl="0"/>
             <a:r>
-              <a:rPr lang="en-US"/>
+              <a:rPr lang="en-US" dirty="0"/>
               <a:t>Click to edit Master text styles</a:t>
             </a:r>
           </a:p>
           <a:p>
             <a:pPr lvl="1"/>
             <a:r>
-              <a:rPr lang="en-US"/>
+              <a:rPr lang="en-US" dirty="0"/>
               <a:t>Second level</a:t>
             </a:r>
           </a:p>
           <a:p>
             <a:pPr lvl="2"/>
             <a:r>
-              <a:rPr lang="en-US"/>
+              <a:rPr lang="en-US" dirty="0"/>
               <a:t>Third level</a:t>
             </a:r>
           </a:p>
           <a:p>
             <a:pPr lvl="3"/>
             <a:r>
-              <a:rPr lang="en-US"/>
+              <a:rPr lang="en-US" dirty="0"/>
               <a:t>Fourth level</a:t>
             </a:r>
           </a:p>
           <a:p>
             <a:pPr lvl="4"/>
             <a:r>
-              <a:rPr lang="en-US"/>
+              <a:rPr lang="en-US" dirty="0"/>
               <a:t>Fifth level</a:t>
             </a:r>
           </a:p>
@@ -2916,21 +2916,23 @@
           <a:bodyPr vert="horz" lIns="91440" tIns="45720" rIns="91440" bIns="45720" rtlCol="0" anchor="ctr"/>
           <a:lstStyle>
             <a:lvl1pPr algn="l">
-              <a:defRPr sz="1200">
+              <a:defRPr sz="1200" b="0" i="0">
                 <a:solidFill>
                   <a:schemeClr val="tx1">
                     <a:tint val="82000"/>
                   </a:schemeClr>
                 </a:solidFill>
+                <a:latin typeface="Arial" panose="020B0604020202020204" pitchFamily="34" charset="0"/>
               </a:defRPr>
             </a:lvl1pPr>
           </a:lstStyle>
           <a:p>
             <a:fld id="{0671BF96-9467-0B49-AF35-7149D7F70E39}" type="datetimeFigureOut">
               <a:rPr lang="en-US" smtClean="0"/>
+              <a:pPr/>
               <a:t>4/27/25</a:t>
             </a:fld>
-            <a:endParaRPr lang="en-US"/>
+            <a:endParaRPr lang="en-US" dirty="0"/>
           </a:p>
         </p:txBody>
       </p:sp>
@@ -2963,17 +2965,18 @@
           <a:bodyPr vert="horz" lIns="91440" tIns="45720" rIns="91440" bIns="45720" rtlCol="0" anchor="ctr"/>
           <a:lstStyle>
             <a:lvl1pPr algn="ctr">
-              <a:defRPr sz="1200">
+              <a:defRPr sz="1200" b="0" i="0">
                 <a:solidFill>
                   <a:schemeClr val="tx1">
                     <a:tint val="82000"/>
                   </a:schemeClr>
                 </a:solidFill>
+                <a:latin typeface="Arial" panose="020B0604020202020204" pitchFamily="34" charset="0"/>
               </a:defRPr>
             </a:lvl1pPr>
           </a:lstStyle>
           <a:p>
-            <a:endParaRPr lang="en-US"/>
+            <a:endParaRPr lang="en-US" dirty="0"/>
           </a:p>
         </p:txBody>
       </p:sp>
@@ -3006,21 +3009,23 @@
           <a:bodyPr vert="horz" lIns="91440" tIns="45720" rIns="91440" bIns="45720" rtlCol="0" anchor="ctr"/>
           <a:lstStyle>
             <a:lvl1pPr algn="r">
-              <a:defRPr sz="1200">
+              <a:defRPr sz="1200" b="0" i="0">
                 <a:solidFill>
                   <a:schemeClr val="tx1">
                     <a:tint val="82000"/>
                   </a:schemeClr>
                 </a:solidFill>
+                <a:latin typeface="Arial" panose="020B0604020202020204" pitchFamily="34" charset="0"/>
               </a:defRPr>
             </a:lvl1pPr>
           </a:lstStyle>
           <a:p>
             <a:fld id="{2773B440-2E26-1F41-A810-01B253535B1D}" type="slidenum">
               <a:rPr lang="en-US" smtClean="0"/>
+              <a:pPr/>
               <a:t>‹#›</a:t>
             </a:fld>
-            <a:endParaRPr lang="en-US"/>
+            <a:endParaRPr lang="en-US" dirty="0"/>
           </a:p>
         </p:txBody>
       </p:sp>
@@ -3055,11 +3060,11 @@
           <a:spcPct val="0"/>
         </a:spcBef>
         <a:buNone/>
-        <a:defRPr sz="4400" kern="1200">
+        <a:defRPr sz="4400" b="0" i="0" kern="1200">
           <a:solidFill>
             <a:schemeClr val="tx1"/>
           </a:solidFill>
-          <a:latin typeface="+mj-lt"/>
+          <a:latin typeface="Arial" panose="020B0604020202020204" pitchFamily="34" charset="0"/>
           <a:ea typeface="+mj-ea"/>
           <a:cs typeface="+mj-cs"/>
         </a:defRPr>
@@ -3075,11 +3080,11 @@
         </a:spcBef>
         <a:buFont typeface="Arial" panose="020B0604020202020204" pitchFamily="34" charset="0"/>
         <a:buChar char="•"/>
-        <a:defRPr sz="2800" kern="1200">
+        <a:defRPr sz="2800" b="0" i="0" kern="1200">
           <a:solidFill>
             <a:schemeClr val="tx1"/>
           </a:solidFill>
-          <a:latin typeface="+mn-lt"/>
+          <a:latin typeface="Arial" panose="020B0604020202020204" pitchFamily="34" charset="0"/>
           <a:ea typeface="+mn-ea"/>
           <a:cs typeface="+mn-cs"/>
         </a:defRPr>
@@ -3093,11 +3098,11 @@
         </a:spcBef>
         <a:buFont typeface="Arial" panose="020B0604020202020204" pitchFamily="34" charset="0"/>
         <a:buChar char="•"/>
-        <a:defRPr sz="2400" kern="1200">
+        <a:defRPr sz="2400" b="0" i="0" kern="1200">
           <a:solidFill>
             <a:schemeClr val="tx1"/>
           </a:solidFill>
-          <a:latin typeface="+mn-lt"/>
+          <a:latin typeface="Arial" panose="020B0604020202020204" pitchFamily="34" charset="0"/>
           <a:ea typeface="+mn-ea"/>
           <a:cs typeface="+mn-cs"/>
         </a:defRPr>
@@ -3111,11 +3116,11 @@
         </a:spcBef>
         <a:buFont typeface="Arial" panose="020B0604020202020204" pitchFamily="34" charset="0"/>
         <a:buChar char="•"/>
-        <a:defRPr sz="2000" kern="1200">
+        <a:defRPr sz="2000" b="0" i="0" kern="1200">
           <a:solidFill>
             <a:schemeClr val="tx1"/>
           </a:solidFill>
-          <a:latin typeface="+mn-lt"/>
+          <a:latin typeface="Arial" panose="020B0604020202020204" pitchFamily="34" charset="0"/>
           <a:ea typeface="+mn-ea"/>
           <a:cs typeface="+mn-cs"/>
         </a:defRPr>
@@ -3129,11 +3134,11 @@
         </a:spcBef>
         <a:buFont typeface="Arial" panose="020B0604020202020204" pitchFamily="34" charset="0"/>
         <a:buChar char="•"/>
-        <a:defRPr sz="1800" kern="1200">
+        <a:defRPr sz="1800" b="0" i="0" kern="1200">
           <a:solidFill>
             <a:schemeClr val="tx1"/>
           </a:solidFill>
-          <a:latin typeface="+mn-lt"/>
+          <a:latin typeface="Arial" panose="020B0604020202020204" pitchFamily="34" charset="0"/>
           <a:ea typeface="+mn-ea"/>
           <a:cs typeface="+mn-cs"/>
         </a:defRPr>
@@ -3147,11 +3152,11 @@
         </a:spcBef>
         <a:buFont typeface="Arial" panose="020B0604020202020204" pitchFamily="34" charset="0"/>
         <a:buChar char="•"/>
-        <a:defRPr sz="1800" kern="1200">
+        <a:defRPr sz="1800" b="0" i="0" kern="1200">
           <a:solidFill>
             <a:schemeClr val="tx1"/>
           </a:solidFill>
-          <a:latin typeface="+mn-lt"/>
+          <a:latin typeface="Arial" panose="020B0604020202020204" pitchFamily="34" charset="0"/>
           <a:ea typeface="+mn-ea"/>
           <a:cs typeface="+mn-cs"/>
         </a:defRPr>
@@ -3345,6 +3350,145 @@
           <a:chExt cx="0" cy="0"/>
         </a:xfrm>
       </p:grpSpPr>
+      <p:sp>
+        <p:nvSpPr>
+          <p:cNvPr id="37" name="Rectangle 36">
+            <a:extLst>
+              <a:ext uri="{FF2B5EF4-FFF2-40B4-BE49-F238E27FC236}">
+                <a16:creationId xmlns:a16="http://schemas.microsoft.com/office/drawing/2014/main" id="{DDCCD322-76D1-1775-DBB9-AB2E6FEF1439}"/>
+              </a:ext>
+            </a:extLst>
+          </p:cNvPr>
+          <p:cNvSpPr/>
+          <p:nvPr/>
+        </p:nvSpPr>
+        <p:spPr>
+          <a:xfrm>
+            <a:off x="3293857" y="5813142"/>
+            <a:ext cx="1920240" cy="640080"/>
+          </a:xfrm>
+          <a:prstGeom prst="rect">
+            <a:avLst/>
+          </a:prstGeom>
+          <a:solidFill>
+            <a:srgbClr val="0070C0">
+              <a:alpha val="49550"/>
+            </a:srgbClr>
+          </a:solidFill>
+          <a:ln>
+            <a:solidFill>
+              <a:schemeClr val="tx1"/>
+            </a:solidFill>
+          </a:ln>
+        </p:spPr>
+        <p:style>
+          <a:lnRef idx="2">
+            <a:schemeClr val="accent1">
+              <a:shade val="15000"/>
+            </a:schemeClr>
+          </a:lnRef>
+          <a:fillRef idx="1">
+            <a:schemeClr val="accent1"/>
+          </a:fillRef>
+          <a:effectRef idx="0">
+            <a:schemeClr val="accent1"/>
+          </a:effectRef>
+          <a:fontRef idx="minor">
+            <a:schemeClr val="lt1"/>
+          </a:fontRef>
+        </p:style>
+        <p:txBody>
+          <a:bodyPr rtlCol="0" anchor="ctr"/>
+          <a:lstStyle/>
+          <a:p>
+            <a:pPr algn="ctr"/>
+            <a:r>
+              <a:rPr lang="en-US" i="1" dirty="0">
+                <a:solidFill>
+                  <a:schemeClr val="tx1"/>
+                </a:solidFill>
+                <a:latin typeface="Arial" panose="020B0604020202020204" pitchFamily="34" charset="0"/>
+              </a:rPr>
+              <a:t>p</a:t>
+            </a:r>
+            <a:r>
+              <a:rPr lang="en-US" dirty="0">
+                <a:solidFill>
+                  <a:schemeClr val="tx1"/>
+                </a:solidFill>
+                <a:latin typeface="Arial" panose="020B0604020202020204" pitchFamily="34" charset="0"/>
+              </a:rPr>
+              <a:t>-values</a:t>
+            </a:r>
+          </a:p>
+        </p:txBody>
+      </p:sp>
+      <p:sp>
+        <p:nvSpPr>
+          <p:cNvPr id="10" name="Rectangle 9">
+            <a:extLst>
+              <a:ext uri="{FF2B5EF4-FFF2-40B4-BE49-F238E27FC236}">
+                <a16:creationId xmlns:a16="http://schemas.microsoft.com/office/drawing/2014/main" id="{8537C156-CD87-5FE2-2A85-556935064C9E}"/>
+              </a:ext>
+            </a:extLst>
+          </p:cNvPr>
+          <p:cNvSpPr/>
+          <p:nvPr/>
+        </p:nvSpPr>
+        <p:spPr>
+          <a:xfrm>
+            <a:off x="3682087" y="2951052"/>
+            <a:ext cx="1920240" cy="640080"/>
+          </a:xfrm>
+          <a:prstGeom prst="rect">
+            <a:avLst/>
+          </a:prstGeom>
+          <a:solidFill>
+            <a:schemeClr val="accent3">
+              <a:lumMod val="40000"/>
+              <a:lumOff val="60000"/>
+              <a:alpha val="50000"/>
+            </a:schemeClr>
+          </a:solidFill>
+          <a:ln>
+            <a:solidFill>
+              <a:schemeClr val="tx1"/>
+            </a:solidFill>
+          </a:ln>
+        </p:spPr>
+        <p:style>
+          <a:lnRef idx="2">
+            <a:schemeClr val="accent1">
+              <a:shade val="15000"/>
+            </a:schemeClr>
+          </a:lnRef>
+          <a:fillRef idx="1">
+            <a:schemeClr val="accent1"/>
+          </a:fillRef>
+          <a:effectRef idx="0">
+            <a:schemeClr val="accent1"/>
+          </a:effectRef>
+          <a:fontRef idx="minor">
+            <a:schemeClr val="lt1"/>
+          </a:fontRef>
+        </p:style>
+        <p:txBody>
+          <a:bodyPr rtlCol="0" anchor="ctr"/>
+          <a:lstStyle/>
+          <a:p>
+            <a:pPr algn="ctr"/>
+            <a:r>
+              <a:rPr lang="en-US" dirty="0">
+                <a:solidFill>
+                  <a:schemeClr val="tx1"/>
+                </a:solidFill>
+                <a:latin typeface="Arial" panose="020B0604020202020204" pitchFamily="34" charset="0"/>
+              </a:rPr>
+              <a:t>Fixed Effects</a:t>
+            </a:r>
+          </a:p>
+        </p:txBody>
+      </p:sp>
       <p:cxnSp>
         <p:nvCxnSpPr>
           <p:cNvPr id="341" name="Straight Arrow Connector 340">
@@ -3360,9 +3504,9 @@
           <p:nvPr/>
         </p:nvCxnSpPr>
         <p:spPr>
-          <a:xfrm flipH="1" flipV="1">
-            <a:off x="1203767" y="5023413"/>
-            <a:ext cx="3658134" cy="25744"/>
+          <a:xfrm flipH="1">
+            <a:off x="1159565" y="5049157"/>
+            <a:ext cx="3702336" cy="0"/>
           </a:xfrm>
           <a:prstGeom prst="straightConnector1">
             <a:avLst/>
@@ -3453,7 +3597,7 @@
         </p:nvCxnSpPr>
         <p:spPr>
           <a:xfrm>
-            <a:off x="4574622" y="3588698"/>
+            <a:off x="4567588" y="3595732"/>
             <a:ext cx="0" cy="2354902"/>
           </a:xfrm>
           <a:prstGeom prst="straightConnector1">
@@ -3591,7 +3735,7 @@
         <p:spPr>
           <a:xfrm>
             <a:off x="586246" y="844684"/>
-            <a:ext cx="1920240" cy="640080"/>
+            <a:ext cx="2011680" cy="640080"/>
           </a:xfrm>
           <a:prstGeom prst="rect">
             <a:avLst/>
@@ -3634,6 +3778,7 @@
                 <a:solidFill>
                   <a:schemeClr val="tx1"/>
                 </a:solidFill>
+                <a:latin typeface="Arial" panose="020B0604020202020204" pitchFamily="34" charset="0"/>
               </a:rPr>
               <a:t>Gene Annotation</a:t>
             </a:r>
@@ -3655,7 +3800,7 @@
         <p:spPr>
           <a:xfrm>
             <a:off x="575415" y="2948618"/>
-            <a:ext cx="1920240" cy="640080"/>
+            <a:ext cx="2011680" cy="640080"/>
           </a:xfrm>
           <a:prstGeom prst="rect">
             <a:avLst/>
@@ -3699,6 +3844,7 @@
                 <a:solidFill>
                   <a:schemeClr val="tx1"/>
                 </a:solidFill>
+                <a:latin typeface="Arial" panose="020B0604020202020204" pitchFamily="34" charset="0"/>
               </a:rPr>
               <a:t>Coordinate Transformation</a:t>
             </a:r>
@@ -3764,6 +3910,7 @@
                 <a:solidFill>
                   <a:schemeClr val="tx1"/>
                 </a:solidFill>
+                <a:latin typeface="Arial" panose="020B0604020202020204" pitchFamily="34" charset="0"/>
               </a:rPr>
               <a:t>Dispersion Factors</a:t>
             </a:r>
@@ -3784,8 +3931,8 @@
         </p:nvSpPr>
         <p:spPr>
           <a:xfrm>
-            <a:off x="228892" y="136719"/>
-            <a:ext cx="2743200" cy="400110"/>
+            <a:off x="228892" y="91440"/>
+            <a:ext cx="2743200" cy="461665"/>
           </a:xfrm>
           <a:prstGeom prst="rect">
             <a:avLst/>
@@ -3800,7 +3947,9 @@
           <a:p>
             <a:pPr algn="ctr"/>
             <a:r>
-              <a:rPr lang="en-US" sz="2000" b="1" dirty="0"/>
+              <a:rPr lang="en-US" sz="2400" dirty="0">
+                <a:latin typeface="Arial" panose="020B0604020202020204" pitchFamily="34" charset="0"/>
+              </a:rPr>
               <a:t>Preprocessing</a:t>
             </a:r>
           </a:p>
@@ -3820,8 +3969,8 @@
         </p:nvSpPr>
         <p:spPr>
           <a:xfrm>
-            <a:off x="3192102" y="133388"/>
-            <a:ext cx="2744055" cy="400110"/>
+            <a:off x="2933700" y="91440"/>
+            <a:ext cx="3200400" cy="461665"/>
           </a:xfrm>
           <a:prstGeom prst="rect">
             <a:avLst/>
@@ -3836,7 +3985,9 @@
           <a:p>
             <a:pPr algn="ctr"/>
             <a:r>
-              <a:rPr lang="en-US" sz="2000" b="1" dirty="0"/>
+              <a:rPr lang="en-US" sz="2400" dirty="0">
+                <a:latin typeface="Arial" panose="020B0604020202020204" pitchFamily="34" charset="0"/>
+              </a:rPr>
               <a:t>Parameter Estimates</a:t>
             </a:r>
           </a:p>
@@ -3901,6 +4052,7 @@
                 <a:solidFill>
                   <a:schemeClr val="tx1"/>
                 </a:solidFill>
+                <a:latin typeface="Arial" panose="020B0604020202020204" pitchFamily="34" charset="0"/>
               </a:rPr>
               <a:t>Model Degree</a:t>
             </a:r>
@@ -3964,73 +4116,9 @@
                 <a:solidFill>
                   <a:schemeClr val="tx1"/>
                 </a:solidFill>
+                <a:latin typeface="Arial" panose="020B0604020202020204" pitchFamily="34" charset="0"/>
               </a:rPr>
               <a:t>Apply Fixed Effects</a:t>
-            </a:r>
-          </a:p>
-        </p:txBody>
-      </p:sp>
-      <p:sp>
-        <p:nvSpPr>
-          <p:cNvPr id="10" name="Rectangle 9">
-            <a:extLst>
-              <a:ext uri="{FF2B5EF4-FFF2-40B4-BE49-F238E27FC236}">
-                <a16:creationId xmlns:a16="http://schemas.microsoft.com/office/drawing/2014/main" id="{8537C156-CD87-5FE2-2A85-556935064C9E}"/>
-              </a:ext>
-            </a:extLst>
-          </p:cNvPr>
-          <p:cNvSpPr/>
-          <p:nvPr/>
-        </p:nvSpPr>
-        <p:spPr>
-          <a:xfrm>
-            <a:off x="3682087" y="2951052"/>
-            <a:ext cx="1920240" cy="640080"/>
-          </a:xfrm>
-          <a:prstGeom prst="rect">
-            <a:avLst/>
-          </a:prstGeom>
-          <a:solidFill>
-            <a:schemeClr val="accent3">
-              <a:lumMod val="40000"/>
-              <a:lumOff val="60000"/>
-              <a:alpha val="50000"/>
-            </a:schemeClr>
-          </a:solidFill>
-          <a:ln>
-            <a:solidFill>
-              <a:schemeClr val="tx1"/>
-            </a:solidFill>
-          </a:ln>
-        </p:spPr>
-        <p:style>
-          <a:lnRef idx="2">
-            <a:schemeClr val="accent1">
-              <a:shade val="15000"/>
-            </a:schemeClr>
-          </a:lnRef>
-          <a:fillRef idx="1">
-            <a:schemeClr val="accent1"/>
-          </a:fillRef>
-          <a:effectRef idx="0">
-            <a:schemeClr val="accent1"/>
-          </a:effectRef>
-          <a:fontRef idx="minor">
-            <a:schemeClr val="lt1"/>
-          </a:fontRef>
-        </p:style>
-        <p:txBody>
-          <a:bodyPr rtlCol="0" anchor="ctr"/>
-          <a:lstStyle/>
-          <a:p>
-            <a:pPr algn="ctr"/>
-            <a:r>
-              <a:rPr lang="en-US" dirty="0">
-                <a:solidFill>
-                  <a:schemeClr val="tx1"/>
-                </a:solidFill>
-              </a:rPr>
-              <a:t>Fixed Effects</a:t>
             </a:r>
           </a:p>
         </p:txBody>
@@ -4092,6 +4180,7 @@
                 <a:solidFill>
                   <a:schemeClr val="tx1"/>
                 </a:solidFill>
+                <a:latin typeface="Arial" panose="020B0604020202020204" pitchFamily="34" charset="0"/>
               </a:rPr>
               <a:t>Sigmoid of Position and Spatial Distribution</a:t>
             </a:r>
@@ -4112,8 +4201,8 @@
         </p:nvSpPr>
         <p:spPr>
           <a:xfrm>
-            <a:off x="9312987" y="138975"/>
-            <a:ext cx="2743200" cy="402336"/>
+            <a:off x="9312987" y="91440"/>
+            <a:ext cx="2743200" cy="461665"/>
           </a:xfrm>
           <a:prstGeom prst="rect">
             <a:avLst/>
@@ -4128,7 +4217,9 @@
           <a:p>
             <a:pPr algn="ctr"/>
             <a:r>
-              <a:rPr lang="en-US" sz="2000" b="1" dirty="0"/>
+              <a:rPr lang="en-US" sz="2400" dirty="0">
+                <a:latin typeface="Arial" panose="020B0604020202020204" pitchFamily="34" charset="0"/>
+              </a:rPr>
               <a:t>Model Fitting</a:t>
             </a:r>
           </a:p>
@@ -4193,6 +4284,7 @@
                 <a:solidFill>
                   <a:schemeClr val="tx1"/>
                 </a:solidFill>
+                <a:latin typeface="Arial" panose="020B0604020202020204" pitchFamily="34" charset="0"/>
               </a:rPr>
               <a:t>Likelihood Computation </a:t>
             </a:r>
@@ -4258,6 +4350,7 @@
                 <a:solidFill>
                   <a:schemeClr val="tx1"/>
                 </a:solidFill>
+                <a:latin typeface="Arial" panose="020B0604020202020204" pitchFamily="34" charset="0"/>
               </a:rPr>
               <a:t>Boundary Distance</a:t>
             </a:r>
@@ -4278,8 +4371,8 @@
         </p:nvSpPr>
         <p:spPr>
           <a:xfrm>
-            <a:off x="6088284" y="5303520"/>
-            <a:ext cx="6103716" cy="400110"/>
+            <a:off x="6088284" y="5212080"/>
+            <a:ext cx="6103716" cy="461665"/>
           </a:xfrm>
           <a:prstGeom prst="rect">
             <a:avLst/>
@@ -4294,7 +4387,9 @@
           <a:p>
             <a:pPr algn="ctr"/>
             <a:r>
-              <a:rPr lang="en-US" sz="2000" b="1" dirty="0"/>
+              <a:rPr lang="en-US" sz="2400" dirty="0">
+                <a:latin typeface="Arial" panose="020B0604020202020204" pitchFamily="34" charset="0"/>
+              </a:rPr>
               <a:t>Parameter Estimation</a:t>
             </a:r>
           </a:p>
@@ -4359,6 +4454,7 @@
                 <a:solidFill>
                   <a:schemeClr val="tx1"/>
                 </a:solidFill>
+                <a:latin typeface="Arial" panose="020B0604020202020204" pitchFamily="34" charset="0"/>
               </a:rPr>
               <a:t>MCMC</a:t>
             </a:r>
@@ -4424,6 +4520,7 @@
                 <a:solidFill>
                   <a:schemeClr val="tx1"/>
                 </a:solidFill>
+                <a:latin typeface="Arial" panose="020B0604020202020204" pitchFamily="34" charset="0"/>
               </a:rPr>
               <a:t>Bootstrapping</a:t>
             </a:r>
@@ -4488,6 +4585,7 @@
                 <a:solidFill>
                   <a:schemeClr val="tx1"/>
                 </a:solidFill>
+                <a:latin typeface="Arial" panose="020B0604020202020204" pitchFamily="34" charset="0"/>
               </a:rPr>
               <a:t>Random Effects</a:t>
             </a:r>
@@ -4508,8 +4606,8 @@
         </p:nvSpPr>
         <p:spPr>
           <a:xfrm>
-            <a:off x="0" y="5303520"/>
-            <a:ext cx="6088284" cy="400110"/>
+            <a:off x="0" y="5212080"/>
+            <a:ext cx="6088284" cy="461665"/>
           </a:xfrm>
           <a:prstGeom prst="rect">
             <a:avLst/>
@@ -4524,7 +4622,9 @@
           <a:p>
             <a:pPr algn="ctr"/>
             <a:r>
-              <a:rPr lang="en-US" sz="2000" b="1" dirty="0"/>
+              <a:rPr lang="en-US" sz="2400" dirty="0">
+                <a:latin typeface="Arial" panose="020B0604020202020204" pitchFamily="34" charset="0"/>
+              </a:rPr>
               <a:t>Hypothesis Testing</a:t>
             </a:r>
           </a:p>
@@ -4587,85 +4687,10 @@
                 <a:solidFill>
                   <a:schemeClr val="tx1"/>
                 </a:solidFill>
+                <a:latin typeface="Arial" panose="020B0604020202020204" pitchFamily="34" charset="0"/>
               </a:rPr>
               <a:t>Confidence Intervals</a:t>
             </a:r>
-          </a:p>
-        </p:txBody>
-      </p:sp>
-      <p:sp>
-        <p:nvSpPr>
-          <p:cNvPr id="37" name="Rectangle 36">
-            <a:extLst>
-              <a:ext uri="{FF2B5EF4-FFF2-40B4-BE49-F238E27FC236}">
-                <a16:creationId xmlns:a16="http://schemas.microsoft.com/office/drawing/2014/main" id="{DDCCD322-76D1-1775-DBB9-AB2E6FEF1439}"/>
-              </a:ext>
-            </a:extLst>
-          </p:cNvPr>
-          <p:cNvSpPr/>
-          <p:nvPr/>
-        </p:nvSpPr>
-        <p:spPr>
-          <a:xfrm>
-            <a:off x="3293857" y="5813142"/>
-            <a:ext cx="1920240" cy="640080"/>
-          </a:xfrm>
-          <a:prstGeom prst="rect">
-            <a:avLst/>
-          </a:prstGeom>
-          <a:solidFill>
-            <a:srgbClr val="0070C0">
-              <a:alpha val="49550"/>
-            </a:srgbClr>
-          </a:solidFill>
-          <a:ln>
-            <a:solidFill>
-              <a:schemeClr val="tx1"/>
-            </a:solidFill>
-          </a:ln>
-        </p:spPr>
-        <p:style>
-          <a:lnRef idx="2">
-            <a:schemeClr val="accent1">
-              <a:shade val="15000"/>
-            </a:schemeClr>
-          </a:lnRef>
-          <a:fillRef idx="1">
-            <a:schemeClr val="accent1"/>
-          </a:fillRef>
-          <a:effectRef idx="0">
-            <a:schemeClr val="accent1"/>
-          </a:effectRef>
-          <a:fontRef idx="minor">
-            <a:schemeClr val="lt1"/>
-          </a:fontRef>
-        </p:style>
-        <p:txBody>
-          <a:bodyPr rtlCol="0" anchor="ctr"/>
-          <a:lstStyle/>
-          <a:p>
-            <a:pPr algn="ctr"/>
-            <a:r>
-              <a:rPr lang="en-US" i="1" dirty="0">
-                <a:solidFill>
-                  <a:schemeClr val="tx1"/>
-                </a:solidFill>
-              </a:rPr>
-              <a:t>p</a:t>
-            </a:r>
-            <a:r>
-              <a:rPr lang="en-US" dirty="0">
-                <a:solidFill>
-                  <a:schemeClr val="tx1"/>
-                </a:solidFill>
-              </a:rPr>
-              <a:t>-values</a:t>
-            </a:r>
-            <a:endParaRPr lang="en-US" i="1" dirty="0">
-              <a:solidFill>
-                <a:schemeClr val="tx1"/>
-              </a:solidFill>
-            </a:endParaRPr>
           </a:p>
         </p:txBody>
       </p:sp>
@@ -4729,8 +4754,8 @@
         </p:nvSpPr>
         <p:spPr>
           <a:xfrm>
-            <a:off x="580412" y="1883629"/>
-            <a:ext cx="1920240" cy="640080"/>
+            <a:off x="580411" y="1883629"/>
+            <a:ext cx="2009115" cy="640080"/>
           </a:xfrm>
           <a:prstGeom prst="rect">
             <a:avLst/>
@@ -4772,6 +4797,7 @@
                 <a:solidFill>
                   <a:schemeClr val="tx1"/>
                 </a:solidFill>
+                <a:latin typeface="Arial" panose="020B0604020202020204" pitchFamily="34" charset="0"/>
               </a:rPr>
               <a:t>CCF Registration</a:t>
             </a:r>
@@ -4978,7 +5004,7 @@
         </p:nvCxnSpPr>
         <p:spPr>
           <a:xfrm>
-            <a:off x="3859197" y="2526119"/>
+            <a:off x="3852163" y="2540187"/>
             <a:ext cx="0" cy="541172"/>
           </a:xfrm>
           <a:prstGeom prst="straightConnector1">
@@ -5160,6 +5186,7 @@
                 <a:solidFill>
                   <a:schemeClr val="tx1"/>
                 </a:solidFill>
+                <a:latin typeface="Arial" panose="020B0604020202020204" pitchFamily="34" charset="0"/>
               </a:rPr>
               <a:t>L-BFGS</a:t>
             </a:r>
@@ -5270,6 +5297,7 @@
                 <a:solidFill>
                   <a:schemeClr val="tx1"/>
                 </a:solidFill>
+                <a:latin typeface="Arial" panose="020B0604020202020204" pitchFamily="34" charset="0"/>
               </a:rPr>
               <a:t>Boundary Penalty</a:t>
             </a:r>
@@ -5384,8 +5412,8 @@
         </p:nvCxnSpPr>
         <p:spPr>
           <a:xfrm>
-            <a:off x="6134305" y="1167539"/>
-            <a:ext cx="0" cy="2200694"/>
+            <a:off x="6134305" y="1166191"/>
+            <a:ext cx="0" cy="2252870"/>
           </a:xfrm>
           <a:prstGeom prst="straightConnector1">
             <a:avLst/>
@@ -5430,8 +5458,8 @@
         </p:nvCxnSpPr>
         <p:spPr>
           <a:xfrm flipH="1">
-            <a:off x="5589831" y="3368903"/>
-            <a:ext cx="576072" cy="0"/>
+            <a:off x="5613009" y="3382971"/>
+            <a:ext cx="559928" cy="0"/>
           </a:xfrm>
           <a:prstGeom prst="straightConnector1">
             <a:avLst/>
@@ -5607,6 +5635,7 @@
                 <a:solidFill>
                   <a:schemeClr val="tx1"/>
                 </a:solidFill>
+                <a:latin typeface="Arial" panose="020B0604020202020204" pitchFamily="34" charset="0"/>
               </a:rPr>
               <a:t>Apply Random Effects</a:t>
             </a:r>
@@ -5673,8 +5702,8 @@
         </p:nvSpPr>
         <p:spPr>
           <a:xfrm>
-            <a:off x="6255844" y="139398"/>
-            <a:ext cx="2743200" cy="400110"/>
+            <a:off x="6255844" y="91440"/>
+            <a:ext cx="2743200" cy="461665"/>
           </a:xfrm>
           <a:prstGeom prst="rect">
             <a:avLst/>
@@ -5689,10 +5718,11 @@
           <a:p>
             <a:pPr algn="ctr"/>
             <a:r>
-              <a:rPr lang="en-US" sz="2000" b="1"/>
+              <a:rPr lang="en-US" sz="2400" dirty="0">
+                <a:latin typeface="Arial" panose="020B0604020202020204" pitchFamily="34" charset="0"/>
+              </a:rPr>
               <a:t>Prediction</a:t>
             </a:r>
-            <a:endParaRPr lang="en-US" sz="2000" b="1" dirty="0"/>
           </a:p>
         </p:txBody>
       </p:sp>
@@ -6020,8 +6050,8 @@
         </p:nvCxnSpPr>
         <p:spPr>
           <a:xfrm flipH="1">
-            <a:off x="4727447" y="4887412"/>
-            <a:ext cx="6108192" cy="0"/>
+            <a:off x="4724400" y="4887412"/>
+            <a:ext cx="6135858" cy="0"/>
           </a:xfrm>
           <a:prstGeom prst="straightConnector1">
             <a:avLst/>
@@ -6253,7 +6283,7 @@
         <p:spPr>
           <a:xfrm flipH="1">
             <a:off x="11546952" y="2254649"/>
-            <a:ext cx="298259" cy="0"/>
+            <a:ext cx="368383" cy="0"/>
           </a:xfrm>
           <a:prstGeom prst="straightConnector1">
             <a:avLst/>
@@ -6299,8 +6329,8 @@
         </p:nvCxnSpPr>
         <p:spPr>
           <a:xfrm flipH="1">
-            <a:off x="2517758" y="4383282"/>
-            <a:ext cx="769452" cy="0"/>
+            <a:off x="2592167" y="4383282"/>
+            <a:ext cx="709110" cy="0"/>
           </a:xfrm>
           <a:prstGeom prst="straightConnector1">
             <a:avLst/>
@@ -6345,7 +6375,7 @@
         </p:nvCxnSpPr>
         <p:spPr>
           <a:xfrm flipH="1">
-            <a:off x="11384514" y="6120244"/>
+            <a:off x="11391548" y="6127277"/>
             <a:ext cx="502686" cy="0"/>
           </a:xfrm>
           <a:prstGeom prst="straightConnector1">
@@ -6481,7 +6511,7 @@
         <p:spPr>
           <a:xfrm>
             <a:off x="582933" y="4035791"/>
-            <a:ext cx="1920240" cy="640080"/>
+            <a:ext cx="2011680" cy="640080"/>
           </a:xfrm>
           <a:prstGeom prst="rect">
             <a:avLst/>
@@ -6524,6 +6554,7 @@
                 <a:solidFill>
                   <a:schemeClr val="tx1"/>
                 </a:solidFill>
+                <a:latin typeface="Arial" panose="020B0604020202020204" pitchFamily="34" charset="0"/>
               </a:rPr>
               <a:t>Data</a:t>
             </a:r>
@@ -6545,9 +6576,9 @@
           <p:nvPr/>
         </p:nvCxnSpPr>
         <p:spPr>
-          <a:xfrm flipH="1">
-            <a:off x="2209800" y="3581400"/>
-            <a:ext cx="14791" cy="568967"/>
+          <a:xfrm>
+            <a:off x="2224591" y="3581400"/>
+            <a:ext cx="0" cy="596900"/>
           </a:xfrm>
           <a:prstGeom prst="straightConnector1">
             <a:avLst/>
@@ -6593,7 +6624,7 @@
         <p:spPr>
           <a:xfrm flipH="1">
             <a:off x="1600200" y="5212080"/>
-            <a:ext cx="9098280" cy="0"/>
+            <a:ext cx="9283700" cy="0"/>
           </a:xfrm>
           <a:prstGeom prst="straightConnector1">
             <a:avLst/>
@@ -6684,7 +6715,7 @@
         </p:nvCxnSpPr>
         <p:spPr>
           <a:xfrm>
-            <a:off x="10668000" y="5212080"/>
+            <a:off x="10845800" y="5212080"/>
             <a:ext cx="0" cy="731520"/>
           </a:xfrm>
           <a:prstGeom prst="straightConnector1">
@@ -6824,7 +6855,7 @@
         <p:spPr>
           <a:xfrm>
             <a:off x="1600200" y="4681728"/>
-            <a:ext cx="0" cy="557784"/>
+            <a:ext cx="0" cy="572759"/>
           </a:xfrm>
           <a:prstGeom prst="straightConnector1">
             <a:avLst/>
@@ -6870,7 +6901,7 @@
         <p:spPr>
           <a:xfrm>
             <a:off x="7299252" y="5535139"/>
-            <a:ext cx="0" cy="284576"/>
+            <a:ext cx="0" cy="274818"/>
           </a:xfrm>
           <a:prstGeom prst="straightConnector1">
             <a:avLst/>
@@ -6916,8 +6947,8 @@
         </p:nvCxnSpPr>
         <p:spPr>
           <a:xfrm>
-            <a:off x="1203767" y="4992624"/>
-            <a:ext cx="0" cy="914400"/>
+            <a:off x="1203767" y="5049078"/>
+            <a:ext cx="0" cy="857946"/>
           </a:xfrm>
           <a:prstGeom prst="straightConnector1">
             <a:avLst/>
@@ -7236,7 +7267,7 @@
         </p:nvSpPr>
         <p:spPr>
           <a:xfrm>
-            <a:off x="2321962" y="3284107"/>
+            <a:off x="2360062" y="2890407"/>
             <a:ext cx="488260" cy="435258"/>
           </a:xfrm>
           <a:prstGeom prst="ellipse">
@@ -7279,10 +7310,13 @@
                 <a:solidFill>
                   <a:schemeClr val="tx1"/>
                 </a:solidFill>
+                <a:latin typeface="Arial" panose="020B0604020202020204" pitchFamily="34" charset="0"/>
               </a:rPr>
               <a:t>x</a:t>
             </a:r>
-            <a:endParaRPr lang="en-US" sz="2400" i="1" dirty="0"/>
+            <a:endParaRPr lang="en-US" sz="2400" i="1" dirty="0">
+              <a:latin typeface="Arial" panose="020B0604020202020204" pitchFamily="34" charset="0"/>
+            </a:endParaRPr>
           </a:p>
         </p:txBody>
       </p:sp>
@@ -7346,10 +7380,13 @@
                 <a:solidFill>
                   <a:schemeClr val="tx1"/>
                 </a:solidFill>
+                <a:latin typeface="Arial" panose="020B0604020202020204" pitchFamily="34" charset="0"/>
               </a:rPr>
               <a:t>y</a:t>
             </a:r>
-            <a:endParaRPr lang="en-US" sz="2400" i="1" dirty="0"/>
+            <a:endParaRPr lang="en-US" sz="2400" i="1" dirty="0">
+              <a:latin typeface="Arial" panose="020B0604020202020204" pitchFamily="34" charset="0"/>
+            </a:endParaRPr>
           </a:p>
         </p:txBody>
       </p:sp>
@@ -7407,7 +7444,9 @@
           <a:lstStyle/>
           <a:p>
             <a:pPr algn="ctr"/>
-            <a:endParaRPr lang="en-US" sz="2400" b="0" i="1" dirty="0"/>
+            <a:endParaRPr lang="en-US" sz="2400" dirty="0">
+              <a:latin typeface="Arial" panose="020B0604020202020204" pitchFamily="34" charset="0"/>
+            </a:endParaRPr>
           </a:p>
         </p:txBody>
       </p:sp>
@@ -7470,10 +7509,13 @@
                 <a:solidFill>
                   <a:schemeClr val="tx1"/>
                 </a:solidFill>
+                <a:latin typeface="Arial" panose="020B0604020202020204" pitchFamily="34" charset="0"/>
               </a:rPr>
               <a:t>d</a:t>
             </a:r>
-            <a:endParaRPr lang="en-US" sz="2400" i="1" dirty="0"/>
+            <a:endParaRPr lang="en-US" sz="2400" i="1" dirty="0">
+              <a:latin typeface="Arial" panose="020B0604020202020204" pitchFamily="34" charset="0"/>
+            </a:endParaRPr>
           </a:p>
         </p:txBody>
       </p:sp>
@@ -7536,6 +7578,7 @@
                 <a:solidFill>
                   <a:schemeClr val="tx1"/>
                 </a:solidFill>
+                <a:latin typeface="Arial" panose="020B0604020202020204" pitchFamily="34" charset="0"/>
               </a:rPr>
               <a:t>LRO test</a:t>
             </a:r>
@@ -7596,10 +7639,11 @@
           <a:lstStyle/>
           <a:p>
             <a:pPr algn="ctr"/>
-            <a:endParaRPr lang="en-US" sz="2400" b="0" i="1" dirty="0">
+            <a:endParaRPr lang="en-US" sz="2400" dirty="0">
               <a:solidFill>
                 <a:schemeClr val="tx1"/>
               </a:solidFill>
+              <a:latin typeface="Arial" panose="020B0604020202020204" pitchFamily="34" charset="0"/>
             </a:endParaRPr>
           </a:p>
         </p:txBody>
@@ -7658,10 +7702,11 @@
           <a:lstStyle/>
           <a:p>
             <a:pPr algn="ctr"/>
-            <a:endParaRPr lang="en-US" sz="2400" b="0" i="1" dirty="0">
+            <a:endParaRPr lang="en-US" sz="2400" dirty="0">
               <a:solidFill>
                 <a:schemeClr val="tx1"/>
               </a:solidFill>
+              <a:latin typeface="Arial" panose="020B0604020202020204" pitchFamily="34" charset="0"/>
             </a:endParaRPr>
           </a:p>
         </p:txBody>
@@ -7718,10 +7763,11 @@
           <a:lstStyle/>
           <a:p>
             <a:pPr algn="ctr"/>
-            <a:endParaRPr lang="en-US" sz="2400" b="0" dirty="0">
+            <a:endParaRPr lang="en-US" sz="2400" dirty="0">
               <a:solidFill>
                 <a:schemeClr val="tx1"/>
               </a:solidFill>
+              <a:latin typeface="Arial" panose="020B0604020202020204" pitchFamily="34" charset="0"/>
             </a:endParaRPr>
           </a:p>
         </p:txBody>
@@ -7778,10 +7824,11 @@
           <a:lstStyle/>
           <a:p>
             <a:pPr algn="ctr"/>
-            <a:endParaRPr lang="en-US" sz="2000" b="0" i="1" dirty="0">
+            <a:endParaRPr lang="en-US" sz="2000" dirty="0">
               <a:solidFill>
                 <a:schemeClr val="tx1"/>
               </a:solidFill>
+              <a:latin typeface="Arial" panose="020B0604020202020204" pitchFamily="34" charset="0"/>
             </a:endParaRPr>
           </a:p>
         </p:txBody>
@@ -7838,10 +7885,11 @@
           <a:lstStyle/>
           <a:p>
             <a:pPr algn="ctr"/>
-            <a:endParaRPr lang="en-US" sz="2400" b="0" dirty="0">
+            <a:endParaRPr lang="en-US" sz="2400" dirty="0">
               <a:solidFill>
                 <a:schemeClr val="tx1"/>
               </a:solidFill>
+              <a:latin typeface="Arial" panose="020B0604020202020204" pitchFamily="34" charset="0"/>
             </a:endParaRPr>
           </a:p>
         </p:txBody>
@@ -7862,7 +7910,7 @@
             </p:nvSpPr>
             <p:spPr>
               <a:xfrm>
-                <a:off x="6629162" y="2383645"/>
+                <a:off x="6639955" y="2390648"/>
                 <a:ext cx="713550" cy="461665"/>
               </a:xfrm>
               <a:prstGeom prst="rect">
@@ -7898,7 +7946,9 @@
                     </m:oMath>
                   </m:oMathPara>
                 </a14:m>
-                <a:endParaRPr lang="en-US" sz="2400" dirty="0"/>
+                <a:endParaRPr lang="en-US" sz="2400" dirty="0">
+                  <a:latin typeface="Arial" panose="020B0604020202020204" pitchFamily="34" charset="0"/>
+                </a:endParaRPr>
               </a:p>
             </p:txBody>
           </p:sp>
@@ -7920,7 +7970,7 @@
             </p:nvSpPr>
             <p:spPr>
               <a:xfrm>
-                <a:off x="6629162" y="2383645"/>
+                <a:off x="6639955" y="2390648"/>
                 <a:ext cx="713550" cy="461665"/>
               </a:xfrm>
               <a:prstGeom prst="rect">
@@ -8000,7 +8050,9 @@
                     </m:oMath>
                   </m:oMathPara>
                 </a14:m>
-                <a:endParaRPr lang="en-US" sz="2400" dirty="0"/>
+                <a:endParaRPr lang="en-US" sz="2400" dirty="0">
+                  <a:latin typeface="Arial" panose="020B0604020202020204" pitchFamily="34" charset="0"/>
+                </a:endParaRPr>
               </a:p>
             </p:txBody>
           </p:sp>
@@ -8120,10 +8172,11 @@
                     </m:oMath>
                   </m:oMathPara>
                 </a14:m>
-                <a:endParaRPr lang="en-US" sz="2400" b="0" i="1" dirty="0">
+                <a:endParaRPr lang="en-US" sz="2400" dirty="0">
                   <a:solidFill>
                     <a:schemeClr val="tx1"/>
                   </a:solidFill>
+                  <a:latin typeface="Arial" panose="020B0604020202020204" pitchFamily="34" charset="0"/>
                 </a:endParaRPr>
               </a:p>
             </p:txBody>
@@ -8155,7 +8208,7 @@
               <a:blipFill>
                 <a:blip r:embed="rId4"/>
                 <a:stretch>
-                  <a:fillRect b="-16216"/>
+                  <a:fillRect b="-18919"/>
                 </a:stretch>
               </a:blipFill>
             </p:spPr>
@@ -8226,7 +8279,9 @@
                     </m:oMath>
                   </m:oMathPara>
                 </a14:m>
-                <a:endParaRPr lang="en-US" sz="2400" dirty="0"/>
+                <a:endParaRPr lang="en-US" sz="2400" dirty="0">
+                  <a:latin typeface="Arial" panose="020B0604020202020204" pitchFamily="34" charset="0"/>
+                </a:endParaRPr>
               </a:p>
             </p:txBody>
           </p:sp>
@@ -8257,7 +8312,7 @@
               <a:blipFill>
                 <a:blip r:embed="rId5"/>
                 <a:stretch>
-                  <a:fillRect b="-8108"/>
+                  <a:fillRect b="-10811"/>
                 </a:stretch>
               </a:blipFill>
             </p:spPr>
@@ -8328,7 +8383,9 @@
                     </m:oMath>
                   </m:oMathPara>
                 </a14:m>
-                <a:endParaRPr lang="en-US" sz="2400" dirty="0"/>
+                <a:endParaRPr lang="en-US" sz="2400" dirty="0">
+                  <a:latin typeface="Arial" panose="020B0604020202020204" pitchFamily="34" charset="0"/>
+                </a:endParaRPr>
               </a:p>
             </p:txBody>
           </p:sp>
@@ -8359,7 +8416,7 @@
               <a:blipFill>
                 <a:blip r:embed="rId6"/>
                 <a:stretch>
-                  <a:fillRect b="-16216"/>
+                  <a:fillRect b="-18919"/>
                 </a:stretch>
               </a:blipFill>
             </p:spPr>
@@ -8430,7 +8487,9 @@
                     </m:oMath>
                   </m:oMathPara>
                 </a14:m>
-                <a:endParaRPr lang="en-US" sz="2400" dirty="0"/>
+                <a:endParaRPr lang="en-US" sz="2400" dirty="0">
+                  <a:latin typeface="Arial" panose="020B0604020202020204" pitchFamily="34" charset="0"/>
+                </a:endParaRPr>
               </a:p>
             </p:txBody>
           </p:sp>
@@ -8461,7 +8520,7 @@
               <a:blipFill>
                 <a:blip r:embed="rId7"/>
                 <a:stretch>
-                  <a:fillRect b="-8108"/>
+                  <a:fillRect b="-10811"/>
                 </a:stretch>
               </a:blipFill>
             </p:spPr>
@@ -8480,6 +8539,630 @@
           </p:sp>
         </mc:Fallback>
       </mc:AlternateContent>
+      <p:sp>
+        <p:nvSpPr>
+          <p:cNvPr id="387" name="Oval 386">
+            <a:extLst>
+              <a:ext uri="{FF2B5EF4-FFF2-40B4-BE49-F238E27FC236}">
+                <a16:creationId xmlns:a16="http://schemas.microsoft.com/office/drawing/2014/main" id="{83378D40-C98B-B342-9AD3-C6064275E58F}"/>
+              </a:ext>
+            </a:extLst>
+          </p:cNvPr>
+          <p:cNvSpPr/>
+          <p:nvPr/>
+        </p:nvSpPr>
+        <p:spPr>
+          <a:xfrm>
+            <a:off x="11343632" y="695233"/>
+            <a:ext cx="488260" cy="435258"/>
+          </a:xfrm>
+          <a:prstGeom prst="ellipse">
+            <a:avLst/>
+          </a:prstGeom>
+          <a:solidFill>
+            <a:schemeClr val="bg1">
+              <a:lumMod val="95000"/>
+            </a:schemeClr>
+          </a:solidFill>
+          <a:ln w="38100">
+            <a:solidFill>
+              <a:schemeClr val="accent5">
+                <a:lumMod val="75000"/>
+              </a:schemeClr>
+            </a:solidFill>
+          </a:ln>
+        </p:spPr>
+        <p:style>
+          <a:lnRef idx="2">
+            <a:schemeClr val="accent1">
+              <a:shade val="15000"/>
+            </a:schemeClr>
+          </a:lnRef>
+          <a:fillRef idx="1">
+            <a:schemeClr val="accent1"/>
+          </a:fillRef>
+          <a:effectRef idx="0">
+            <a:schemeClr val="accent1"/>
+          </a:effectRef>
+          <a:fontRef idx="minor">
+            <a:schemeClr val="lt1"/>
+          </a:fontRef>
+        </p:style>
+        <p:txBody>
+          <a:bodyPr rtlCol="0" anchor="ctr"/>
+          <a:lstStyle/>
+          <a:p>
+            <a:pPr algn="ctr"/>
+            <a:endParaRPr lang="en-US" sz="2400" dirty="0">
+              <a:latin typeface="Arial" panose="020B0604020202020204" pitchFamily="34" charset="0"/>
+            </a:endParaRPr>
+          </a:p>
+        </p:txBody>
+      </p:sp>
+      <mc:AlternateContent xmlns:mc="http://schemas.openxmlformats.org/markup-compatibility/2006">
+        <mc:Choice xmlns:a14="http://schemas.microsoft.com/office/drawing/2010/main" Requires="a14">
+          <p:sp>
+            <p:nvSpPr>
+              <p:cNvPr id="388" name="TextBox 387">
+                <a:extLst>
+                  <a:ext uri="{FF2B5EF4-FFF2-40B4-BE49-F238E27FC236}">
+                    <a16:creationId xmlns:a16="http://schemas.microsoft.com/office/drawing/2014/main" id="{10EBA3DD-78B4-4D7D-AB35-0327B8F61775}"/>
+                  </a:ext>
+                </a:extLst>
+              </p:cNvPr>
+              <p:cNvSpPr txBox="1"/>
+              <p:nvPr/>
+            </p:nvSpPr>
+            <p:spPr>
+              <a:xfrm>
+                <a:off x="11160755" y="679802"/>
+                <a:ext cx="889998" cy="461665"/>
+              </a:xfrm>
+              <a:prstGeom prst="rect">
+                <a:avLst/>
+              </a:prstGeom>
+              <a:noFill/>
+            </p:spPr>
+            <p:txBody>
+              <a:bodyPr wrap="square">
+                <a:spAutoFit/>
+              </a:bodyPr>
+              <a:lstStyle/>
+              <a:p>
+                <a:pPr/>
+                <a14:m>
+                  <m:oMathPara xmlns:m="http://schemas.openxmlformats.org/officeDocument/2006/math">
+                    <m:oMathParaPr>
+                      <m:jc m:val="centerGroup"/>
+                    </m:oMathParaPr>
+                    <m:oMath xmlns:m="http://schemas.openxmlformats.org/officeDocument/2006/math">
+                      <m:r>
+                        <a:rPr lang="en-US" sz="2400" b="0" i="1" smtClean="0">
+                          <a:solidFill>
+                            <a:schemeClr val="tx1"/>
+                          </a:solidFill>
+                          <a:latin typeface="Cambria Math" panose="02040503050406030204" pitchFamily="18" charset="0"/>
+                        </a:rPr>
+                        <m:t>ℬ</m:t>
+                      </m:r>
+                    </m:oMath>
+                  </m:oMathPara>
+                </a14:m>
+                <a:endParaRPr lang="en-US" sz="2400" dirty="0">
+                  <a:solidFill>
+                    <a:schemeClr val="tx1"/>
+                  </a:solidFill>
+                  <a:latin typeface="Arial" panose="020B0604020202020204" pitchFamily="34" charset="0"/>
+                </a:endParaRPr>
+              </a:p>
+            </p:txBody>
+          </p:sp>
+        </mc:Choice>
+        <mc:Fallback>
+          <p:sp>
+            <p:nvSpPr>
+              <p:cNvPr id="388" name="TextBox 387">
+                <a:extLst>
+                  <a:ext uri="{FF2B5EF4-FFF2-40B4-BE49-F238E27FC236}">
+                    <a16:creationId xmlns:a16="http://schemas.microsoft.com/office/drawing/2014/main" id="{10EBA3DD-78B4-4D7D-AB35-0327B8F61775}"/>
+                  </a:ext>
+                </a:extLst>
+              </p:cNvPr>
+              <p:cNvSpPr txBox="1">
+                <a:spLocks noRot="1" noChangeAspect="1" noMove="1" noResize="1" noEditPoints="1" noAdjustHandles="1" noChangeArrowheads="1" noChangeShapeType="1" noTextEdit="1"/>
+              </p:cNvSpPr>
+              <p:nvPr/>
+            </p:nvSpPr>
+            <p:spPr>
+              <a:xfrm>
+                <a:off x="11160755" y="679802"/>
+                <a:ext cx="889998" cy="461665"/>
+              </a:xfrm>
+              <a:prstGeom prst="rect">
+                <a:avLst/>
+              </a:prstGeom>
+              <a:blipFill>
+                <a:blip r:embed="rId8"/>
+                <a:stretch>
+                  <a:fillRect/>
+                </a:stretch>
+              </a:blipFill>
+            </p:spPr>
+            <p:txBody>
+              <a:bodyPr/>
+              <a:lstStyle/>
+              <a:p>
+                <a:r>
+                  <a:rPr lang="en-US">
+                    <a:noFill/>
+                  </a:rPr>
+                  <a:t> </a:t>
+                </a:r>
+              </a:p>
+            </p:txBody>
+          </p:sp>
+        </mc:Fallback>
+      </mc:AlternateContent>
+      <p:sp>
+        <p:nvSpPr>
+          <p:cNvPr id="390" name="Oval 389">
+            <a:extLst>
+              <a:ext uri="{FF2B5EF4-FFF2-40B4-BE49-F238E27FC236}">
+                <a16:creationId xmlns:a16="http://schemas.microsoft.com/office/drawing/2014/main" id="{B92A9EFF-9113-2139-90D0-848AAD8E41D0}"/>
+              </a:ext>
+            </a:extLst>
+          </p:cNvPr>
+          <p:cNvSpPr/>
+          <p:nvPr/>
+        </p:nvSpPr>
+        <p:spPr>
+          <a:xfrm>
+            <a:off x="11391727" y="1652077"/>
+            <a:ext cx="488260" cy="435258"/>
+          </a:xfrm>
+          <a:prstGeom prst="ellipse">
+            <a:avLst/>
+          </a:prstGeom>
+          <a:solidFill>
+            <a:schemeClr val="bg1">
+              <a:lumMod val="95000"/>
+            </a:schemeClr>
+          </a:solidFill>
+          <a:ln w="38100">
+            <a:solidFill>
+              <a:schemeClr val="accent5">
+                <a:lumMod val="75000"/>
+              </a:schemeClr>
+            </a:solidFill>
+          </a:ln>
+        </p:spPr>
+        <p:style>
+          <a:lnRef idx="2">
+            <a:schemeClr val="accent1">
+              <a:shade val="15000"/>
+            </a:schemeClr>
+          </a:lnRef>
+          <a:fillRef idx="1">
+            <a:schemeClr val="accent1"/>
+          </a:fillRef>
+          <a:effectRef idx="0">
+            <a:schemeClr val="accent1"/>
+          </a:effectRef>
+          <a:fontRef idx="minor">
+            <a:schemeClr val="lt1"/>
+          </a:fontRef>
+        </p:style>
+        <p:txBody>
+          <a:bodyPr rtlCol="0" anchor="ctr"/>
+          <a:lstStyle/>
+          <a:p>
+            <a:pPr algn="ctr"/>
+            <a:endParaRPr lang="en-US" sz="2400" dirty="0">
+              <a:latin typeface="Arial" panose="020B0604020202020204" pitchFamily="34" charset="0"/>
+            </a:endParaRPr>
+          </a:p>
+        </p:txBody>
+      </p:sp>
+      <mc:AlternateContent xmlns:mc="http://schemas.openxmlformats.org/markup-compatibility/2006">
+        <mc:Choice xmlns:a14="http://schemas.microsoft.com/office/drawing/2010/main" Requires="a14">
+          <p:sp>
+            <p:nvSpPr>
+              <p:cNvPr id="391" name="TextBox 390">
+                <a:extLst>
+                  <a:ext uri="{FF2B5EF4-FFF2-40B4-BE49-F238E27FC236}">
+                    <a16:creationId xmlns:a16="http://schemas.microsoft.com/office/drawing/2014/main" id="{664ABE58-5D78-C128-27FD-1255C1963278}"/>
+                  </a:ext>
+                </a:extLst>
+              </p:cNvPr>
+              <p:cNvSpPr txBox="1"/>
+              <p:nvPr/>
+            </p:nvSpPr>
+            <p:spPr>
+              <a:xfrm>
+                <a:off x="11195046" y="1649292"/>
+                <a:ext cx="889998" cy="461665"/>
+              </a:xfrm>
+              <a:prstGeom prst="rect">
+                <a:avLst/>
+              </a:prstGeom>
+              <a:noFill/>
+            </p:spPr>
+            <p:txBody>
+              <a:bodyPr wrap="square">
+                <a:spAutoFit/>
+              </a:bodyPr>
+              <a:lstStyle/>
+              <a:p>
+                <a:pPr/>
+                <a14:m>
+                  <m:oMathPara xmlns:m="http://schemas.openxmlformats.org/officeDocument/2006/math">
+                    <m:oMathParaPr>
+                      <m:jc m:val="centerGroup"/>
+                    </m:oMathParaPr>
+                    <m:oMath xmlns:m="http://schemas.openxmlformats.org/officeDocument/2006/math">
+                      <m:r>
+                        <a:rPr lang="en-US" sz="2400" b="0" i="1" smtClean="0">
+                          <a:solidFill>
+                            <a:schemeClr val="tx1"/>
+                          </a:solidFill>
+                          <a:latin typeface="Cambria Math" panose="02040503050406030204" pitchFamily="18" charset="0"/>
+                        </a:rPr>
+                        <m:t>ℒ</m:t>
+                      </m:r>
+                    </m:oMath>
+                  </m:oMathPara>
+                </a14:m>
+                <a:endParaRPr lang="en-US" sz="2400" dirty="0">
+                  <a:solidFill>
+                    <a:schemeClr val="tx1"/>
+                  </a:solidFill>
+                  <a:latin typeface="Arial" panose="020B0604020202020204" pitchFamily="34" charset="0"/>
+                </a:endParaRPr>
+              </a:p>
+            </p:txBody>
+          </p:sp>
+        </mc:Choice>
+        <mc:Fallback>
+          <p:sp>
+            <p:nvSpPr>
+              <p:cNvPr id="391" name="TextBox 390">
+                <a:extLst>
+                  <a:ext uri="{FF2B5EF4-FFF2-40B4-BE49-F238E27FC236}">
+                    <a16:creationId xmlns:a16="http://schemas.microsoft.com/office/drawing/2014/main" id="{664ABE58-5D78-C128-27FD-1255C1963278}"/>
+                  </a:ext>
+                </a:extLst>
+              </p:cNvPr>
+              <p:cNvSpPr txBox="1">
+                <a:spLocks noRot="1" noChangeAspect="1" noMove="1" noResize="1" noEditPoints="1" noAdjustHandles="1" noChangeArrowheads="1" noChangeShapeType="1" noTextEdit="1"/>
+              </p:cNvSpPr>
+              <p:nvPr/>
+            </p:nvSpPr>
+            <p:spPr>
+              <a:xfrm>
+                <a:off x="11195046" y="1649292"/>
+                <a:ext cx="889998" cy="461665"/>
+              </a:xfrm>
+              <a:prstGeom prst="rect">
+                <a:avLst/>
+              </a:prstGeom>
+              <a:blipFill>
+                <a:blip r:embed="rId9"/>
+                <a:stretch>
+                  <a:fillRect/>
+                </a:stretch>
+              </a:blipFill>
+            </p:spPr>
+            <p:txBody>
+              <a:bodyPr/>
+              <a:lstStyle/>
+              <a:p>
+                <a:r>
+                  <a:rPr lang="en-US">
+                    <a:noFill/>
+                  </a:rPr>
+                  <a:t> </a:t>
+                </a:r>
+              </a:p>
+            </p:txBody>
+          </p:sp>
+        </mc:Fallback>
+      </mc:AlternateContent>
+      <p:sp>
+        <p:nvSpPr>
+          <p:cNvPr id="394" name="Rounded Rectangle 393">
+            <a:extLst>
+              <a:ext uri="{FF2B5EF4-FFF2-40B4-BE49-F238E27FC236}">
+                <a16:creationId xmlns:a16="http://schemas.microsoft.com/office/drawing/2014/main" id="{9C870D71-0DEE-B3B1-ACA3-046F8AAD761B}"/>
+              </a:ext>
+            </a:extLst>
+          </p:cNvPr>
+          <p:cNvSpPr/>
+          <p:nvPr/>
+        </p:nvSpPr>
+        <p:spPr>
+          <a:xfrm>
+            <a:off x="9590891" y="3503044"/>
+            <a:ext cx="664713" cy="373274"/>
+          </a:xfrm>
+          <a:prstGeom prst="roundRect">
+            <a:avLst/>
+          </a:prstGeom>
+          <a:solidFill>
+            <a:schemeClr val="bg1">
+              <a:lumMod val="95000"/>
+            </a:schemeClr>
+          </a:solidFill>
+          <a:ln w="38100">
+            <a:solidFill>
+              <a:schemeClr val="accent5">
+                <a:lumMod val="75000"/>
+              </a:schemeClr>
+            </a:solidFill>
+          </a:ln>
+        </p:spPr>
+        <p:style>
+          <a:lnRef idx="2">
+            <a:schemeClr val="accent1">
+              <a:shade val="15000"/>
+            </a:schemeClr>
+          </a:lnRef>
+          <a:fillRef idx="1">
+            <a:schemeClr val="accent1"/>
+          </a:fillRef>
+          <a:effectRef idx="0">
+            <a:schemeClr val="accent1"/>
+          </a:effectRef>
+          <a:fontRef idx="minor">
+            <a:schemeClr val="lt1"/>
+          </a:fontRef>
+        </p:style>
+        <p:txBody>
+          <a:bodyPr rtlCol="0" anchor="ctr"/>
+          <a:lstStyle/>
+          <a:p>
+            <a:pPr algn="ctr"/>
+            <a:endParaRPr lang="en-US" sz="2400" dirty="0">
+              <a:solidFill>
+                <a:schemeClr val="tx1"/>
+              </a:solidFill>
+              <a:latin typeface="Arial" panose="020B0604020202020204" pitchFamily="34" charset="0"/>
+            </a:endParaRPr>
+          </a:p>
+        </p:txBody>
+      </p:sp>
+      <mc:AlternateContent xmlns:mc="http://schemas.openxmlformats.org/markup-compatibility/2006">
+        <mc:Choice xmlns:a14="http://schemas.microsoft.com/office/drawing/2010/main" Requires="a14">
+          <p:sp>
+            <p:nvSpPr>
+              <p:cNvPr id="392" name="TextBox 391">
+                <a:extLst>
+                  <a:ext uri="{FF2B5EF4-FFF2-40B4-BE49-F238E27FC236}">
+                    <a16:creationId xmlns:a16="http://schemas.microsoft.com/office/drawing/2014/main" id="{47A8D240-36A6-246F-5E31-18BBA477F933}"/>
+                  </a:ext>
+                </a:extLst>
+              </p:cNvPr>
+              <p:cNvSpPr txBox="1"/>
+              <p:nvPr/>
+            </p:nvSpPr>
+            <p:spPr>
+              <a:xfrm>
+                <a:off x="9501118" y="3493347"/>
+                <a:ext cx="889998" cy="461665"/>
+              </a:xfrm>
+              <a:prstGeom prst="rect">
+                <a:avLst/>
+              </a:prstGeom>
+              <a:noFill/>
+            </p:spPr>
+            <p:txBody>
+              <a:bodyPr wrap="square">
+                <a:spAutoFit/>
+              </a:bodyPr>
+              <a:lstStyle/>
+              <a:p>
+                <a:pPr/>
+                <a14:m>
+                  <m:oMathPara xmlns:m="http://schemas.openxmlformats.org/officeDocument/2006/math">
+                    <m:oMathParaPr>
+                      <m:jc m:val="centerGroup"/>
+                    </m:oMathParaPr>
+                    <m:oMath xmlns:m="http://schemas.openxmlformats.org/officeDocument/2006/math">
+                      <m:sSup>
+                        <m:sSupPr>
+                          <m:ctrlPr>
+                            <a:rPr lang="en-US" sz="2400" b="0" i="1" smtClean="0">
+                              <a:solidFill>
+                                <a:schemeClr val="tx1"/>
+                              </a:solidFill>
+                              <a:latin typeface="Cambria Math" panose="02040503050406030204" pitchFamily="18" charset="0"/>
+                            </a:rPr>
+                          </m:ctrlPr>
+                        </m:sSupPr>
+                        <m:e>
+                          <m:r>
+                            <a:rPr lang="en-US" sz="2400" b="0" i="1" smtClean="0">
+                              <a:solidFill>
+                                <a:schemeClr val="tx1"/>
+                              </a:solidFill>
+                              <a:latin typeface="Cambria Math" panose="02040503050406030204" pitchFamily="18" charset="0"/>
+                            </a:rPr>
+                            <m:t>ℬ</m:t>
+                          </m:r>
+                        </m:e>
+                        <m:sup>
+                          <m:r>
+                            <a:rPr lang="en-US" sz="2400" b="0" i="1" smtClean="0">
+                              <a:solidFill>
+                                <a:schemeClr val="tx1"/>
+                              </a:solidFill>
+                              <a:latin typeface="Cambria Math" panose="02040503050406030204" pitchFamily="18" charset="0"/>
+                            </a:rPr>
+                            <m:t>×</m:t>
+                          </m:r>
+                        </m:sup>
+                      </m:sSup>
+                    </m:oMath>
+                  </m:oMathPara>
+                </a14:m>
+                <a:endParaRPr lang="en-US" sz="2400" dirty="0">
+                  <a:solidFill>
+                    <a:schemeClr val="tx1"/>
+                  </a:solidFill>
+                  <a:latin typeface="Arial" panose="020B0604020202020204" pitchFamily="34" charset="0"/>
+                </a:endParaRPr>
+              </a:p>
+            </p:txBody>
+          </p:sp>
+        </mc:Choice>
+        <mc:Fallback>
+          <p:sp>
+            <p:nvSpPr>
+              <p:cNvPr id="392" name="TextBox 391">
+                <a:extLst>
+                  <a:ext uri="{FF2B5EF4-FFF2-40B4-BE49-F238E27FC236}">
+                    <a16:creationId xmlns:a16="http://schemas.microsoft.com/office/drawing/2014/main" id="{47A8D240-36A6-246F-5E31-18BBA477F933}"/>
+                  </a:ext>
+                </a:extLst>
+              </p:cNvPr>
+              <p:cNvSpPr txBox="1">
+                <a:spLocks noRot="1" noChangeAspect="1" noMove="1" noResize="1" noEditPoints="1" noAdjustHandles="1" noChangeArrowheads="1" noChangeShapeType="1" noTextEdit="1"/>
+              </p:cNvSpPr>
+              <p:nvPr/>
+            </p:nvSpPr>
+            <p:spPr>
+              <a:xfrm>
+                <a:off x="9501118" y="3493347"/>
+                <a:ext cx="889998" cy="461665"/>
+              </a:xfrm>
+              <a:prstGeom prst="rect">
+                <a:avLst/>
+              </a:prstGeom>
+              <a:blipFill>
+                <a:blip r:embed="rId10"/>
+                <a:stretch>
+                  <a:fillRect/>
+                </a:stretch>
+              </a:blipFill>
+            </p:spPr>
+            <p:txBody>
+              <a:bodyPr/>
+              <a:lstStyle/>
+              <a:p>
+                <a:r>
+                  <a:rPr lang="en-US">
+                    <a:noFill/>
+                  </a:rPr>
+                  <a:t> </a:t>
+                </a:r>
+              </a:p>
+            </p:txBody>
+          </p:sp>
+        </mc:Fallback>
+      </mc:AlternateContent>
+      <p:sp>
+        <p:nvSpPr>
+          <p:cNvPr id="395" name="Oval 394">
+            <a:extLst>
+              <a:ext uri="{FF2B5EF4-FFF2-40B4-BE49-F238E27FC236}">
+                <a16:creationId xmlns:a16="http://schemas.microsoft.com/office/drawing/2014/main" id="{E5176749-5556-9B8C-B9A8-700EF6819980}"/>
+              </a:ext>
+            </a:extLst>
+          </p:cNvPr>
+          <p:cNvSpPr/>
+          <p:nvPr/>
+        </p:nvSpPr>
+        <p:spPr>
+          <a:xfrm>
+            <a:off x="2294023" y="1314397"/>
+            <a:ext cx="488260" cy="435258"/>
+          </a:xfrm>
+          <a:prstGeom prst="ellipse">
+            <a:avLst/>
+          </a:prstGeom>
+          <a:solidFill>
+            <a:schemeClr val="bg1">
+              <a:lumMod val="95000"/>
+            </a:schemeClr>
+          </a:solidFill>
+          <a:ln w="38100">
+            <a:solidFill>
+              <a:schemeClr val="accent2"/>
+            </a:solidFill>
+          </a:ln>
+        </p:spPr>
+        <p:style>
+          <a:lnRef idx="2">
+            <a:schemeClr val="accent1">
+              <a:shade val="15000"/>
+            </a:schemeClr>
+          </a:lnRef>
+          <a:fillRef idx="1">
+            <a:schemeClr val="accent1"/>
+          </a:fillRef>
+          <a:effectRef idx="0">
+            <a:schemeClr val="accent1"/>
+          </a:effectRef>
+          <a:fontRef idx="minor">
+            <a:schemeClr val="lt1"/>
+          </a:fontRef>
+        </p:style>
+        <p:txBody>
+          <a:bodyPr rtlCol="0" anchor="ctr"/>
+          <a:lstStyle/>
+          <a:p>
+            <a:pPr algn="ctr"/>
+            <a:r>
+              <a:rPr lang="en-US" sz="2400" i="1" dirty="0">
+                <a:solidFill>
+                  <a:schemeClr val="tx1"/>
+                </a:solidFill>
+                <a:latin typeface="Arial" panose="020B0604020202020204" pitchFamily="34" charset="0"/>
+              </a:rPr>
+              <a:t>g</a:t>
+            </a:r>
+            <a:endParaRPr lang="en-US" sz="2400" i="1" dirty="0">
+              <a:latin typeface="Arial" panose="020B0604020202020204" pitchFamily="34" charset="0"/>
+            </a:endParaRPr>
+          </a:p>
+        </p:txBody>
+      </p:sp>
+      <p:sp>
+        <p:nvSpPr>
+          <p:cNvPr id="396" name="TextBox 395">
+            <a:extLst>
+              <a:ext uri="{FF2B5EF4-FFF2-40B4-BE49-F238E27FC236}">
+                <a16:creationId xmlns:a16="http://schemas.microsoft.com/office/drawing/2014/main" id="{EA924F54-2CC9-AE45-B452-09F3208A44D9}"/>
+              </a:ext>
+            </a:extLst>
+          </p:cNvPr>
+          <p:cNvSpPr txBox="1"/>
+          <p:nvPr/>
+        </p:nvSpPr>
+        <p:spPr>
+          <a:xfrm>
+            <a:off x="8938022" y="5908922"/>
+            <a:ext cx="474810" cy="461665"/>
+          </a:xfrm>
+          <a:prstGeom prst="rect">
+            <a:avLst/>
+          </a:prstGeom>
+          <a:noFill/>
+        </p:spPr>
+        <p:txBody>
+          <a:bodyPr wrap="none" rtlCol="0">
+            <a:spAutoFit/>
+          </a:bodyPr>
+          <a:lstStyle/>
+          <a:p>
+            <a:r>
+              <a:rPr lang="en-US" sz="2400" dirty="0">
+                <a:latin typeface="Arial" panose="020B0604020202020204" pitchFamily="34" charset="0"/>
+              </a:rPr>
+              <a:t>or</a:t>
+            </a:r>
+          </a:p>
+        </p:txBody>
+      </p:sp>
     </p:spTree>
     <p:extLst>
       <p:ext uri="{BB962C8B-B14F-4D97-AF65-F5344CB8AC3E}">

</xml_diff>